<commit_message>
Ch 4, 5, up to 6.9
</commit_message>
<xml_diff>
--- a/figures.pptx
+++ b/figures.pptx
@@ -6,6 +6,7 @@
   </p:sldMasterIdLst>
   <p:sldIdLst>
     <p:sldId id="256" r:id="rId2"/>
+    <p:sldId id="257" r:id="rId3"/>
   </p:sldIdLst>
   <p:sldSz cx="12192000" cy="6858000"/>
   <p:notesSz cx="6858000" cy="9144000"/>
@@ -104,13 +105,18 @@
       </a:defRPr>
     </a:lvl9pPr>
   </p:defaultTextStyle>
+  <p:extLst>
+    <p:ext uri="{EFAFB233-063F-42B5-8137-9DF3F51BA10A}">
+      <p15:sldGuideLst xmlns:p15="http://schemas.microsoft.com/office/powerpoint/2012/main"/>
+    </p:ext>
+  </p:extLst>
 </p:presentation>
 </file>
 
 <file path=ppt/revisionInfo.xml><?xml version="1.0" encoding="utf-8"?>
 <p1510:revInfo xmlns:a="http://schemas.openxmlformats.org/drawingml/2006/main" xmlns:r="http://schemas.openxmlformats.org/officeDocument/2006/relationships" xmlns:p1510="http://schemas.microsoft.com/office/powerpoint/2015/10/main">
   <p1510:revLst>
-    <p1510:client id="{E9BFA566-E94F-41CE-9F87-81DD51602D68}" v="16" dt="2025-05-13T14:50:43.970"/>
+    <p1510:client id="{E9BFA566-E94F-41CE-9F87-81DD51602D68}" v="26" dt="2025-05-14T10:17:23.883"/>
   </p1510:revLst>
 </p1510:revInfo>
 </file>
@@ -119,8 +125,8 @@
 <pc:chgInfo xmlns:a="http://schemas.openxmlformats.org/drawingml/2006/main" xmlns:r="http://schemas.openxmlformats.org/officeDocument/2006/relationships" xmlns:ac="http://schemas.microsoft.com/office/drawing/2013/main/command" xmlns:pc="http://schemas.microsoft.com/office/powerpoint/2013/main/command">
   <pc:docChgLst>
     <pc:chgData name="Lubbe, S [slubbe@sun.ac.za]" userId="656cc105-77ab-4b7b-bc17-2448ac205142" providerId="ADAL" clId="{E9BFA566-E94F-41CE-9F87-81DD51602D68}"/>
-    <pc:docChg chg="custSel modSld">
-      <pc:chgData name="Lubbe, S [slubbe@sun.ac.za]" userId="656cc105-77ab-4b7b-bc17-2448ac205142" providerId="ADAL" clId="{E9BFA566-E94F-41CE-9F87-81DD51602D68}" dt="2025-05-13T14:50:43.970" v="224" actId="164"/>
+    <pc:docChg chg="custSel addSld modSld">
+      <pc:chgData name="Lubbe, S [slubbe@sun.ac.za]" userId="656cc105-77ab-4b7b-bc17-2448ac205142" providerId="ADAL" clId="{E9BFA566-E94F-41CE-9F87-81DD51602D68}" dt="2025-05-14T10:17:23.883" v="275" actId="164"/>
       <pc:docMkLst>
         <pc:docMk/>
       </pc:docMkLst>
@@ -299,6 +305,117 @@
           </ac:cxnSpMkLst>
         </pc:cxnChg>
       </pc:sldChg>
+      <pc:sldChg chg="addSp delSp modSp new mod">
+        <pc:chgData name="Lubbe, S [slubbe@sun.ac.za]" userId="656cc105-77ab-4b7b-bc17-2448ac205142" providerId="ADAL" clId="{E9BFA566-E94F-41CE-9F87-81DD51602D68}" dt="2025-05-14T10:17:23.883" v="275" actId="164"/>
+        <pc:sldMkLst>
+          <pc:docMk/>
+          <pc:sldMk cId="1115085580" sldId="257"/>
+        </pc:sldMkLst>
+        <pc:spChg chg="add mod">
+          <ac:chgData name="Lubbe, S [slubbe@sun.ac.za]" userId="656cc105-77ab-4b7b-bc17-2448ac205142" providerId="ADAL" clId="{E9BFA566-E94F-41CE-9F87-81DD51602D68}" dt="2025-05-14T10:17:23.883" v="275" actId="164"/>
+          <ac:spMkLst>
+            <pc:docMk/>
+            <pc:sldMk cId="1115085580" sldId="257"/>
+            <ac:spMk id="3" creationId="{8A7E4A9A-DA7E-19C6-1069-FBBA6D1D6E04}"/>
+          </ac:spMkLst>
+        </pc:spChg>
+        <pc:spChg chg="mod">
+          <ac:chgData name="Lubbe, S [slubbe@sun.ac.za]" userId="656cc105-77ab-4b7b-bc17-2448ac205142" providerId="ADAL" clId="{E9BFA566-E94F-41CE-9F87-81DD51602D68}" dt="2025-05-14T10:14:40.872" v="230" actId="1076"/>
+          <ac:spMkLst>
+            <pc:docMk/>
+            <pc:sldMk cId="1115085580" sldId="257"/>
+            <ac:spMk id="5" creationId="{1DBB39C5-67AA-561F-EC37-90BEAC2D7305}"/>
+          </ac:spMkLst>
+        </pc:spChg>
+        <pc:spChg chg="mod">
+          <ac:chgData name="Lubbe, S [slubbe@sun.ac.za]" userId="656cc105-77ab-4b7b-bc17-2448ac205142" providerId="ADAL" clId="{E9BFA566-E94F-41CE-9F87-81DD51602D68}" dt="2025-05-14T10:14:40.872" v="230" actId="1076"/>
+          <ac:spMkLst>
+            <pc:docMk/>
+            <pc:sldMk cId="1115085580" sldId="257"/>
+            <ac:spMk id="6" creationId="{E5D79715-4879-7823-1C8E-753B1DE93A71}"/>
+          </ac:spMkLst>
+        </pc:spChg>
+        <pc:spChg chg="mod">
+          <ac:chgData name="Lubbe, S [slubbe@sun.ac.za]" userId="656cc105-77ab-4b7b-bc17-2448ac205142" providerId="ADAL" clId="{E9BFA566-E94F-41CE-9F87-81DD51602D68}" dt="2025-05-14T10:14:40.872" v="230" actId="1076"/>
+          <ac:spMkLst>
+            <pc:docMk/>
+            <pc:sldMk cId="1115085580" sldId="257"/>
+            <ac:spMk id="7" creationId="{966A67BD-2706-9D7D-336C-1E3433FD2BB5}"/>
+          </ac:spMkLst>
+        </pc:spChg>
+        <pc:spChg chg="mod">
+          <ac:chgData name="Lubbe, S [slubbe@sun.ac.za]" userId="656cc105-77ab-4b7b-bc17-2448ac205142" providerId="ADAL" clId="{E9BFA566-E94F-41CE-9F87-81DD51602D68}" dt="2025-05-14T10:14:40.872" v="230" actId="1076"/>
+          <ac:spMkLst>
+            <pc:docMk/>
+            <pc:sldMk cId="1115085580" sldId="257"/>
+            <ac:spMk id="8" creationId="{7F0C126C-F861-890D-1F86-41A2A302B215}"/>
+          </ac:spMkLst>
+        </pc:spChg>
+        <pc:spChg chg="add mod">
+          <ac:chgData name="Lubbe, S [slubbe@sun.ac.za]" userId="656cc105-77ab-4b7b-bc17-2448ac205142" providerId="ADAL" clId="{E9BFA566-E94F-41CE-9F87-81DD51602D68}" dt="2025-05-14T10:14:40.872" v="230" actId="1076"/>
+          <ac:spMkLst>
+            <pc:docMk/>
+            <pc:sldMk cId="1115085580" sldId="257"/>
+            <ac:spMk id="9" creationId="{EAB0E944-86ED-2960-6AE2-2E9E7F0C7195}"/>
+          </ac:spMkLst>
+        </pc:spChg>
+        <pc:spChg chg="add mod">
+          <ac:chgData name="Lubbe, S [slubbe@sun.ac.za]" userId="656cc105-77ab-4b7b-bc17-2448ac205142" providerId="ADAL" clId="{E9BFA566-E94F-41CE-9F87-81DD51602D68}" dt="2025-05-14T10:17:23.883" v="275" actId="164"/>
+          <ac:spMkLst>
+            <pc:docMk/>
+            <pc:sldMk cId="1115085580" sldId="257"/>
+            <ac:spMk id="10" creationId="{A855CBA9-2A65-1CC6-43CB-9AAE63E012E0}"/>
+          </ac:spMkLst>
+        </pc:spChg>
+        <pc:spChg chg="add mod">
+          <ac:chgData name="Lubbe, S [slubbe@sun.ac.za]" userId="656cc105-77ab-4b7b-bc17-2448ac205142" providerId="ADAL" clId="{E9BFA566-E94F-41CE-9F87-81DD51602D68}" dt="2025-05-14T10:17:23.883" v="275" actId="164"/>
+          <ac:spMkLst>
+            <pc:docMk/>
+            <pc:sldMk cId="1115085580" sldId="257"/>
+            <ac:spMk id="11" creationId="{BB3C0ADE-DCD6-03EB-BE10-E4B648434439}"/>
+          </ac:spMkLst>
+        </pc:spChg>
+        <pc:spChg chg="add mod">
+          <ac:chgData name="Lubbe, S [slubbe@sun.ac.za]" userId="656cc105-77ab-4b7b-bc17-2448ac205142" providerId="ADAL" clId="{E9BFA566-E94F-41CE-9F87-81DD51602D68}" dt="2025-05-14T10:17:23.883" v="275" actId="164"/>
+          <ac:spMkLst>
+            <pc:docMk/>
+            <pc:sldMk cId="1115085580" sldId="257"/>
+            <ac:spMk id="12" creationId="{0C8C7ED8-F128-B9D2-7BF8-ACBC6F055BDE}"/>
+          </ac:spMkLst>
+        </pc:spChg>
+        <pc:spChg chg="add mod">
+          <ac:chgData name="Lubbe, S [slubbe@sun.ac.za]" userId="656cc105-77ab-4b7b-bc17-2448ac205142" providerId="ADAL" clId="{E9BFA566-E94F-41CE-9F87-81DD51602D68}" dt="2025-05-14T10:17:23.883" v="275" actId="164"/>
+          <ac:spMkLst>
+            <pc:docMk/>
+            <pc:sldMk cId="1115085580" sldId="257"/>
+            <ac:spMk id="13" creationId="{A3D43340-F647-E8E2-864E-2144A4811F32}"/>
+          </ac:spMkLst>
+        </pc:spChg>
+        <pc:grpChg chg="add mod">
+          <ac:chgData name="Lubbe, S [slubbe@sun.ac.za]" userId="656cc105-77ab-4b7b-bc17-2448ac205142" providerId="ADAL" clId="{E9BFA566-E94F-41CE-9F87-81DD51602D68}" dt="2025-05-14T10:14:40.872" v="230" actId="1076"/>
+          <ac:grpSpMkLst>
+            <pc:docMk/>
+            <pc:sldMk cId="1115085580" sldId="257"/>
+            <ac:grpSpMk id="4" creationId="{4CBD770D-E833-6781-6A2D-41B815FF7106}"/>
+          </ac:grpSpMkLst>
+        </pc:grpChg>
+        <pc:grpChg chg="add mod">
+          <ac:chgData name="Lubbe, S [slubbe@sun.ac.za]" userId="656cc105-77ab-4b7b-bc17-2448ac205142" providerId="ADAL" clId="{E9BFA566-E94F-41CE-9F87-81DD51602D68}" dt="2025-05-14T10:17:23.883" v="275" actId="164"/>
+          <ac:grpSpMkLst>
+            <pc:docMk/>
+            <pc:sldMk cId="1115085580" sldId="257"/>
+            <ac:grpSpMk id="14" creationId="{D6D765F0-8B15-82D9-42E2-6EFC3720A422}"/>
+          </ac:grpSpMkLst>
+        </pc:grpChg>
+        <pc:graphicFrameChg chg="add del mod">
+          <ac:chgData name="Lubbe, S [slubbe@sun.ac.za]" userId="656cc105-77ab-4b7b-bc17-2448ac205142" providerId="ADAL" clId="{E9BFA566-E94F-41CE-9F87-81DD51602D68}" dt="2025-05-14T10:14:35.895" v="228"/>
+          <ac:graphicFrameMkLst>
+            <pc:docMk/>
+            <pc:sldMk cId="1115085580" sldId="257"/>
+            <ac:graphicFrameMk id="2" creationId="{E703DEA4-B29C-D4E0-8215-2C1FF7367520}"/>
+          </ac:graphicFrameMkLst>
+        </pc:graphicFrameChg>
+      </pc:sldChg>
     </pc:docChg>
   </pc:docChgLst>
 </pc:chgInfo>
@@ -453,7 +570,7 @@
           <a:p>
             <a:fld id="{67A7CAF5-7A1A-43D9-B5B9-2B502385EA68}" type="datetimeFigureOut">
               <a:rPr lang="en-ZA" smtClean="0"/>
-              <a:t>2025/05/13</a:t>
+              <a:t>2025/05/14</a:t>
             </a:fld>
             <a:endParaRPr lang="en-ZA"/>
           </a:p>
@@ -653,7 +770,7 @@
           <a:p>
             <a:fld id="{67A7CAF5-7A1A-43D9-B5B9-2B502385EA68}" type="datetimeFigureOut">
               <a:rPr lang="en-ZA" smtClean="0"/>
-              <a:t>2025/05/13</a:t>
+              <a:t>2025/05/14</a:t>
             </a:fld>
             <a:endParaRPr lang="en-ZA"/>
           </a:p>
@@ -863,7 +980,7 @@
           <a:p>
             <a:fld id="{67A7CAF5-7A1A-43D9-B5B9-2B502385EA68}" type="datetimeFigureOut">
               <a:rPr lang="en-ZA" smtClean="0"/>
-              <a:t>2025/05/13</a:t>
+              <a:t>2025/05/14</a:t>
             </a:fld>
             <a:endParaRPr lang="en-ZA"/>
           </a:p>
@@ -1063,7 +1180,7 @@
           <a:p>
             <a:fld id="{67A7CAF5-7A1A-43D9-B5B9-2B502385EA68}" type="datetimeFigureOut">
               <a:rPr lang="en-ZA" smtClean="0"/>
-              <a:t>2025/05/13</a:t>
+              <a:t>2025/05/14</a:t>
             </a:fld>
             <a:endParaRPr lang="en-ZA"/>
           </a:p>
@@ -1339,7 +1456,7 @@
           <a:p>
             <a:fld id="{67A7CAF5-7A1A-43D9-B5B9-2B502385EA68}" type="datetimeFigureOut">
               <a:rPr lang="en-ZA" smtClean="0"/>
-              <a:t>2025/05/13</a:t>
+              <a:t>2025/05/14</a:t>
             </a:fld>
             <a:endParaRPr lang="en-ZA"/>
           </a:p>
@@ -1607,7 +1724,7 @@
           <a:p>
             <a:fld id="{67A7CAF5-7A1A-43D9-B5B9-2B502385EA68}" type="datetimeFigureOut">
               <a:rPr lang="en-ZA" smtClean="0"/>
-              <a:t>2025/05/13</a:t>
+              <a:t>2025/05/14</a:t>
             </a:fld>
             <a:endParaRPr lang="en-ZA"/>
           </a:p>
@@ -2022,7 +2139,7 @@
           <a:p>
             <a:fld id="{67A7CAF5-7A1A-43D9-B5B9-2B502385EA68}" type="datetimeFigureOut">
               <a:rPr lang="en-ZA" smtClean="0"/>
-              <a:t>2025/05/13</a:t>
+              <a:t>2025/05/14</a:t>
             </a:fld>
             <a:endParaRPr lang="en-ZA"/>
           </a:p>
@@ -2164,7 +2281,7 @@
           <a:p>
             <a:fld id="{67A7CAF5-7A1A-43D9-B5B9-2B502385EA68}" type="datetimeFigureOut">
               <a:rPr lang="en-ZA" smtClean="0"/>
-              <a:t>2025/05/13</a:t>
+              <a:t>2025/05/14</a:t>
             </a:fld>
             <a:endParaRPr lang="en-ZA"/>
           </a:p>
@@ -2277,7 +2394,7 @@
           <a:p>
             <a:fld id="{67A7CAF5-7A1A-43D9-B5B9-2B502385EA68}" type="datetimeFigureOut">
               <a:rPr lang="en-ZA" smtClean="0"/>
-              <a:t>2025/05/13</a:t>
+              <a:t>2025/05/14</a:t>
             </a:fld>
             <a:endParaRPr lang="en-ZA"/>
           </a:p>
@@ -2590,7 +2707,7 @@
           <a:p>
             <a:fld id="{67A7CAF5-7A1A-43D9-B5B9-2B502385EA68}" type="datetimeFigureOut">
               <a:rPr lang="en-ZA" smtClean="0"/>
-              <a:t>2025/05/13</a:t>
+              <a:t>2025/05/14</a:t>
             </a:fld>
             <a:endParaRPr lang="en-ZA"/>
           </a:p>
@@ -2879,7 +2996,7 @@
           <a:p>
             <a:fld id="{67A7CAF5-7A1A-43D9-B5B9-2B502385EA68}" type="datetimeFigureOut">
               <a:rPr lang="en-ZA" smtClean="0"/>
-              <a:t>2025/05/13</a:t>
+              <a:t>2025/05/14</a:t>
             </a:fld>
             <a:endParaRPr lang="en-ZA"/>
           </a:p>
@@ -3122,7 +3239,7 @@
           <a:p>
             <a:fld id="{67A7CAF5-7A1A-43D9-B5B9-2B502385EA68}" type="datetimeFigureOut">
               <a:rPr lang="en-ZA" smtClean="0"/>
-              <a:t>2025/05/13</a:t>
+              <a:t>2025/05/14</a:t>
             </a:fld>
             <a:endParaRPr lang="en-ZA"/>
           </a:p>
@@ -4198,6 +4315,714 @@
 </p:sld>
 </file>
 
+<file path=ppt/slides/slide2.xml><?xml version="1.0" encoding="utf-8"?>
+<p:sld xmlns:a="http://schemas.openxmlformats.org/drawingml/2006/main" xmlns:r="http://schemas.openxmlformats.org/officeDocument/2006/relationships" xmlns:p="http://schemas.openxmlformats.org/presentationml/2006/main">
+  <p:cSld>
+    <p:spTree>
+      <p:nvGrpSpPr>
+        <p:cNvPr id="1" name=""/>
+        <p:cNvGrpSpPr/>
+        <p:nvPr/>
+      </p:nvGrpSpPr>
+      <p:grpSpPr>
+        <a:xfrm>
+          <a:off x="0" y="0"/>
+          <a:ext cx="0" cy="0"/>
+          <a:chOff x="0" y="0"/>
+          <a:chExt cx="0" cy="0"/>
+        </a:xfrm>
+      </p:grpSpPr>
+      <p:grpSp>
+        <p:nvGrpSpPr>
+          <p:cNvPr id="4" name="Group 3">
+            <a:extLst>
+              <a:ext uri="{FF2B5EF4-FFF2-40B4-BE49-F238E27FC236}">
+                <a16:creationId xmlns:a16="http://schemas.microsoft.com/office/drawing/2014/main" id="{4CBD770D-E833-6781-6A2D-41B815FF7106}"/>
+              </a:ext>
+            </a:extLst>
+          </p:cNvPr>
+          <p:cNvGrpSpPr/>
+          <p:nvPr/>
+        </p:nvGrpSpPr>
+        <p:grpSpPr>
+          <a:xfrm>
+            <a:off x="2592705" y="9556115"/>
+            <a:ext cx="4311650" cy="587375"/>
+            <a:chOff x="0" y="0"/>
+            <a:chExt cx="4311853" cy="587690"/>
+          </a:xfrm>
+        </p:grpSpPr>
+        <p:sp>
+          <p:nvSpPr>
+            <p:cNvPr id="5" name="Left Brace 4">
+              <a:extLst>
+                <a:ext uri="{FF2B5EF4-FFF2-40B4-BE49-F238E27FC236}">
+                  <a16:creationId xmlns:a16="http://schemas.microsoft.com/office/drawing/2014/main" id="{1DBB39C5-67AA-561F-EC37-90BEAC2D7305}"/>
+                </a:ext>
+              </a:extLst>
+            </p:cNvPr>
+            <p:cNvSpPr/>
+            <p:nvPr/>
+          </p:nvSpPr>
+          <p:spPr>
+            <a:xfrm rot="16200000">
+              <a:off x="1247403" y="-1247403"/>
+              <a:ext cx="169492" cy="2664297"/>
+            </a:xfrm>
+            <a:prstGeom prst="leftBrace">
+              <a:avLst>
+                <a:gd name="adj1" fmla="val 8333"/>
+                <a:gd name="adj2" fmla="val 50295"/>
+              </a:avLst>
+            </a:prstGeom>
+            <a:ln>
+              <a:solidFill>
+                <a:schemeClr val="tx1"/>
+              </a:solidFill>
+            </a:ln>
+          </p:spPr>
+          <p:style>
+            <a:lnRef idx="1">
+              <a:schemeClr val="accent1"/>
+            </a:lnRef>
+            <a:fillRef idx="0">
+              <a:schemeClr val="accent1"/>
+            </a:fillRef>
+            <a:effectRef idx="0">
+              <a:schemeClr val="accent1"/>
+            </a:effectRef>
+            <a:fontRef idx="minor">
+              <a:schemeClr val="tx1"/>
+            </a:fontRef>
+          </p:style>
+          <p:txBody>
+            <a:bodyPr rot="0" spcFirstLastPara="0" vert="horz" wrap="square" lIns="91440" tIns="45720" rIns="91440" bIns="45720" numCol="1" spcCol="0" rtlCol="0" fromWordArt="0" anchor="ctr" anchorCtr="0" forceAA="0" compatLnSpc="1">
+              <a:prstTxWarp prst="textNoShape">
+                <a:avLst/>
+              </a:prstTxWarp>
+              <a:noAutofit/>
+            </a:bodyPr>
+            <a:lstStyle/>
+            <a:p>
+              <a:pPr indent="252095" algn="just">
+                <a:lnSpc>
+                  <a:spcPct val="115000"/>
+                </a:lnSpc>
+              </a:pPr>
+              <a:r>
+                <a:rPr lang="en-GB" sz="1200">
+                  <a:effectLst/>
+                  <a:latin typeface="Times New Roman" panose="02020603050405020304" pitchFamily="18" charset="0"/>
+                  <a:ea typeface="Calibri" panose="020F0502020204030204" pitchFamily="34" charset="0"/>
+                  <a:cs typeface="Times New Roman" panose="02020603050405020304" pitchFamily="18" charset="0"/>
+                </a:rPr>
+                <a:t> </a:t>
+              </a:r>
+              <a:endParaRPr lang="en-ZA" sz="1200">
+                <a:effectLst/>
+                <a:latin typeface="Times New Roman" panose="02020603050405020304" pitchFamily="18" charset="0"/>
+                <a:ea typeface="Calibri" panose="020F0502020204030204" pitchFamily="34" charset="0"/>
+                <a:cs typeface="Times New Roman" panose="02020603050405020304" pitchFamily="18" charset="0"/>
+              </a:endParaRPr>
+            </a:p>
+          </p:txBody>
+        </p:sp>
+        <p:sp>
+          <p:nvSpPr>
+            <p:cNvPr id="6" name="TextBox 7">
+              <a:extLst>
+                <a:ext uri="{FF2B5EF4-FFF2-40B4-BE49-F238E27FC236}">
+                  <a16:creationId xmlns:a16="http://schemas.microsoft.com/office/drawing/2014/main" id="{E5D79715-4879-7823-1C8E-753B1DE93A71}"/>
+                </a:ext>
+              </a:extLst>
+            </p:cNvPr>
+            <p:cNvSpPr txBox="1"/>
+            <p:nvPr/>
+          </p:nvSpPr>
+          <p:spPr>
+            <a:xfrm>
+              <a:off x="1080119" y="155049"/>
+              <a:ext cx="1368152" cy="276999"/>
+            </a:xfrm>
+            <a:prstGeom prst="rect">
+              <a:avLst/>
+            </a:prstGeom>
+            <a:noFill/>
+          </p:spPr>
+          <p:txBody>
+            <a:bodyPr wrap="square" rtlCol="0" anchor="ctr">
+              <a:spAutoFit/>
+            </a:bodyPr>
+            <a:lstStyle/>
+            <a:p>
+              <a:r>
+                <a:rPr lang="en-ZA" sz="1200" kern="1200">
+                  <a:solidFill>
+                    <a:srgbClr val="000000"/>
+                  </a:solidFill>
+                  <a:effectLst/>
+                  <a:latin typeface="Calibri" panose="020F0502020204030204" pitchFamily="34" charset="0"/>
+                  <a:ea typeface="Times New Roman" panose="02020603050405020304" pitchFamily="18" charset="0"/>
+                  <a:cs typeface="Times New Roman" panose="02020603050405020304" pitchFamily="18" charset="0"/>
+                </a:rPr>
+                <a:t>Select rows</a:t>
+              </a:r>
+              <a:endParaRPr lang="en-ZA" sz="1200">
+                <a:effectLst/>
+                <a:latin typeface="Times New Roman" panose="02020603050405020304" pitchFamily="18" charset="0"/>
+                <a:ea typeface="Times New Roman" panose="02020603050405020304" pitchFamily="18" charset="0"/>
+              </a:endParaRPr>
+            </a:p>
+          </p:txBody>
+        </p:sp>
+        <p:sp>
+          <p:nvSpPr>
+            <p:cNvPr id="7" name="TextBox 8">
+              <a:extLst>
+                <a:ext uri="{FF2B5EF4-FFF2-40B4-BE49-F238E27FC236}">
+                  <a16:creationId xmlns:a16="http://schemas.microsoft.com/office/drawing/2014/main" id="{966A67BD-2706-9D7D-336C-1E3433FD2BB5}"/>
+                </a:ext>
+              </a:extLst>
+            </p:cNvPr>
+            <p:cNvSpPr txBox="1"/>
+            <p:nvPr/>
+          </p:nvSpPr>
+          <p:spPr>
+            <a:xfrm>
+              <a:off x="2943701" y="126025"/>
+              <a:ext cx="1368152" cy="461665"/>
+            </a:xfrm>
+            <a:prstGeom prst="rect">
+              <a:avLst/>
+            </a:prstGeom>
+            <a:noFill/>
+          </p:spPr>
+          <p:txBody>
+            <a:bodyPr wrap="square" rtlCol="0" anchor="ctr">
+              <a:spAutoFit/>
+            </a:bodyPr>
+            <a:lstStyle/>
+            <a:p>
+              <a:pPr>
+                <a:buNone/>
+              </a:pPr>
+              <a:r>
+                <a:rPr lang="en-ZA" sz="1200" kern="1200">
+                  <a:solidFill>
+                    <a:srgbClr val="000000"/>
+                  </a:solidFill>
+                  <a:effectLst/>
+                  <a:latin typeface="Calibri" panose="020F0502020204030204" pitchFamily="34" charset="0"/>
+                  <a:ea typeface="Times New Roman" panose="02020603050405020304" pitchFamily="18" charset="0"/>
+                  <a:cs typeface="Times New Roman" panose="02020603050405020304" pitchFamily="18" charset="0"/>
+                </a:rPr>
+                <a:t>Select </a:t>
+              </a:r>
+              <a:endParaRPr lang="en-ZA" sz="1200">
+                <a:effectLst/>
+                <a:latin typeface="Times New Roman" panose="02020603050405020304" pitchFamily="18" charset="0"/>
+                <a:ea typeface="Times New Roman" panose="02020603050405020304" pitchFamily="18" charset="0"/>
+              </a:endParaRPr>
+            </a:p>
+            <a:p>
+              <a:r>
+                <a:rPr lang="en-ZA" sz="1200" kern="1200">
+                  <a:solidFill>
+                    <a:srgbClr val="000000"/>
+                  </a:solidFill>
+                  <a:effectLst/>
+                  <a:latin typeface="Calibri" panose="020F0502020204030204" pitchFamily="34" charset="0"/>
+                  <a:ea typeface="Times New Roman" panose="02020603050405020304" pitchFamily="18" charset="0"/>
+                  <a:cs typeface="Times New Roman" panose="02020603050405020304" pitchFamily="18" charset="0"/>
+                </a:rPr>
+                <a:t>column(s)</a:t>
+              </a:r>
+              <a:endParaRPr lang="en-ZA" sz="1200">
+                <a:effectLst/>
+                <a:latin typeface="Times New Roman" panose="02020603050405020304" pitchFamily="18" charset="0"/>
+                <a:ea typeface="Times New Roman" panose="02020603050405020304" pitchFamily="18" charset="0"/>
+              </a:endParaRPr>
+            </a:p>
+          </p:txBody>
+        </p:sp>
+        <p:sp>
+          <p:nvSpPr>
+            <p:cNvPr id="8" name="Left Brace 7">
+              <a:extLst>
+                <a:ext uri="{FF2B5EF4-FFF2-40B4-BE49-F238E27FC236}">
+                  <a16:creationId xmlns:a16="http://schemas.microsoft.com/office/drawing/2014/main" id="{7F0C126C-F861-890D-1F86-41A2A302B215}"/>
+                </a:ext>
+              </a:extLst>
+            </p:cNvPr>
+            <p:cNvSpPr/>
+            <p:nvPr/>
+          </p:nvSpPr>
+          <p:spPr>
+            <a:xfrm rot="16200000">
+              <a:off x="3110558" y="-369884"/>
+              <a:ext cx="156495" cy="905004"/>
+            </a:xfrm>
+            <a:prstGeom prst="leftBrace">
+              <a:avLst>
+                <a:gd name="adj1" fmla="val 8333"/>
+                <a:gd name="adj2" fmla="val 50295"/>
+              </a:avLst>
+            </a:prstGeom>
+            <a:ln>
+              <a:solidFill>
+                <a:schemeClr val="tx1"/>
+              </a:solidFill>
+            </a:ln>
+          </p:spPr>
+          <p:style>
+            <a:lnRef idx="1">
+              <a:schemeClr val="accent1"/>
+            </a:lnRef>
+            <a:fillRef idx="0">
+              <a:schemeClr val="accent1"/>
+            </a:fillRef>
+            <a:effectRef idx="0">
+              <a:schemeClr val="accent1"/>
+            </a:effectRef>
+            <a:fontRef idx="minor">
+              <a:schemeClr val="tx1"/>
+            </a:fontRef>
+          </p:style>
+          <p:txBody>
+            <a:bodyPr rot="0" spcFirstLastPara="0" vert="horz" wrap="square" lIns="91440" tIns="45720" rIns="91440" bIns="45720" numCol="1" spcCol="0" rtlCol="0" fromWordArt="0" anchor="ctr" anchorCtr="0" forceAA="0" compatLnSpc="1">
+              <a:prstTxWarp prst="textNoShape">
+                <a:avLst/>
+              </a:prstTxWarp>
+              <a:noAutofit/>
+            </a:bodyPr>
+            <a:lstStyle/>
+            <a:p>
+              <a:pPr indent="252095" algn="just">
+                <a:lnSpc>
+                  <a:spcPct val="115000"/>
+                </a:lnSpc>
+              </a:pPr>
+              <a:r>
+                <a:rPr lang="en-GB" sz="1200">
+                  <a:effectLst/>
+                  <a:latin typeface="Times New Roman" panose="02020603050405020304" pitchFamily="18" charset="0"/>
+                  <a:ea typeface="Calibri" panose="020F0502020204030204" pitchFamily="34" charset="0"/>
+                  <a:cs typeface="Times New Roman" panose="02020603050405020304" pitchFamily="18" charset="0"/>
+                </a:rPr>
+                <a:t> </a:t>
+              </a:r>
+              <a:endParaRPr lang="en-ZA" sz="1200">
+                <a:effectLst/>
+                <a:latin typeface="Times New Roman" panose="02020603050405020304" pitchFamily="18" charset="0"/>
+                <a:ea typeface="Calibri" panose="020F0502020204030204" pitchFamily="34" charset="0"/>
+                <a:cs typeface="Times New Roman" panose="02020603050405020304" pitchFamily="18" charset="0"/>
+              </a:endParaRPr>
+            </a:p>
+          </p:txBody>
+        </p:sp>
+      </p:grpSp>
+      <p:sp>
+        <p:nvSpPr>
+          <p:cNvPr id="9" name="Rectangle 11">
+            <a:extLst>
+              <a:ext uri="{FF2B5EF4-FFF2-40B4-BE49-F238E27FC236}">
+                <a16:creationId xmlns:a16="http://schemas.microsoft.com/office/drawing/2014/main" id="{EAB0E944-86ED-2960-6AE2-2E9E7F0C7195}"/>
+              </a:ext>
+            </a:extLst>
+          </p:cNvPr>
+          <p:cNvSpPr>
+            <a:spLocks noChangeArrowheads="1"/>
+          </p:cNvSpPr>
+          <p:nvPr/>
+        </p:nvSpPr>
+        <p:spPr bwMode="auto">
+          <a:xfrm>
+            <a:off x="731520" y="2672080"/>
+            <a:ext cx="12192000" cy="0"/>
+          </a:xfrm>
+          <a:prstGeom prst="rect">
+            <a:avLst/>
+          </a:prstGeom>
+          <a:noFill/>
+          <a:ln>
+            <a:noFill/>
+          </a:ln>
+          <a:effectLst/>
+          <a:extLst>
+            <a:ext uri="{909E8E84-426E-40DD-AFC4-6F175D3DCCD1}">
+              <a14:hiddenFill xmlns:a14="http://schemas.microsoft.com/office/drawing/2010/main">
+                <a:solidFill>
+                  <a:schemeClr val="accent1"/>
+                </a:solidFill>
+              </a14:hiddenFill>
+            </a:ext>
+            <a:ext uri="{91240B29-F687-4F45-9708-019B960494DF}">
+              <a14:hiddenLine xmlns:a14="http://schemas.microsoft.com/office/drawing/2010/main" w="9525">
+                <a:solidFill>
+                  <a:schemeClr val="tx1"/>
+                </a:solidFill>
+                <a:miter lim="800000"/>
+                <a:headEnd/>
+                <a:tailEnd/>
+              </a14:hiddenLine>
+            </a:ext>
+            <a:ext uri="{AF507438-7753-43E0-B8FC-AC1667EBCBE1}">
+              <a14:hiddenEffects xmlns:a14="http://schemas.microsoft.com/office/drawing/2010/main">
+                <a:effectLst>
+                  <a:outerShdw dist="35921" dir="2700000" algn="ctr" rotWithShape="0">
+                    <a:schemeClr val="bg2"/>
+                  </a:outerShdw>
+                </a:effectLst>
+              </a14:hiddenEffects>
+            </a:ext>
+          </a:extLst>
+        </p:spPr>
+        <p:txBody>
+          <a:bodyPr vert="horz" wrap="none" lIns="91440" tIns="45720" rIns="91440" bIns="45720" numCol="1" anchor="ctr" anchorCtr="0" compatLnSpc="1">
+            <a:prstTxWarp prst="textNoShape">
+              <a:avLst/>
+            </a:prstTxWarp>
+            <a:spAutoFit/>
+          </a:bodyPr>
+          <a:lstStyle/>
+          <a:p>
+            <a:endParaRPr lang="en-ZA"/>
+          </a:p>
+        </p:txBody>
+      </p:sp>
+      <p:grpSp>
+        <p:nvGrpSpPr>
+          <p:cNvPr id="14" name="Group 13">
+            <a:extLst>
+              <a:ext uri="{FF2B5EF4-FFF2-40B4-BE49-F238E27FC236}">
+                <a16:creationId xmlns:a16="http://schemas.microsoft.com/office/drawing/2014/main" id="{D6D765F0-8B15-82D9-42E2-6EFC3720A422}"/>
+              </a:ext>
+            </a:extLst>
+          </p:cNvPr>
+          <p:cNvGrpSpPr/>
+          <p:nvPr/>
+        </p:nvGrpSpPr>
+        <p:grpSpPr>
+          <a:xfrm>
+            <a:off x="731520" y="2120314"/>
+            <a:ext cx="7548880" cy="1131427"/>
+            <a:chOff x="731520" y="2120314"/>
+            <a:chExt cx="7548880" cy="1131427"/>
+          </a:xfrm>
+        </p:grpSpPr>
+        <p:sp>
+          <p:nvSpPr>
+            <p:cNvPr id="3" name="Rectangle 6">
+              <a:extLst>
+                <a:ext uri="{FF2B5EF4-FFF2-40B4-BE49-F238E27FC236}">
+                  <a16:creationId xmlns:a16="http://schemas.microsoft.com/office/drawing/2014/main" id="{8A7E4A9A-DA7E-19C6-1069-FBBA6D1D6E04}"/>
+                </a:ext>
+              </a:extLst>
+            </p:cNvPr>
+            <p:cNvSpPr>
+              <a:spLocks noChangeArrowheads="1"/>
+            </p:cNvSpPr>
+            <p:nvPr/>
+          </p:nvSpPr>
+          <p:spPr bwMode="auto">
+            <a:xfrm>
+              <a:off x="731520" y="2120314"/>
+              <a:ext cx="7548880" cy="646331"/>
+            </a:xfrm>
+            <a:prstGeom prst="rect">
+              <a:avLst/>
+            </a:prstGeom>
+            <a:noFill/>
+            <a:ln>
+              <a:noFill/>
+            </a:ln>
+            <a:effectLst/>
+            <a:extLst>
+              <a:ext uri="{909E8E84-426E-40DD-AFC4-6F175D3DCCD1}">
+                <a14:hiddenFill xmlns:a14="http://schemas.microsoft.com/office/drawing/2010/main">
+                  <a:solidFill>
+                    <a:schemeClr val="accent1"/>
+                  </a:solidFill>
+                </a14:hiddenFill>
+              </a:ext>
+              <a:ext uri="{91240B29-F687-4F45-9708-019B960494DF}">
+                <a14:hiddenLine xmlns:a14="http://schemas.microsoft.com/office/drawing/2010/main" w="9525">
+                  <a:solidFill>
+                    <a:schemeClr val="tx1"/>
+                  </a:solidFill>
+                  <a:miter lim="800000"/>
+                  <a:headEnd/>
+                  <a:tailEnd/>
+                </a14:hiddenLine>
+              </a:ext>
+              <a:ext uri="{AF507438-7753-43E0-B8FC-AC1667EBCBE1}">
+                <a14:hiddenEffects xmlns:a14="http://schemas.microsoft.com/office/drawing/2010/main">
+                  <a:effectLst>
+                    <a:outerShdw dist="35921" dir="2700000" algn="ctr" rotWithShape="0">
+                      <a:schemeClr val="bg2"/>
+                    </a:outerShdw>
+                  </a:effectLst>
+                </a14:hiddenEffects>
+              </a:ext>
+            </a:extLst>
+          </p:spPr>
+          <p:txBody>
+            <a:bodyPr vert="horz" wrap="square" lIns="91440" tIns="45720" rIns="91440" bIns="45720" numCol="1" anchor="ctr" anchorCtr="0" compatLnSpc="1">
+              <a:prstTxWarp prst="textNoShape">
+                <a:avLst/>
+              </a:prstTxWarp>
+              <a:spAutoFit/>
+            </a:bodyPr>
+            <a:lstStyle/>
+            <a:p>
+              <a:pPr marL="0" marR="0" lvl="0" indent="0" algn="l" defTabSz="914400" rtl="0" eaLnBrk="0" fontAlgn="base" latinLnBrk="0" hangingPunct="0">
+                <a:lnSpc>
+                  <a:spcPct val="100000"/>
+                </a:lnSpc>
+                <a:spcBef>
+                  <a:spcPct val="0"/>
+                </a:spcBef>
+                <a:spcAft>
+                  <a:spcPct val="0"/>
+                </a:spcAft>
+                <a:buClrTx/>
+                <a:buSzTx/>
+                <a:buFontTx/>
+                <a:buNone/>
+                <a:tabLst/>
+              </a:pPr>
+              <a:r>
+                <a:rPr kumimoji="0" lang="en-US" altLang="en-US" b="0" i="0" u="none" strike="noStrike" cap="none" normalizeH="0" baseline="0" dirty="0">
+                  <a:ln>
+                    <a:noFill/>
+                  </a:ln>
+                  <a:solidFill>
+                    <a:schemeClr val="tx1"/>
+                  </a:solidFill>
+                  <a:effectLst/>
+                  <a:latin typeface="Courier New" panose="02070309020205020404" pitchFamily="49" charset="0"/>
+                  <a:ea typeface="Times New Roman" panose="02020603050405020304" pitchFamily="18" charset="0"/>
+                  <a:cs typeface="Courier New" panose="02070309020205020404" pitchFamily="49" charset="0"/>
+                </a:rPr>
+                <a:t>&gt; state.x77[state.x77[ , "Area"] &gt; 80000 , "Income" ]</a:t>
+              </a:r>
+              <a:endParaRPr kumimoji="0" lang="en-ZA" altLang="en-US" b="0" i="0" u="none" strike="noStrike" cap="none" normalizeH="0" baseline="0" dirty="0">
+                <a:ln>
+                  <a:noFill/>
+                </a:ln>
+                <a:solidFill>
+                  <a:schemeClr val="tx1"/>
+                </a:solidFill>
+                <a:effectLst/>
+                <a:ea typeface="Times New Roman" panose="02020603050405020304" pitchFamily="18" charset="0"/>
+              </a:endParaRPr>
+            </a:p>
+            <a:p>
+              <a:pPr marL="0" marR="0" lvl="0" indent="0" algn="l" defTabSz="914400" rtl="0" eaLnBrk="0" fontAlgn="base" latinLnBrk="0" hangingPunct="0">
+                <a:lnSpc>
+                  <a:spcPct val="100000"/>
+                </a:lnSpc>
+                <a:spcBef>
+                  <a:spcPct val="0"/>
+                </a:spcBef>
+                <a:spcAft>
+                  <a:spcPct val="0"/>
+                </a:spcAft>
+                <a:buClrTx/>
+                <a:buSzTx/>
+                <a:buFontTx/>
+                <a:buNone/>
+                <a:tabLst/>
+              </a:pPr>
+              <a:endParaRPr kumimoji="0" lang="en-ZA" altLang="en-US" b="0" i="0" u="none" strike="noStrike" cap="none" normalizeH="0" baseline="0" dirty="0">
+                <a:ln>
+                  <a:noFill/>
+                </a:ln>
+                <a:solidFill>
+                  <a:schemeClr val="tx1"/>
+                </a:solidFill>
+                <a:effectLst/>
+                <a:latin typeface="Arial" panose="020B0604020202020204" pitchFamily="34" charset="0"/>
+              </a:endParaRPr>
+            </a:p>
+          </p:txBody>
+        </p:sp>
+        <p:sp>
+          <p:nvSpPr>
+            <p:cNvPr id="10" name="Left Brace 9">
+              <a:extLst>
+                <a:ext uri="{FF2B5EF4-FFF2-40B4-BE49-F238E27FC236}">
+                  <a16:creationId xmlns:a16="http://schemas.microsoft.com/office/drawing/2014/main" id="{A855CBA9-2A65-1CC6-43CB-9AAE63E012E0}"/>
+                </a:ext>
+              </a:extLst>
+            </p:cNvPr>
+            <p:cNvSpPr/>
+            <p:nvPr/>
+          </p:nvSpPr>
+          <p:spPr>
+            <a:xfrm rot="16200000">
+              <a:off x="4238706" y="676943"/>
+              <a:ext cx="228602" cy="3761671"/>
+            </a:xfrm>
+            <a:prstGeom prst="leftBrace">
+              <a:avLst/>
+            </a:prstGeom>
+          </p:spPr>
+          <p:style>
+            <a:lnRef idx="2">
+              <a:schemeClr val="dk1"/>
+            </a:lnRef>
+            <a:fillRef idx="0">
+              <a:schemeClr val="dk1"/>
+            </a:fillRef>
+            <a:effectRef idx="1">
+              <a:schemeClr val="dk1"/>
+            </a:effectRef>
+            <a:fontRef idx="minor">
+              <a:schemeClr val="tx1"/>
+            </a:fontRef>
+          </p:style>
+          <p:txBody>
+            <a:bodyPr rtlCol="0" anchor="ctr"/>
+            <a:lstStyle/>
+            <a:p>
+              <a:pPr algn="ctr"/>
+              <a:endParaRPr lang="en-ZA"/>
+            </a:p>
+          </p:txBody>
+        </p:sp>
+        <p:sp>
+          <p:nvSpPr>
+            <p:cNvPr id="11" name="Left Brace 10">
+              <a:extLst>
+                <a:ext uri="{FF2B5EF4-FFF2-40B4-BE49-F238E27FC236}">
+                  <a16:creationId xmlns:a16="http://schemas.microsoft.com/office/drawing/2014/main" id="{BB3C0ADE-DCD6-03EB-BE10-E4B648434439}"/>
+                </a:ext>
+              </a:extLst>
+            </p:cNvPr>
+            <p:cNvSpPr/>
+            <p:nvPr/>
+          </p:nvSpPr>
+          <p:spPr>
+            <a:xfrm rot="16200000">
+              <a:off x="7100965" y="1949807"/>
+              <a:ext cx="228568" cy="1215909"/>
+            </a:xfrm>
+            <a:prstGeom prst="leftBrace">
+              <a:avLst/>
+            </a:prstGeom>
+          </p:spPr>
+          <p:style>
+            <a:lnRef idx="2">
+              <a:schemeClr val="dk1"/>
+            </a:lnRef>
+            <a:fillRef idx="0">
+              <a:schemeClr val="dk1"/>
+            </a:fillRef>
+            <a:effectRef idx="1">
+              <a:schemeClr val="dk1"/>
+            </a:effectRef>
+            <a:fontRef idx="minor">
+              <a:schemeClr val="tx1"/>
+            </a:fontRef>
+          </p:style>
+          <p:txBody>
+            <a:bodyPr rtlCol="0" anchor="ctr"/>
+            <a:lstStyle/>
+            <a:p>
+              <a:pPr algn="ctr"/>
+              <a:endParaRPr lang="en-ZA"/>
+            </a:p>
+          </p:txBody>
+        </p:sp>
+        <p:sp>
+          <p:nvSpPr>
+            <p:cNvPr id="12" name="TextBox 11">
+              <a:extLst>
+                <a:ext uri="{FF2B5EF4-FFF2-40B4-BE49-F238E27FC236}">
+                  <a16:creationId xmlns:a16="http://schemas.microsoft.com/office/drawing/2014/main" id="{0C8C7ED8-F128-B9D2-7BF8-ACBC6F055BDE}"/>
+                </a:ext>
+              </a:extLst>
+            </p:cNvPr>
+            <p:cNvSpPr txBox="1"/>
+            <p:nvPr/>
+          </p:nvSpPr>
+          <p:spPr>
+            <a:xfrm>
+              <a:off x="3743407" y="2746325"/>
+              <a:ext cx="1219200" cy="338554"/>
+            </a:xfrm>
+            <a:prstGeom prst="rect">
+              <a:avLst/>
+            </a:prstGeom>
+            <a:noFill/>
+          </p:spPr>
+          <p:txBody>
+            <a:bodyPr wrap="square" rtlCol="0">
+              <a:spAutoFit/>
+            </a:bodyPr>
+            <a:lstStyle/>
+            <a:p>
+              <a:pPr algn="ctr"/>
+              <a:r>
+                <a:rPr lang="en-GB" sz="1600" dirty="0"/>
+                <a:t>Select rows</a:t>
+              </a:r>
+              <a:endParaRPr lang="en-ZA" sz="1600" dirty="0"/>
+            </a:p>
+          </p:txBody>
+        </p:sp>
+        <p:sp>
+          <p:nvSpPr>
+            <p:cNvPr id="13" name="TextBox 12">
+              <a:extLst>
+                <a:ext uri="{FF2B5EF4-FFF2-40B4-BE49-F238E27FC236}">
+                  <a16:creationId xmlns:a16="http://schemas.microsoft.com/office/drawing/2014/main" id="{A3D43340-F647-E8E2-864E-2144A4811F32}"/>
+                </a:ext>
+              </a:extLst>
+            </p:cNvPr>
+            <p:cNvSpPr txBox="1"/>
+            <p:nvPr/>
+          </p:nvSpPr>
+          <p:spPr>
+            <a:xfrm>
+              <a:off x="6607294" y="2666966"/>
+              <a:ext cx="1219200" cy="584775"/>
+            </a:xfrm>
+            <a:prstGeom prst="rect">
+              <a:avLst/>
+            </a:prstGeom>
+            <a:noFill/>
+          </p:spPr>
+          <p:txBody>
+            <a:bodyPr wrap="square" rtlCol="0">
+              <a:spAutoFit/>
+            </a:bodyPr>
+            <a:lstStyle/>
+            <a:p>
+              <a:pPr algn="ctr"/>
+              <a:r>
+                <a:rPr lang="en-GB" sz="1600" dirty="0"/>
+                <a:t>Select column(s)</a:t>
+              </a:r>
+              <a:endParaRPr lang="en-ZA" sz="1600" dirty="0"/>
+            </a:p>
+          </p:txBody>
+        </p:sp>
+      </p:grpSp>
+    </p:spTree>
+    <p:extLst>
+      <p:ext uri="{BB962C8B-B14F-4D97-AF65-F5344CB8AC3E}">
+        <p14:creationId xmlns:p14="http://schemas.microsoft.com/office/powerpoint/2010/main" val="1115085580"/>
+      </p:ext>
+    </p:extLst>
+  </p:cSld>
+  <p:clrMapOvr>
+    <a:masterClrMapping/>
+  </p:clrMapOvr>
+</p:sld>
+</file>
+
 <file path=ppt/theme/theme1.xml><?xml version="1.0" encoding="utf-8"?>
 <a:theme xmlns:a="http://schemas.openxmlformats.org/drawingml/2006/main" name="Office Theme">
   <a:themeElements>

</xml_diff>

<commit_message>
revert to prev Ch6
</commit_message>
<xml_diff>
--- a/figures.pptx
+++ b/figures.pptx
@@ -7,6 +7,7 @@
   <p:sldIdLst>
     <p:sldId id="256" r:id="rId2"/>
     <p:sldId id="257" r:id="rId3"/>
+    <p:sldId id="258" r:id="rId4"/>
   </p:sldIdLst>
   <p:sldSz cx="12192000" cy="6858000"/>
   <p:notesSz cx="6858000" cy="9144000"/>
@@ -116,7 +117,7 @@
 <file path=ppt/revisionInfo.xml><?xml version="1.0" encoding="utf-8"?>
 <p1510:revInfo xmlns:a="http://schemas.openxmlformats.org/drawingml/2006/main" xmlns:r="http://schemas.openxmlformats.org/officeDocument/2006/relationships" xmlns:p1510="http://schemas.microsoft.com/office/powerpoint/2015/10/main">
   <p1510:revLst>
-    <p1510:client id="{E9BFA566-E94F-41CE-9F87-81DD51602D68}" v="26" dt="2025-05-14T10:17:23.883"/>
+    <p1510:client id="{E9BFA566-E94F-41CE-9F87-81DD51602D68}" v="169" dt="2025-05-15T14:52:57.823"/>
   </p1510:revLst>
 </p1510:revInfo>
 </file>
@@ -125,8 +126,8 @@
 <pc:chgInfo xmlns:a="http://schemas.openxmlformats.org/drawingml/2006/main" xmlns:r="http://schemas.openxmlformats.org/officeDocument/2006/relationships" xmlns:ac="http://schemas.microsoft.com/office/drawing/2013/main/command" xmlns:pc="http://schemas.microsoft.com/office/powerpoint/2013/main/command">
   <pc:docChgLst>
     <pc:chgData name="Lubbe, S [slubbe@sun.ac.za]" userId="656cc105-77ab-4b7b-bc17-2448ac205142" providerId="ADAL" clId="{E9BFA566-E94F-41CE-9F87-81DD51602D68}"/>
-    <pc:docChg chg="custSel addSld modSld">
-      <pc:chgData name="Lubbe, S [slubbe@sun.ac.za]" userId="656cc105-77ab-4b7b-bc17-2448ac205142" providerId="ADAL" clId="{E9BFA566-E94F-41CE-9F87-81DD51602D68}" dt="2025-05-14T10:17:23.883" v="275" actId="164"/>
+    <pc:docChg chg="undo custSel addSld modSld sldOrd">
+      <pc:chgData name="Lubbe, S [slubbe@sun.ac.za]" userId="656cc105-77ab-4b7b-bc17-2448ac205142" providerId="ADAL" clId="{E9BFA566-E94F-41CE-9F87-81DD51602D68}" dt="2025-05-15T14:52:57.823" v="639" actId="164"/>
       <pc:docMkLst>
         <pc:docMk/>
       </pc:docMkLst>
@@ -136,22 +137,6 @@
           <pc:docMk/>
           <pc:sldMk cId="339298671" sldId="256"/>
         </pc:sldMkLst>
-        <pc:spChg chg="del">
-          <ac:chgData name="Lubbe, S [slubbe@sun.ac.za]" userId="656cc105-77ab-4b7b-bc17-2448ac205142" providerId="ADAL" clId="{E9BFA566-E94F-41CE-9F87-81DD51602D68}" dt="2025-05-13T14:41:36.068" v="0" actId="700"/>
-          <ac:spMkLst>
-            <pc:docMk/>
-            <pc:sldMk cId="339298671" sldId="256"/>
-            <ac:spMk id="2" creationId="{80B9D05B-30CE-33E6-F8F7-A9BED3497A2C}"/>
-          </ac:spMkLst>
-        </pc:spChg>
-        <pc:spChg chg="del">
-          <ac:chgData name="Lubbe, S [slubbe@sun.ac.za]" userId="656cc105-77ab-4b7b-bc17-2448ac205142" providerId="ADAL" clId="{E9BFA566-E94F-41CE-9F87-81DD51602D68}" dt="2025-05-13T14:41:36.068" v="0" actId="700"/>
-          <ac:spMkLst>
-            <pc:docMk/>
-            <pc:sldMk cId="339298671" sldId="256"/>
-            <ac:spMk id="3" creationId="{47BF03B2-3B6E-1943-6B4E-CF1F4C36CFF3}"/>
-          </ac:spMkLst>
-        </pc:spChg>
         <pc:spChg chg="add mod">
           <ac:chgData name="Lubbe, S [slubbe@sun.ac.za]" userId="656cc105-77ab-4b7b-bc17-2448ac205142" providerId="ADAL" clId="{E9BFA566-E94F-41CE-9F87-81DD51602D68}" dt="2025-05-13T14:50:43.970" v="224" actId="164"/>
           <ac:spMkLst>
@@ -174,22 +159,6 @@
             <pc:docMk/>
             <pc:sldMk cId="339298671" sldId="256"/>
             <ac:spMk id="6" creationId="{2E056935-2EC9-DF40-0E0B-E4306DF68143}"/>
-          </ac:spMkLst>
-        </pc:spChg>
-        <pc:spChg chg="add mod">
-          <ac:chgData name="Lubbe, S [slubbe@sun.ac.za]" userId="656cc105-77ab-4b7b-bc17-2448ac205142" providerId="ADAL" clId="{E9BFA566-E94F-41CE-9F87-81DD51602D68}" dt="2025-05-13T14:43:22.226" v="30"/>
-          <ac:spMkLst>
-            <pc:docMk/>
-            <pc:sldMk cId="339298671" sldId="256"/>
-            <ac:spMk id="7" creationId="{96078B44-4223-6BB2-562C-5676091AE952}"/>
-          </ac:spMkLst>
-        </pc:spChg>
-        <pc:spChg chg="add mod">
-          <ac:chgData name="Lubbe, S [slubbe@sun.ac.za]" userId="656cc105-77ab-4b7b-bc17-2448ac205142" providerId="ADAL" clId="{E9BFA566-E94F-41CE-9F87-81DD51602D68}" dt="2025-05-13T14:43:22.226" v="30"/>
-          <ac:spMkLst>
-            <pc:docMk/>
-            <pc:sldMk cId="339298671" sldId="256"/>
-            <ac:spMk id="8" creationId="{0D71329D-1B99-8F43-FD60-87DAFE26B799}"/>
           </ac:spMkLst>
         </pc:spChg>
         <pc:spChg chg="add mod">
@@ -230,22 +199,6 @@
             <pc:docMk/>
             <pc:sldMk cId="339298671" sldId="256"/>
             <ac:spMk id="18" creationId="{E4506291-0B29-E8E1-4760-20F6E31F1736}"/>
-          </ac:spMkLst>
-        </pc:spChg>
-        <pc:spChg chg="add mod">
-          <ac:chgData name="Lubbe, S [slubbe@sun.ac.za]" userId="656cc105-77ab-4b7b-bc17-2448ac205142" providerId="ADAL" clId="{E9BFA566-E94F-41CE-9F87-81DD51602D68}" dt="2025-05-13T14:47:54.016" v="164"/>
-          <ac:spMkLst>
-            <pc:docMk/>
-            <pc:sldMk cId="339298671" sldId="256"/>
-            <ac:spMk id="19" creationId="{C4C2466C-89EC-35E5-D7BA-120AD5ECE0E6}"/>
-          </ac:spMkLst>
-        </pc:spChg>
-        <pc:spChg chg="add mod">
-          <ac:chgData name="Lubbe, S [slubbe@sun.ac.za]" userId="656cc105-77ab-4b7b-bc17-2448ac205142" providerId="ADAL" clId="{E9BFA566-E94F-41CE-9F87-81DD51602D68}" dt="2025-05-13T14:47:54.016" v="164"/>
-          <ac:spMkLst>
-            <pc:docMk/>
-            <pc:sldMk cId="339298671" sldId="256"/>
-            <ac:spMk id="20" creationId="{E7257FE4-086C-A04C-3339-1AC447BA07DF}"/>
           </ac:spMkLst>
         </pc:spChg>
         <pc:spChg chg="add mod">
@@ -416,6 +369,221 @@
           </ac:graphicFrameMkLst>
         </pc:graphicFrameChg>
       </pc:sldChg>
+      <pc:sldChg chg="addSp delSp modSp new mod ord">
+        <pc:chgData name="Lubbe, S [slubbe@sun.ac.za]" userId="656cc105-77ab-4b7b-bc17-2448ac205142" providerId="ADAL" clId="{E9BFA566-E94F-41CE-9F87-81DD51602D68}" dt="2025-05-15T14:52:57.823" v="639" actId="164"/>
+        <pc:sldMkLst>
+          <pc:docMk/>
+          <pc:sldMk cId="4015766007" sldId="258"/>
+        </pc:sldMkLst>
+        <pc:spChg chg="add mod">
+          <ac:chgData name="Lubbe, S [slubbe@sun.ac.za]" userId="656cc105-77ab-4b7b-bc17-2448ac205142" providerId="ADAL" clId="{E9BFA566-E94F-41CE-9F87-81DD51602D68}" dt="2025-05-15T14:37:00.827" v="313" actId="1035"/>
+          <ac:spMkLst>
+            <pc:docMk/>
+            <pc:sldMk cId="4015766007" sldId="258"/>
+            <ac:spMk id="5" creationId="{A647F9E7-3ED4-C767-7510-EE30636D906D}"/>
+          </ac:spMkLst>
+        </pc:spChg>
+        <pc:spChg chg="add mod">
+          <ac:chgData name="Lubbe, S [slubbe@sun.ac.za]" userId="656cc105-77ab-4b7b-bc17-2448ac205142" providerId="ADAL" clId="{E9BFA566-E94F-41CE-9F87-81DD51602D68}" dt="2025-05-15T14:37:51.657" v="327" actId="1037"/>
+          <ac:spMkLst>
+            <pc:docMk/>
+            <pc:sldMk cId="4015766007" sldId="258"/>
+            <ac:spMk id="6" creationId="{63B059A5-F9D4-EB35-537A-5ED098248E75}"/>
+          </ac:spMkLst>
+        </pc:spChg>
+        <pc:spChg chg="add mod">
+          <ac:chgData name="Lubbe, S [slubbe@sun.ac.za]" userId="656cc105-77ab-4b7b-bc17-2448ac205142" providerId="ADAL" clId="{E9BFA566-E94F-41CE-9F87-81DD51602D68}" dt="2025-05-15T14:37:45.835" v="323" actId="1036"/>
+          <ac:spMkLst>
+            <pc:docMk/>
+            <pc:sldMk cId="4015766007" sldId="258"/>
+            <ac:spMk id="7" creationId="{B92490E6-0B0B-DD0C-C5F6-37D626142C7C}"/>
+          </ac:spMkLst>
+        </pc:spChg>
+        <pc:spChg chg="add mod">
+          <ac:chgData name="Lubbe, S [slubbe@sun.ac.za]" userId="656cc105-77ab-4b7b-bc17-2448ac205142" providerId="ADAL" clId="{E9BFA566-E94F-41CE-9F87-81DD51602D68}" dt="2025-05-15T14:38:21.324" v="330" actId="1076"/>
+          <ac:spMkLst>
+            <pc:docMk/>
+            <pc:sldMk cId="4015766007" sldId="258"/>
+            <ac:spMk id="8" creationId="{B22B3E43-26B2-B498-43D3-DCCD389BFF96}"/>
+          </ac:spMkLst>
+        </pc:spChg>
+        <pc:spChg chg="add mod">
+          <ac:chgData name="Lubbe, S [slubbe@sun.ac.za]" userId="656cc105-77ab-4b7b-bc17-2448ac205142" providerId="ADAL" clId="{E9BFA566-E94F-41CE-9F87-81DD51602D68}" dt="2025-05-15T14:40:42.753" v="340" actId="1036"/>
+          <ac:spMkLst>
+            <pc:docMk/>
+            <pc:sldMk cId="4015766007" sldId="258"/>
+            <ac:spMk id="11" creationId="{B83B6F67-1D55-41F6-07A3-4A488E9E679A}"/>
+          </ac:spMkLst>
+        </pc:spChg>
+        <pc:spChg chg="add mod">
+          <ac:chgData name="Lubbe, S [slubbe@sun.ac.za]" userId="656cc105-77ab-4b7b-bc17-2448ac205142" providerId="ADAL" clId="{E9BFA566-E94F-41CE-9F87-81DD51602D68}" dt="2025-05-15T14:52:57.823" v="639" actId="164"/>
+          <ac:spMkLst>
+            <pc:docMk/>
+            <pc:sldMk cId="4015766007" sldId="258"/>
+            <ac:spMk id="12" creationId="{207AFEAC-2040-9506-1132-7B2BA84BA72D}"/>
+          </ac:spMkLst>
+        </pc:spChg>
+        <pc:spChg chg="add mod">
+          <ac:chgData name="Lubbe, S [slubbe@sun.ac.za]" userId="656cc105-77ab-4b7b-bc17-2448ac205142" providerId="ADAL" clId="{E9BFA566-E94F-41CE-9F87-81DD51602D68}" dt="2025-05-15T14:52:57.823" v="639" actId="164"/>
+          <ac:spMkLst>
+            <pc:docMk/>
+            <pc:sldMk cId="4015766007" sldId="258"/>
+            <ac:spMk id="13" creationId="{A001E0B1-F031-5974-D856-96CBE9488D30}"/>
+          </ac:spMkLst>
+        </pc:spChg>
+        <pc:spChg chg="add mod">
+          <ac:chgData name="Lubbe, S [slubbe@sun.ac.za]" userId="656cc105-77ab-4b7b-bc17-2448ac205142" providerId="ADAL" clId="{E9BFA566-E94F-41CE-9F87-81DD51602D68}" dt="2025-05-15T14:40:42.753" v="340" actId="1036"/>
+          <ac:spMkLst>
+            <pc:docMk/>
+            <pc:sldMk cId="4015766007" sldId="258"/>
+            <ac:spMk id="14" creationId="{58F56291-F33A-24BB-B31F-389681A5979C}"/>
+          </ac:spMkLst>
+        </pc:spChg>
+        <pc:spChg chg="add mod">
+          <ac:chgData name="Lubbe, S [slubbe@sun.ac.za]" userId="656cc105-77ab-4b7b-bc17-2448ac205142" providerId="ADAL" clId="{E9BFA566-E94F-41CE-9F87-81DD51602D68}" dt="2025-05-15T14:52:57.823" v="639" actId="164"/>
+          <ac:spMkLst>
+            <pc:docMk/>
+            <pc:sldMk cId="4015766007" sldId="258"/>
+            <ac:spMk id="26" creationId="{161A8BE8-B453-EF2D-8E82-8630AA72006C}"/>
+          </ac:spMkLst>
+        </pc:spChg>
+        <pc:spChg chg="add mod">
+          <ac:chgData name="Lubbe, S [slubbe@sun.ac.za]" userId="656cc105-77ab-4b7b-bc17-2448ac205142" providerId="ADAL" clId="{E9BFA566-E94F-41CE-9F87-81DD51602D68}" dt="2025-05-15T14:52:57.823" v="639" actId="164"/>
+          <ac:spMkLst>
+            <pc:docMk/>
+            <pc:sldMk cId="4015766007" sldId="258"/>
+            <ac:spMk id="27" creationId="{B6023A09-77D8-E420-1E25-FD576C4A4714}"/>
+          </ac:spMkLst>
+        </pc:spChg>
+        <pc:spChg chg="add mod">
+          <ac:chgData name="Lubbe, S [slubbe@sun.ac.za]" userId="656cc105-77ab-4b7b-bc17-2448ac205142" providerId="ADAL" clId="{E9BFA566-E94F-41CE-9F87-81DD51602D68}" dt="2025-05-15T14:52:57.823" v="639" actId="164"/>
+          <ac:spMkLst>
+            <pc:docMk/>
+            <pc:sldMk cId="4015766007" sldId="258"/>
+            <ac:spMk id="28" creationId="{D31068F8-9588-E52E-D662-D1C7AC5AA032}"/>
+          </ac:spMkLst>
+        </pc:spChg>
+        <pc:spChg chg="add mod">
+          <ac:chgData name="Lubbe, S [slubbe@sun.ac.za]" userId="656cc105-77ab-4b7b-bc17-2448ac205142" providerId="ADAL" clId="{E9BFA566-E94F-41CE-9F87-81DD51602D68}" dt="2025-05-15T14:52:57.823" v="639" actId="164"/>
+          <ac:spMkLst>
+            <pc:docMk/>
+            <pc:sldMk cId="4015766007" sldId="258"/>
+            <ac:spMk id="31" creationId="{EF9FFD5B-DADA-9557-CC1E-9ABD795F7AA9}"/>
+          </ac:spMkLst>
+        </pc:spChg>
+        <pc:spChg chg="add mod">
+          <ac:chgData name="Lubbe, S [slubbe@sun.ac.za]" userId="656cc105-77ab-4b7b-bc17-2448ac205142" providerId="ADAL" clId="{E9BFA566-E94F-41CE-9F87-81DD51602D68}" dt="2025-05-15T14:46:09.564" v="400" actId="1076"/>
+          <ac:spMkLst>
+            <pc:docMk/>
+            <pc:sldMk cId="4015766007" sldId="258"/>
+            <ac:spMk id="32" creationId="{B71BB3F2-5F4F-2481-DFBD-06F173C29A3D}"/>
+          </ac:spMkLst>
+        </pc:spChg>
+        <pc:spChg chg="add mod">
+          <ac:chgData name="Lubbe, S [slubbe@sun.ac.za]" userId="656cc105-77ab-4b7b-bc17-2448ac205142" providerId="ADAL" clId="{E9BFA566-E94F-41CE-9F87-81DD51602D68}" dt="2025-05-15T14:47:07.026" v="425" actId="1038"/>
+          <ac:spMkLst>
+            <pc:docMk/>
+            <pc:sldMk cId="4015766007" sldId="258"/>
+            <ac:spMk id="33" creationId="{7CCA8529-4CA7-DD3F-5314-53197BD15C2D}"/>
+          </ac:spMkLst>
+        </pc:spChg>
+        <pc:spChg chg="add mod">
+          <ac:chgData name="Lubbe, S [slubbe@sun.ac.za]" userId="656cc105-77ab-4b7b-bc17-2448ac205142" providerId="ADAL" clId="{E9BFA566-E94F-41CE-9F87-81DD51602D68}" dt="2025-05-15T14:52:57.823" v="639" actId="164"/>
+          <ac:spMkLst>
+            <pc:docMk/>
+            <pc:sldMk cId="4015766007" sldId="258"/>
+            <ac:spMk id="34" creationId="{9BD4D525-1F50-CA4C-F4C8-C5CEEBFC6EEA}"/>
+          </ac:spMkLst>
+        </pc:spChg>
+        <pc:spChg chg="add mod">
+          <ac:chgData name="Lubbe, S [slubbe@sun.ac.za]" userId="656cc105-77ab-4b7b-bc17-2448ac205142" providerId="ADAL" clId="{E9BFA566-E94F-41CE-9F87-81DD51602D68}" dt="2025-05-15T14:52:57.823" v="639" actId="164"/>
+          <ac:spMkLst>
+            <pc:docMk/>
+            <pc:sldMk cId="4015766007" sldId="258"/>
+            <ac:spMk id="35" creationId="{2DDF5D9F-021C-0AFA-3C52-9B944BEDCBF4}"/>
+          </ac:spMkLst>
+        </pc:spChg>
+        <pc:spChg chg="add mod">
+          <ac:chgData name="Lubbe, S [slubbe@sun.ac.za]" userId="656cc105-77ab-4b7b-bc17-2448ac205142" providerId="ADAL" clId="{E9BFA566-E94F-41CE-9F87-81DD51602D68}" dt="2025-05-15T14:52:57.823" v="639" actId="164"/>
+          <ac:spMkLst>
+            <pc:docMk/>
+            <pc:sldMk cId="4015766007" sldId="258"/>
+            <ac:spMk id="36" creationId="{DE1FF385-9A46-4B65-C10E-EDBC8E2F07A8}"/>
+          </ac:spMkLst>
+        </pc:spChg>
+        <pc:spChg chg="add mod">
+          <ac:chgData name="Lubbe, S [slubbe@sun.ac.za]" userId="656cc105-77ab-4b7b-bc17-2448ac205142" providerId="ADAL" clId="{E9BFA566-E94F-41CE-9F87-81DD51602D68}" dt="2025-05-15T14:52:57.823" v="639" actId="164"/>
+          <ac:spMkLst>
+            <pc:docMk/>
+            <pc:sldMk cId="4015766007" sldId="258"/>
+            <ac:spMk id="37" creationId="{A8278057-E174-A85D-487C-ACADD9E8A3C5}"/>
+          </ac:spMkLst>
+        </pc:spChg>
+        <pc:cxnChg chg="add mod">
+          <ac:chgData name="Lubbe, S [slubbe@sun.ac.za]" userId="656cc105-77ab-4b7b-bc17-2448ac205142" providerId="ADAL" clId="{E9BFA566-E94F-41CE-9F87-81DD51602D68}" dt="2025-05-15T14:35:50.802" v="278" actId="13822"/>
+          <ac:cxnSpMkLst>
+            <pc:docMk/>
+            <pc:sldMk cId="4015766007" sldId="258"/>
+            <ac:cxnSpMk id="3" creationId="{79071FF5-9EA9-CB22-CDDC-FAA052190108}"/>
+          </ac:cxnSpMkLst>
+        </pc:cxnChg>
+        <pc:cxnChg chg="add mod">
+          <ac:chgData name="Lubbe, S [slubbe@sun.ac.za]" userId="656cc105-77ab-4b7b-bc17-2448ac205142" providerId="ADAL" clId="{E9BFA566-E94F-41CE-9F87-81DD51602D68}" dt="2025-05-15T14:36:05.417" v="281" actId="1076"/>
+          <ac:cxnSpMkLst>
+            <pc:docMk/>
+            <pc:sldMk cId="4015766007" sldId="258"/>
+            <ac:cxnSpMk id="4" creationId="{A950075D-9A8F-CF27-3683-5363A60994B2}"/>
+          </ac:cxnSpMkLst>
+        </pc:cxnChg>
+        <pc:cxnChg chg="add mod">
+          <ac:chgData name="Lubbe, S [slubbe@sun.ac.za]" userId="656cc105-77ab-4b7b-bc17-2448ac205142" providerId="ADAL" clId="{E9BFA566-E94F-41CE-9F87-81DD51602D68}" dt="2025-05-15T14:40:42.753" v="340" actId="1036"/>
+          <ac:cxnSpMkLst>
+            <pc:docMk/>
+            <pc:sldMk cId="4015766007" sldId="258"/>
+            <ac:cxnSpMk id="9" creationId="{CFC8E0C3-6066-F043-A33D-A09AEA9247A3}"/>
+          </ac:cxnSpMkLst>
+        </pc:cxnChg>
+        <pc:cxnChg chg="add mod">
+          <ac:chgData name="Lubbe, S [slubbe@sun.ac.za]" userId="656cc105-77ab-4b7b-bc17-2448ac205142" providerId="ADAL" clId="{E9BFA566-E94F-41CE-9F87-81DD51602D68}" dt="2025-05-15T14:40:42.753" v="340" actId="1036"/>
+          <ac:cxnSpMkLst>
+            <pc:docMk/>
+            <pc:sldMk cId="4015766007" sldId="258"/>
+            <ac:cxnSpMk id="10" creationId="{61DCAD94-22DB-3152-DADE-96949813B283}"/>
+          </ac:cxnSpMkLst>
+        </pc:cxnChg>
+        <pc:cxnChg chg="add del mod">
+          <ac:chgData name="Lubbe, S [slubbe@sun.ac.za]" userId="656cc105-77ab-4b7b-bc17-2448ac205142" providerId="ADAL" clId="{E9BFA566-E94F-41CE-9F87-81DD51602D68}" dt="2025-05-15T14:40:47.035" v="341" actId="478"/>
+          <ac:cxnSpMkLst>
+            <pc:docMk/>
+            <pc:sldMk cId="4015766007" sldId="258"/>
+            <ac:cxnSpMk id="16" creationId="{408794D3-B062-44C4-D0EE-25A59A7E3FB8}"/>
+          </ac:cxnSpMkLst>
+        </pc:cxnChg>
+        <pc:cxnChg chg="add mod">
+          <ac:chgData name="Lubbe, S [slubbe@sun.ac.za]" userId="656cc105-77ab-4b7b-bc17-2448ac205142" providerId="ADAL" clId="{E9BFA566-E94F-41CE-9F87-81DD51602D68}" dt="2025-05-15T14:42:04.548" v="351" actId="208"/>
+          <ac:cxnSpMkLst>
+            <pc:docMk/>
+            <pc:sldMk cId="4015766007" sldId="258"/>
+            <ac:cxnSpMk id="18" creationId="{10C313E6-56F7-54C5-9EAC-F4672925FE99}"/>
+          </ac:cxnSpMkLst>
+        </pc:cxnChg>
+        <pc:cxnChg chg="add mod">
+          <ac:chgData name="Lubbe, S [slubbe@sun.ac.za]" userId="656cc105-77ab-4b7b-bc17-2448ac205142" providerId="ADAL" clId="{E9BFA566-E94F-41CE-9F87-81DD51602D68}" dt="2025-05-15T14:42:09.960" v="352" actId="108"/>
+          <ac:cxnSpMkLst>
+            <pc:docMk/>
+            <pc:sldMk cId="4015766007" sldId="258"/>
+            <ac:cxnSpMk id="23" creationId="{60400813-1EFD-1591-1451-5645A8EFDCE4}"/>
+          </ac:cxnSpMkLst>
+        </pc:cxnChg>
+        <pc:cxnChg chg="add mod">
+          <ac:chgData name="Lubbe, S [slubbe@sun.ac.za]" userId="656cc105-77ab-4b7b-bc17-2448ac205142" providerId="ADAL" clId="{E9BFA566-E94F-41CE-9F87-81DD51602D68}" dt="2025-05-15T14:44:35.965" v="384" actId="108"/>
+          <ac:cxnSpMkLst>
+            <pc:docMk/>
+            <pc:sldMk cId="4015766007" sldId="258"/>
+            <ac:cxnSpMk id="30" creationId="{F5E9DEE6-2654-B5D6-9AAB-1D5DAAF5817C}"/>
+          </ac:cxnSpMkLst>
+        </pc:cxnChg>
+      </pc:sldChg>
     </pc:docChg>
   </pc:docChgLst>
 </pc:chgInfo>
@@ -570,7 +738,7 @@
           <a:p>
             <a:fld id="{67A7CAF5-7A1A-43D9-B5B9-2B502385EA68}" type="datetimeFigureOut">
               <a:rPr lang="en-ZA" smtClean="0"/>
-              <a:t>2025/05/14</a:t>
+              <a:t>2025/05/15</a:t>
             </a:fld>
             <a:endParaRPr lang="en-ZA"/>
           </a:p>
@@ -770,7 +938,7 @@
           <a:p>
             <a:fld id="{67A7CAF5-7A1A-43D9-B5B9-2B502385EA68}" type="datetimeFigureOut">
               <a:rPr lang="en-ZA" smtClean="0"/>
-              <a:t>2025/05/14</a:t>
+              <a:t>2025/05/15</a:t>
             </a:fld>
             <a:endParaRPr lang="en-ZA"/>
           </a:p>
@@ -980,7 +1148,7 @@
           <a:p>
             <a:fld id="{67A7CAF5-7A1A-43D9-B5B9-2B502385EA68}" type="datetimeFigureOut">
               <a:rPr lang="en-ZA" smtClean="0"/>
-              <a:t>2025/05/14</a:t>
+              <a:t>2025/05/15</a:t>
             </a:fld>
             <a:endParaRPr lang="en-ZA"/>
           </a:p>
@@ -1180,7 +1348,7 @@
           <a:p>
             <a:fld id="{67A7CAF5-7A1A-43D9-B5B9-2B502385EA68}" type="datetimeFigureOut">
               <a:rPr lang="en-ZA" smtClean="0"/>
-              <a:t>2025/05/14</a:t>
+              <a:t>2025/05/15</a:t>
             </a:fld>
             <a:endParaRPr lang="en-ZA"/>
           </a:p>
@@ -1456,7 +1624,7 @@
           <a:p>
             <a:fld id="{67A7CAF5-7A1A-43D9-B5B9-2B502385EA68}" type="datetimeFigureOut">
               <a:rPr lang="en-ZA" smtClean="0"/>
-              <a:t>2025/05/14</a:t>
+              <a:t>2025/05/15</a:t>
             </a:fld>
             <a:endParaRPr lang="en-ZA"/>
           </a:p>
@@ -1724,7 +1892,7 @@
           <a:p>
             <a:fld id="{67A7CAF5-7A1A-43D9-B5B9-2B502385EA68}" type="datetimeFigureOut">
               <a:rPr lang="en-ZA" smtClean="0"/>
-              <a:t>2025/05/14</a:t>
+              <a:t>2025/05/15</a:t>
             </a:fld>
             <a:endParaRPr lang="en-ZA"/>
           </a:p>
@@ -2139,7 +2307,7 @@
           <a:p>
             <a:fld id="{67A7CAF5-7A1A-43D9-B5B9-2B502385EA68}" type="datetimeFigureOut">
               <a:rPr lang="en-ZA" smtClean="0"/>
-              <a:t>2025/05/14</a:t>
+              <a:t>2025/05/15</a:t>
             </a:fld>
             <a:endParaRPr lang="en-ZA"/>
           </a:p>
@@ -2281,7 +2449,7 @@
           <a:p>
             <a:fld id="{67A7CAF5-7A1A-43D9-B5B9-2B502385EA68}" type="datetimeFigureOut">
               <a:rPr lang="en-ZA" smtClean="0"/>
-              <a:t>2025/05/14</a:t>
+              <a:t>2025/05/15</a:t>
             </a:fld>
             <a:endParaRPr lang="en-ZA"/>
           </a:p>
@@ -2394,7 +2562,7 @@
           <a:p>
             <a:fld id="{67A7CAF5-7A1A-43D9-B5B9-2B502385EA68}" type="datetimeFigureOut">
               <a:rPr lang="en-ZA" smtClean="0"/>
-              <a:t>2025/05/14</a:t>
+              <a:t>2025/05/15</a:t>
             </a:fld>
             <a:endParaRPr lang="en-ZA"/>
           </a:p>
@@ -2707,7 +2875,7 @@
           <a:p>
             <a:fld id="{67A7CAF5-7A1A-43D9-B5B9-2B502385EA68}" type="datetimeFigureOut">
               <a:rPr lang="en-ZA" smtClean="0"/>
-              <a:t>2025/05/14</a:t>
+              <a:t>2025/05/15</a:t>
             </a:fld>
             <a:endParaRPr lang="en-ZA"/>
           </a:p>
@@ -2996,7 +3164,7 @@
           <a:p>
             <a:fld id="{67A7CAF5-7A1A-43D9-B5B9-2B502385EA68}" type="datetimeFigureOut">
               <a:rPr lang="en-ZA" smtClean="0"/>
-              <a:t>2025/05/14</a:t>
+              <a:t>2025/05/15</a:t>
             </a:fld>
             <a:endParaRPr lang="en-ZA"/>
           </a:p>
@@ -3239,7 +3407,7 @@
           <a:p>
             <a:fld id="{67A7CAF5-7A1A-43D9-B5B9-2B502385EA68}" type="datetimeFigureOut">
               <a:rPr lang="en-ZA" smtClean="0"/>
-              <a:t>2025/05/14</a:t>
+              <a:t>2025/05/15</a:t>
             </a:fld>
             <a:endParaRPr lang="en-ZA"/>
           </a:p>
@@ -5023,6 +5191,1985 @@
 </p:sld>
 </file>
 
+<file path=ppt/slides/slide3.xml><?xml version="1.0" encoding="utf-8"?>
+<p:sld xmlns:a="http://schemas.openxmlformats.org/drawingml/2006/main" xmlns:r="http://schemas.openxmlformats.org/officeDocument/2006/relationships" xmlns:p="http://schemas.openxmlformats.org/presentationml/2006/main">
+  <p:cSld>
+    <p:spTree>
+      <p:nvGrpSpPr>
+        <p:cNvPr id="1" name=""/>
+        <p:cNvGrpSpPr/>
+        <p:nvPr/>
+      </p:nvGrpSpPr>
+      <p:grpSpPr>
+        <a:xfrm>
+          <a:off x="0" y="0"/>
+          <a:ext cx="0" cy="0"/>
+          <a:chOff x="0" y="0"/>
+          <a:chExt cx="0" cy="0"/>
+        </a:xfrm>
+      </p:grpSpPr>
+      <p:grpSp>
+        <p:nvGrpSpPr>
+          <p:cNvPr id="38" name="Group 37">
+            <a:extLst>
+              <a:ext uri="{FF2B5EF4-FFF2-40B4-BE49-F238E27FC236}">
+                <a16:creationId xmlns:a16="http://schemas.microsoft.com/office/drawing/2014/main" id="{DFA0621E-CBF7-7297-4CEA-8E45DB7C89FF}"/>
+              </a:ext>
+            </a:extLst>
+          </p:cNvPr>
+          <p:cNvGrpSpPr/>
+          <p:nvPr/>
+        </p:nvGrpSpPr>
+        <p:grpSpPr>
+          <a:xfrm>
+            <a:off x="589280" y="373244"/>
+            <a:ext cx="7406638" cy="3594523"/>
+            <a:chOff x="589280" y="373244"/>
+            <a:chExt cx="7406638" cy="3594523"/>
+          </a:xfrm>
+        </p:grpSpPr>
+        <p:cxnSp>
+          <p:nvCxnSpPr>
+            <p:cNvPr id="3" name="Straight Arrow Connector 2">
+              <a:extLst>
+                <a:ext uri="{FF2B5EF4-FFF2-40B4-BE49-F238E27FC236}">
+                  <a16:creationId xmlns:a16="http://schemas.microsoft.com/office/drawing/2014/main" id="{79071FF5-9EA9-CB22-CDDC-FAA052190108}"/>
+                </a:ext>
+              </a:extLst>
+            </p:cNvPr>
+            <p:cNvCxnSpPr/>
+            <p:nvPr/>
+          </p:nvCxnSpPr>
+          <p:spPr>
+            <a:xfrm flipV="1">
+              <a:off x="1229360" y="772160"/>
+              <a:ext cx="0" cy="2656840"/>
+            </a:xfrm>
+            <a:prstGeom prst="straightConnector1">
+              <a:avLst/>
+            </a:prstGeom>
+            <a:ln>
+              <a:tailEnd type="triangle"/>
+            </a:ln>
+          </p:spPr>
+          <p:style>
+            <a:lnRef idx="2">
+              <a:schemeClr val="dk1"/>
+            </a:lnRef>
+            <a:fillRef idx="0">
+              <a:schemeClr val="dk1"/>
+            </a:fillRef>
+            <a:effectRef idx="1">
+              <a:schemeClr val="dk1"/>
+            </a:effectRef>
+            <a:fontRef idx="minor">
+              <a:schemeClr val="tx1"/>
+            </a:fontRef>
+          </p:style>
+        </p:cxnSp>
+        <p:cxnSp>
+          <p:nvCxnSpPr>
+            <p:cNvPr id="4" name="Straight Arrow Connector 3">
+              <a:extLst>
+                <a:ext uri="{FF2B5EF4-FFF2-40B4-BE49-F238E27FC236}">
+                  <a16:creationId xmlns:a16="http://schemas.microsoft.com/office/drawing/2014/main" id="{A950075D-9A8F-CF27-3683-5363A60994B2}"/>
+                </a:ext>
+              </a:extLst>
+            </p:cNvPr>
+            <p:cNvCxnSpPr>
+              <a:cxnSpLocks/>
+            </p:cNvCxnSpPr>
+            <p:nvPr/>
+          </p:nvCxnSpPr>
+          <p:spPr>
+            <a:xfrm rot="5400000" flipV="1">
+              <a:off x="2245360" y="1757680"/>
+              <a:ext cx="0" cy="2656840"/>
+            </a:xfrm>
+            <a:prstGeom prst="straightConnector1">
+              <a:avLst/>
+            </a:prstGeom>
+            <a:ln>
+              <a:tailEnd type="triangle"/>
+            </a:ln>
+          </p:spPr>
+          <p:style>
+            <a:lnRef idx="2">
+              <a:schemeClr val="dk1"/>
+            </a:lnRef>
+            <a:fillRef idx="0">
+              <a:schemeClr val="dk1"/>
+            </a:fillRef>
+            <a:effectRef idx="1">
+              <a:schemeClr val="dk1"/>
+            </a:effectRef>
+            <a:fontRef idx="minor">
+              <a:schemeClr val="tx1"/>
+            </a:fontRef>
+          </p:style>
+        </p:cxnSp>
+        <p:sp>
+          <p:nvSpPr>
+            <p:cNvPr id="5" name="TextBox 4">
+              <a:extLst>
+                <a:ext uri="{FF2B5EF4-FFF2-40B4-BE49-F238E27FC236}">
+                  <a16:creationId xmlns:a16="http://schemas.microsoft.com/office/drawing/2014/main" id="{A647F9E7-3ED4-C767-7510-EE30636D906D}"/>
+                </a:ext>
+              </a:extLst>
+            </p:cNvPr>
+            <p:cNvSpPr txBox="1"/>
+            <p:nvPr/>
+          </p:nvSpPr>
+          <p:spPr>
+            <a:xfrm>
+              <a:off x="998220" y="2943860"/>
+              <a:ext cx="457199" cy="307777"/>
+            </a:xfrm>
+            <a:prstGeom prst="rect">
+              <a:avLst/>
+            </a:prstGeom>
+            <a:noFill/>
+          </p:spPr>
+          <p:txBody>
+            <a:bodyPr wrap="square" rtlCol="0">
+              <a:spAutoFit/>
+            </a:bodyPr>
+            <a:lstStyle/>
+            <a:p>
+              <a:pPr algn="ctr"/>
+              <a:r>
+                <a:rPr lang="en-GB" sz="1400" dirty="0"/>
+                <a:t>0</a:t>
+              </a:r>
+              <a:endParaRPr lang="en-ZA" sz="1400" dirty="0"/>
+            </a:p>
+          </p:txBody>
+        </p:sp>
+        <p:sp>
+          <p:nvSpPr>
+            <p:cNvPr id="6" name="TextBox 5">
+              <a:extLst>
+                <a:ext uri="{FF2B5EF4-FFF2-40B4-BE49-F238E27FC236}">
+                  <a16:creationId xmlns:a16="http://schemas.microsoft.com/office/drawing/2014/main" id="{63B059A5-F9D4-EB35-537A-5ED098248E75}"/>
+                </a:ext>
+              </a:extLst>
+            </p:cNvPr>
+            <p:cNvSpPr txBox="1"/>
+            <p:nvPr/>
+          </p:nvSpPr>
+          <p:spPr>
+            <a:xfrm>
+              <a:off x="3327401" y="3035301"/>
+              <a:ext cx="457199" cy="307777"/>
+            </a:xfrm>
+            <a:prstGeom prst="rect">
+              <a:avLst/>
+            </a:prstGeom>
+            <a:noFill/>
+          </p:spPr>
+          <p:txBody>
+            <a:bodyPr wrap="square" rtlCol="0">
+              <a:spAutoFit/>
+            </a:bodyPr>
+            <a:lstStyle/>
+            <a:p>
+              <a:pPr algn="ctr"/>
+              <a:r>
+                <a:rPr lang="en-GB" sz="1400" dirty="0"/>
+                <a:t>x</a:t>
+              </a:r>
+              <a:endParaRPr lang="en-ZA" sz="1400" dirty="0"/>
+            </a:p>
+          </p:txBody>
+        </p:sp>
+        <p:sp>
+          <p:nvSpPr>
+            <p:cNvPr id="7" name="TextBox 6">
+              <a:extLst>
+                <a:ext uri="{FF2B5EF4-FFF2-40B4-BE49-F238E27FC236}">
+                  <a16:creationId xmlns:a16="http://schemas.microsoft.com/office/drawing/2014/main" id="{B92490E6-0B0B-DD0C-C5F6-37D626142C7C}"/>
+                </a:ext>
+              </a:extLst>
+            </p:cNvPr>
+            <p:cNvSpPr txBox="1"/>
+            <p:nvPr/>
+          </p:nvSpPr>
+          <p:spPr>
+            <a:xfrm>
+              <a:off x="906780" y="648751"/>
+              <a:ext cx="457199" cy="307777"/>
+            </a:xfrm>
+            <a:prstGeom prst="rect">
+              <a:avLst/>
+            </a:prstGeom>
+            <a:noFill/>
+          </p:spPr>
+          <p:txBody>
+            <a:bodyPr wrap="square" rtlCol="0">
+              <a:spAutoFit/>
+            </a:bodyPr>
+            <a:lstStyle/>
+            <a:p>
+              <a:pPr algn="ctr"/>
+              <a:r>
+                <a:rPr lang="en-GB" sz="1400" dirty="0"/>
+                <a:t>y</a:t>
+              </a:r>
+              <a:endParaRPr lang="en-ZA" sz="1400" dirty="0"/>
+            </a:p>
+          </p:txBody>
+        </p:sp>
+        <p:sp>
+          <p:nvSpPr>
+            <p:cNvPr id="8" name="Oval 7">
+              <a:extLst>
+                <a:ext uri="{FF2B5EF4-FFF2-40B4-BE49-F238E27FC236}">
+                  <a16:creationId xmlns:a16="http://schemas.microsoft.com/office/drawing/2014/main" id="{B22B3E43-26B2-B498-43D3-DCCD389BFF96}"/>
+                </a:ext>
+              </a:extLst>
+            </p:cNvPr>
+            <p:cNvSpPr/>
+            <p:nvPr/>
+          </p:nvSpPr>
+          <p:spPr>
+            <a:xfrm>
+              <a:off x="2550160" y="1391920"/>
+              <a:ext cx="132080" cy="132080"/>
+            </a:xfrm>
+            <a:prstGeom prst="ellipse">
+              <a:avLst/>
+            </a:prstGeom>
+            <a:solidFill>
+              <a:schemeClr val="bg1">
+                <a:lumMod val="50000"/>
+              </a:schemeClr>
+            </a:solidFill>
+          </p:spPr>
+          <p:style>
+            <a:lnRef idx="2">
+              <a:schemeClr val="accent1">
+                <a:shade val="15000"/>
+              </a:schemeClr>
+            </a:lnRef>
+            <a:fillRef idx="1">
+              <a:schemeClr val="accent1"/>
+            </a:fillRef>
+            <a:effectRef idx="0">
+              <a:schemeClr val="accent1"/>
+            </a:effectRef>
+            <a:fontRef idx="minor">
+              <a:schemeClr val="lt1"/>
+            </a:fontRef>
+          </p:style>
+          <p:txBody>
+            <a:bodyPr rtlCol="0" anchor="ctr"/>
+            <a:lstStyle/>
+            <a:p>
+              <a:pPr algn="ctr"/>
+              <a:endParaRPr lang="en-ZA"/>
+            </a:p>
+          </p:txBody>
+        </p:sp>
+        <p:cxnSp>
+          <p:nvCxnSpPr>
+            <p:cNvPr id="9" name="Straight Arrow Connector 8">
+              <a:extLst>
+                <a:ext uri="{FF2B5EF4-FFF2-40B4-BE49-F238E27FC236}">
+                  <a16:creationId xmlns:a16="http://schemas.microsoft.com/office/drawing/2014/main" id="{CFC8E0C3-6066-F043-A33D-A09AEA9247A3}"/>
+                </a:ext>
+              </a:extLst>
+            </p:cNvPr>
+            <p:cNvCxnSpPr/>
+            <p:nvPr/>
+          </p:nvCxnSpPr>
+          <p:spPr>
+            <a:xfrm flipV="1">
+              <a:off x="5323840" y="772161"/>
+              <a:ext cx="0" cy="2656840"/>
+            </a:xfrm>
+            <a:prstGeom prst="straightConnector1">
+              <a:avLst/>
+            </a:prstGeom>
+            <a:ln>
+              <a:tailEnd type="triangle"/>
+            </a:ln>
+          </p:spPr>
+          <p:style>
+            <a:lnRef idx="2">
+              <a:schemeClr val="dk1"/>
+            </a:lnRef>
+            <a:fillRef idx="0">
+              <a:schemeClr val="dk1"/>
+            </a:fillRef>
+            <a:effectRef idx="1">
+              <a:schemeClr val="dk1"/>
+            </a:effectRef>
+            <a:fontRef idx="minor">
+              <a:schemeClr val="tx1"/>
+            </a:fontRef>
+          </p:style>
+        </p:cxnSp>
+        <p:cxnSp>
+          <p:nvCxnSpPr>
+            <p:cNvPr id="10" name="Straight Arrow Connector 9">
+              <a:extLst>
+                <a:ext uri="{FF2B5EF4-FFF2-40B4-BE49-F238E27FC236}">
+                  <a16:creationId xmlns:a16="http://schemas.microsoft.com/office/drawing/2014/main" id="{61DCAD94-22DB-3152-DADE-96949813B283}"/>
+                </a:ext>
+              </a:extLst>
+            </p:cNvPr>
+            <p:cNvCxnSpPr>
+              <a:cxnSpLocks/>
+            </p:cNvCxnSpPr>
+            <p:nvPr/>
+          </p:nvCxnSpPr>
+          <p:spPr>
+            <a:xfrm rot="5400000" flipV="1">
+              <a:off x="6339840" y="1757681"/>
+              <a:ext cx="0" cy="2656840"/>
+            </a:xfrm>
+            <a:prstGeom prst="straightConnector1">
+              <a:avLst/>
+            </a:prstGeom>
+            <a:ln>
+              <a:tailEnd type="triangle"/>
+            </a:ln>
+          </p:spPr>
+          <p:style>
+            <a:lnRef idx="2">
+              <a:schemeClr val="dk1"/>
+            </a:lnRef>
+            <a:fillRef idx="0">
+              <a:schemeClr val="dk1"/>
+            </a:fillRef>
+            <a:effectRef idx="1">
+              <a:schemeClr val="dk1"/>
+            </a:effectRef>
+            <a:fontRef idx="minor">
+              <a:schemeClr val="tx1"/>
+            </a:fontRef>
+          </p:style>
+        </p:cxnSp>
+        <p:sp>
+          <p:nvSpPr>
+            <p:cNvPr id="11" name="TextBox 10">
+              <a:extLst>
+                <a:ext uri="{FF2B5EF4-FFF2-40B4-BE49-F238E27FC236}">
+                  <a16:creationId xmlns:a16="http://schemas.microsoft.com/office/drawing/2014/main" id="{B83B6F67-1D55-41F6-07A3-4A488E9E679A}"/>
+                </a:ext>
+              </a:extLst>
+            </p:cNvPr>
+            <p:cNvSpPr txBox="1"/>
+            <p:nvPr/>
+          </p:nvSpPr>
+          <p:spPr>
+            <a:xfrm>
+              <a:off x="5092700" y="2943861"/>
+              <a:ext cx="457199" cy="307777"/>
+            </a:xfrm>
+            <a:prstGeom prst="rect">
+              <a:avLst/>
+            </a:prstGeom>
+            <a:noFill/>
+          </p:spPr>
+          <p:txBody>
+            <a:bodyPr wrap="square" rtlCol="0">
+              <a:spAutoFit/>
+            </a:bodyPr>
+            <a:lstStyle/>
+            <a:p>
+              <a:pPr algn="ctr"/>
+              <a:r>
+                <a:rPr lang="en-GB" sz="1400" dirty="0"/>
+                <a:t>0</a:t>
+              </a:r>
+              <a:endParaRPr lang="en-ZA" sz="1400" dirty="0"/>
+            </a:p>
+          </p:txBody>
+        </p:sp>
+        <p:sp>
+          <p:nvSpPr>
+            <p:cNvPr id="12" name="TextBox 11">
+              <a:extLst>
+                <a:ext uri="{FF2B5EF4-FFF2-40B4-BE49-F238E27FC236}">
+                  <a16:creationId xmlns:a16="http://schemas.microsoft.com/office/drawing/2014/main" id="{207AFEAC-2040-9506-1132-7B2BA84BA72D}"/>
+                </a:ext>
+              </a:extLst>
+            </p:cNvPr>
+            <p:cNvSpPr txBox="1"/>
+            <p:nvPr/>
+          </p:nvSpPr>
+          <p:spPr>
+            <a:xfrm>
+              <a:off x="7421881" y="3035302"/>
+              <a:ext cx="457199" cy="307777"/>
+            </a:xfrm>
+            <a:prstGeom prst="rect">
+              <a:avLst/>
+            </a:prstGeom>
+            <a:noFill/>
+          </p:spPr>
+          <p:txBody>
+            <a:bodyPr wrap="square" rtlCol="0">
+              <a:spAutoFit/>
+            </a:bodyPr>
+            <a:lstStyle/>
+            <a:p>
+              <a:pPr algn="ctr"/>
+              <a:r>
+                <a:rPr lang="en-GB" sz="1400" dirty="0"/>
+                <a:t>x</a:t>
+              </a:r>
+              <a:endParaRPr lang="en-ZA" sz="1400" dirty="0"/>
+            </a:p>
+          </p:txBody>
+        </p:sp>
+        <p:sp>
+          <p:nvSpPr>
+            <p:cNvPr id="13" name="TextBox 12">
+              <a:extLst>
+                <a:ext uri="{FF2B5EF4-FFF2-40B4-BE49-F238E27FC236}">
+                  <a16:creationId xmlns:a16="http://schemas.microsoft.com/office/drawing/2014/main" id="{A001E0B1-F031-5974-D856-96CBE9488D30}"/>
+                </a:ext>
+              </a:extLst>
+            </p:cNvPr>
+            <p:cNvSpPr txBox="1"/>
+            <p:nvPr/>
+          </p:nvSpPr>
+          <p:spPr>
+            <a:xfrm>
+              <a:off x="5001260" y="648752"/>
+              <a:ext cx="457199" cy="307777"/>
+            </a:xfrm>
+            <a:prstGeom prst="rect">
+              <a:avLst/>
+            </a:prstGeom>
+            <a:noFill/>
+          </p:spPr>
+          <p:txBody>
+            <a:bodyPr wrap="square" rtlCol="0">
+              <a:spAutoFit/>
+            </a:bodyPr>
+            <a:lstStyle/>
+            <a:p>
+              <a:pPr algn="ctr"/>
+              <a:r>
+                <a:rPr lang="en-GB" sz="1400" dirty="0"/>
+                <a:t>y</a:t>
+              </a:r>
+              <a:endParaRPr lang="en-ZA" sz="1400" dirty="0"/>
+            </a:p>
+          </p:txBody>
+        </p:sp>
+        <p:sp>
+          <p:nvSpPr>
+            <p:cNvPr id="14" name="Oval 13">
+              <a:extLst>
+                <a:ext uri="{FF2B5EF4-FFF2-40B4-BE49-F238E27FC236}">
+                  <a16:creationId xmlns:a16="http://schemas.microsoft.com/office/drawing/2014/main" id="{58F56291-F33A-24BB-B31F-389681A5979C}"/>
+                </a:ext>
+              </a:extLst>
+            </p:cNvPr>
+            <p:cNvSpPr/>
+            <p:nvPr/>
+          </p:nvSpPr>
+          <p:spPr>
+            <a:xfrm>
+              <a:off x="6644640" y="1391921"/>
+              <a:ext cx="132080" cy="132080"/>
+            </a:xfrm>
+            <a:prstGeom prst="ellipse">
+              <a:avLst/>
+            </a:prstGeom>
+            <a:solidFill>
+              <a:schemeClr val="bg1">
+                <a:lumMod val="50000"/>
+              </a:schemeClr>
+            </a:solidFill>
+          </p:spPr>
+          <p:style>
+            <a:lnRef idx="2">
+              <a:schemeClr val="accent1">
+                <a:shade val="15000"/>
+              </a:schemeClr>
+            </a:lnRef>
+            <a:fillRef idx="1">
+              <a:schemeClr val="accent1"/>
+            </a:fillRef>
+            <a:effectRef idx="0">
+              <a:schemeClr val="accent1"/>
+            </a:effectRef>
+            <a:fontRef idx="minor">
+              <a:schemeClr val="lt1"/>
+            </a:fontRef>
+          </p:style>
+          <p:txBody>
+            <a:bodyPr rtlCol="0" anchor="ctr"/>
+            <a:lstStyle/>
+            <a:p>
+              <a:pPr algn="ctr"/>
+              <a:endParaRPr lang="en-ZA"/>
+            </a:p>
+          </p:txBody>
+        </p:sp>
+        <p:cxnSp>
+          <p:nvCxnSpPr>
+            <p:cNvPr id="18" name="Straight Connector 17">
+              <a:extLst>
+                <a:ext uri="{FF2B5EF4-FFF2-40B4-BE49-F238E27FC236}">
+                  <a16:creationId xmlns:a16="http://schemas.microsoft.com/office/drawing/2014/main" id="{10C313E6-56F7-54C5-9EAC-F4672925FE99}"/>
+                </a:ext>
+              </a:extLst>
+            </p:cNvPr>
+            <p:cNvCxnSpPr>
+              <a:cxnSpLocks/>
+              <a:stCxn id="8" idx="4"/>
+            </p:cNvCxnSpPr>
+            <p:nvPr/>
+          </p:nvCxnSpPr>
+          <p:spPr>
+            <a:xfrm>
+              <a:off x="2616200" y="1524000"/>
+              <a:ext cx="0" cy="1562100"/>
+            </a:xfrm>
+            <a:prstGeom prst="line">
+              <a:avLst/>
+            </a:prstGeom>
+            <a:ln>
+              <a:solidFill>
+                <a:schemeClr val="tx1"/>
+              </a:solidFill>
+              <a:prstDash val="dash"/>
+            </a:ln>
+          </p:spPr>
+          <p:style>
+            <a:lnRef idx="2">
+              <a:schemeClr val="accent1"/>
+            </a:lnRef>
+            <a:fillRef idx="0">
+              <a:schemeClr val="accent1"/>
+            </a:fillRef>
+            <a:effectRef idx="1">
+              <a:schemeClr val="accent1"/>
+            </a:effectRef>
+            <a:fontRef idx="minor">
+              <a:schemeClr val="tx1"/>
+            </a:fontRef>
+          </p:style>
+        </p:cxnSp>
+        <p:cxnSp>
+          <p:nvCxnSpPr>
+            <p:cNvPr id="23" name="Straight Connector 22">
+              <a:extLst>
+                <a:ext uri="{FF2B5EF4-FFF2-40B4-BE49-F238E27FC236}">
+                  <a16:creationId xmlns:a16="http://schemas.microsoft.com/office/drawing/2014/main" id="{60400813-1EFD-1591-1451-5645A8EFDCE4}"/>
+                </a:ext>
+              </a:extLst>
+            </p:cNvPr>
+            <p:cNvCxnSpPr>
+              <a:cxnSpLocks/>
+              <a:stCxn id="8" idx="2"/>
+            </p:cNvCxnSpPr>
+            <p:nvPr/>
+          </p:nvCxnSpPr>
+          <p:spPr>
+            <a:xfrm flipH="1">
+              <a:off x="1229360" y="1457960"/>
+              <a:ext cx="1320800" cy="0"/>
+            </a:xfrm>
+            <a:prstGeom prst="line">
+              <a:avLst/>
+            </a:prstGeom>
+            <a:ln>
+              <a:solidFill>
+                <a:schemeClr val="tx1"/>
+              </a:solidFill>
+              <a:prstDash val="dash"/>
+            </a:ln>
+          </p:spPr>
+          <p:style>
+            <a:lnRef idx="2">
+              <a:schemeClr val="accent1"/>
+            </a:lnRef>
+            <a:fillRef idx="0">
+              <a:schemeClr val="accent1"/>
+            </a:fillRef>
+            <a:effectRef idx="1">
+              <a:schemeClr val="accent1"/>
+            </a:effectRef>
+            <a:fontRef idx="minor">
+              <a:schemeClr val="tx1"/>
+            </a:fontRef>
+          </p:style>
+        </p:cxnSp>
+        <mc:AlternateContent xmlns:mc="http://schemas.openxmlformats.org/markup-compatibility/2006">
+          <mc:Choice xmlns:a14="http://schemas.microsoft.com/office/drawing/2010/main" Requires="a14">
+            <p:sp>
+              <p:nvSpPr>
+                <p:cNvPr id="26" name="TextBox 25">
+                  <a:extLst>
+                    <a:ext uri="{FF2B5EF4-FFF2-40B4-BE49-F238E27FC236}">
+                      <a16:creationId xmlns:a16="http://schemas.microsoft.com/office/drawing/2014/main" id="{161A8BE8-B453-EF2D-8E82-8630AA72006C}"/>
+                    </a:ext>
+                  </a:extLst>
+                </p:cNvPr>
+                <p:cNvSpPr txBox="1"/>
+                <p:nvPr/>
+              </p:nvSpPr>
+              <p:spPr>
+                <a:xfrm>
+                  <a:off x="2245360" y="1085625"/>
+                  <a:ext cx="1267457" cy="307777"/>
+                </a:xfrm>
+                <a:prstGeom prst="rect">
+                  <a:avLst/>
+                </a:prstGeom>
+                <a:noFill/>
+              </p:spPr>
+              <p:txBody>
+                <a:bodyPr wrap="square" rtlCol="0">
+                  <a:spAutoFit/>
+                </a:bodyPr>
+                <a:lstStyle/>
+                <a:p>
+                  <a14:m>
+                    <m:oMathPara xmlns:m="http://schemas.openxmlformats.org/officeDocument/2006/math">
+                      <m:oMathParaPr>
+                        <m:jc m:val="centerGroup"/>
+                      </m:oMathParaPr>
+                      <m:oMath xmlns:m="http://schemas.openxmlformats.org/officeDocument/2006/math">
+                        <m:r>
+                          <a:rPr lang="en-GB" sz="1400" i="1" dirty="0" smtClean="0">
+                            <a:latin typeface="Cambria Math" panose="02040503050406030204" pitchFamily="18" charset="0"/>
+                          </a:rPr>
+                          <m:t>𝑃</m:t>
+                        </m:r>
+                        <m:r>
+                          <a:rPr lang="en-GB" sz="1400" i="1" dirty="0" smtClean="0">
+                            <a:latin typeface="Cambria Math" panose="02040503050406030204" pitchFamily="18" charset="0"/>
+                          </a:rPr>
+                          <m:t>=</m:t>
+                        </m:r>
+                        <m:r>
+                          <a:rPr lang="en-GB" sz="1400" i="1" dirty="0" smtClean="0">
+                            <a:latin typeface="Cambria Math" panose="02040503050406030204" pitchFamily="18" charset="0"/>
+                          </a:rPr>
+                          <m:t>𝑐</m:t>
+                        </m:r>
+                        <m:r>
+                          <a:rPr lang="en-GB" sz="1400" i="1" dirty="0" smtClean="0">
+                            <a:latin typeface="Cambria Math" panose="02040503050406030204" pitchFamily="18" charset="0"/>
+                          </a:rPr>
+                          <m:t>(</m:t>
+                        </m:r>
+                        <m:sSub>
+                          <m:sSubPr>
+                            <m:ctrlPr>
+                              <a:rPr lang="en-GB" sz="1400" i="1" dirty="0" smtClean="0">
+                                <a:latin typeface="Cambria Math" panose="02040503050406030204" pitchFamily="18" charset="0"/>
+                              </a:rPr>
+                            </m:ctrlPr>
+                          </m:sSubPr>
+                          <m:e>
+                            <m:r>
+                              <a:rPr lang="en-GB" sz="1400" b="0" i="1" dirty="0" smtClean="0">
+                                <a:latin typeface="Cambria Math" panose="02040503050406030204" pitchFamily="18" charset="0"/>
+                              </a:rPr>
+                              <m:t>𝑥</m:t>
+                            </m:r>
+                          </m:e>
+                          <m:sub>
+                            <m:r>
+                              <a:rPr lang="en-GB" sz="1400" b="0" i="1" dirty="0" smtClean="0">
+                                <a:latin typeface="Cambria Math" panose="02040503050406030204" pitchFamily="18" charset="0"/>
+                              </a:rPr>
+                              <m:t>1</m:t>
+                            </m:r>
+                          </m:sub>
+                        </m:sSub>
+                        <m:r>
+                          <a:rPr lang="en-GB" sz="1400" b="0" i="1" dirty="0" smtClean="0">
+                            <a:latin typeface="Cambria Math" panose="02040503050406030204" pitchFamily="18" charset="0"/>
+                          </a:rPr>
+                          <m:t>,</m:t>
+                        </m:r>
+                        <m:sSub>
+                          <m:sSubPr>
+                            <m:ctrlPr>
+                              <a:rPr lang="en-GB" sz="1400" b="0" i="1" dirty="0" smtClean="0">
+                                <a:latin typeface="Cambria Math" panose="02040503050406030204" pitchFamily="18" charset="0"/>
+                              </a:rPr>
+                            </m:ctrlPr>
+                          </m:sSubPr>
+                          <m:e>
+                            <m:r>
+                              <a:rPr lang="en-GB" sz="1400" b="0" i="1" dirty="0" smtClean="0">
+                                <a:latin typeface="Cambria Math" panose="02040503050406030204" pitchFamily="18" charset="0"/>
+                              </a:rPr>
+                              <m:t>𝑦</m:t>
+                            </m:r>
+                          </m:e>
+                          <m:sub>
+                            <m:r>
+                              <a:rPr lang="en-GB" sz="1400" b="0" i="1" dirty="0" smtClean="0">
+                                <a:latin typeface="Cambria Math" panose="02040503050406030204" pitchFamily="18" charset="0"/>
+                              </a:rPr>
+                              <m:t>1</m:t>
+                            </m:r>
+                          </m:sub>
+                        </m:sSub>
+                        <m:r>
+                          <a:rPr lang="en-GB" sz="1400" i="1" dirty="0" smtClean="0">
+                            <a:latin typeface="Cambria Math" panose="02040503050406030204" pitchFamily="18" charset="0"/>
+                          </a:rPr>
+                          <m:t>)</m:t>
+                        </m:r>
+                      </m:oMath>
+                    </m:oMathPara>
+                  </a14:m>
+                  <a:endParaRPr lang="en-ZA" sz="1400" dirty="0"/>
+                </a:p>
+              </p:txBody>
+            </p:sp>
+          </mc:Choice>
+          <mc:Fallback>
+            <p:sp>
+              <p:nvSpPr>
+                <p:cNvPr id="26" name="TextBox 25">
+                  <a:extLst>
+                    <a:ext uri="{FF2B5EF4-FFF2-40B4-BE49-F238E27FC236}">
+                      <a16:creationId xmlns:a16="http://schemas.microsoft.com/office/drawing/2014/main" id="{161A8BE8-B453-EF2D-8E82-8630AA72006C}"/>
+                    </a:ext>
+                  </a:extLst>
+                </p:cNvPr>
+                <p:cNvSpPr txBox="1">
+                  <a:spLocks noRot="1" noChangeAspect="1" noMove="1" noResize="1" noEditPoints="1" noAdjustHandles="1" noChangeArrowheads="1" noChangeShapeType="1" noTextEdit="1"/>
+                </p:cNvSpPr>
+                <p:nvPr/>
+              </p:nvSpPr>
+              <p:spPr>
+                <a:xfrm>
+                  <a:off x="2245360" y="1085625"/>
+                  <a:ext cx="1267457" cy="307777"/>
+                </a:xfrm>
+                <a:prstGeom prst="rect">
+                  <a:avLst/>
+                </a:prstGeom>
+                <a:blipFill>
+                  <a:blip r:embed="rId2"/>
+                  <a:stretch>
+                    <a:fillRect b="-5882"/>
+                  </a:stretch>
+                </a:blipFill>
+              </p:spPr>
+              <p:txBody>
+                <a:bodyPr/>
+                <a:lstStyle/>
+                <a:p>
+                  <a:r>
+                    <a:rPr lang="en-ZA">
+                      <a:noFill/>
+                    </a:rPr>
+                    <a:t> </a:t>
+                  </a:r>
+                </a:p>
+              </p:txBody>
+            </p:sp>
+          </mc:Fallback>
+        </mc:AlternateContent>
+        <mc:AlternateContent xmlns:mc="http://schemas.openxmlformats.org/markup-compatibility/2006">
+          <mc:Choice xmlns:a14="http://schemas.microsoft.com/office/drawing/2010/main" Requires="a14">
+            <p:sp>
+              <p:nvSpPr>
+                <p:cNvPr id="27" name="TextBox 26">
+                  <a:extLst>
+                    <a:ext uri="{FF2B5EF4-FFF2-40B4-BE49-F238E27FC236}">
+                      <a16:creationId xmlns:a16="http://schemas.microsoft.com/office/drawing/2014/main" id="{B6023A09-77D8-E420-1E25-FD576C4A4714}"/>
+                    </a:ext>
+                  </a:extLst>
+                </p:cNvPr>
+                <p:cNvSpPr txBox="1"/>
+                <p:nvPr/>
+              </p:nvSpPr>
+              <p:spPr>
+                <a:xfrm>
+                  <a:off x="2387600" y="3064291"/>
+                  <a:ext cx="457199" cy="307777"/>
+                </a:xfrm>
+                <a:prstGeom prst="rect">
+                  <a:avLst/>
+                </a:prstGeom>
+                <a:noFill/>
+              </p:spPr>
+              <p:txBody>
+                <a:bodyPr wrap="square" rtlCol="0">
+                  <a:spAutoFit/>
+                </a:bodyPr>
+                <a:lstStyle/>
+                <a:p>
+                  <a14:m>
+                    <m:oMathPara xmlns:m="http://schemas.openxmlformats.org/officeDocument/2006/math">
+                      <m:oMathParaPr>
+                        <m:jc m:val="centerGroup"/>
+                      </m:oMathParaPr>
+                      <m:oMath xmlns:m="http://schemas.openxmlformats.org/officeDocument/2006/math">
+                        <m:sSub>
+                          <m:sSubPr>
+                            <m:ctrlPr>
+                              <a:rPr lang="en-GB" sz="1400" i="1" dirty="0" smtClean="0">
+                                <a:latin typeface="Cambria Math" panose="02040503050406030204" pitchFamily="18" charset="0"/>
+                              </a:rPr>
+                            </m:ctrlPr>
+                          </m:sSubPr>
+                          <m:e>
+                            <m:r>
+                              <a:rPr lang="en-GB" sz="1400" b="0" i="1" dirty="0" smtClean="0">
+                                <a:latin typeface="Cambria Math" panose="02040503050406030204" pitchFamily="18" charset="0"/>
+                              </a:rPr>
+                              <m:t>𝑥</m:t>
+                            </m:r>
+                          </m:e>
+                          <m:sub>
+                            <m:r>
+                              <a:rPr lang="en-GB" sz="1400" b="0" i="1" dirty="0" smtClean="0">
+                                <a:latin typeface="Cambria Math" panose="02040503050406030204" pitchFamily="18" charset="0"/>
+                              </a:rPr>
+                              <m:t>1</m:t>
+                            </m:r>
+                          </m:sub>
+                        </m:sSub>
+                      </m:oMath>
+                    </m:oMathPara>
+                  </a14:m>
+                  <a:endParaRPr lang="en-ZA" sz="1400" dirty="0"/>
+                </a:p>
+              </p:txBody>
+            </p:sp>
+          </mc:Choice>
+          <mc:Fallback>
+            <p:sp>
+              <p:nvSpPr>
+                <p:cNvPr id="27" name="TextBox 26">
+                  <a:extLst>
+                    <a:ext uri="{FF2B5EF4-FFF2-40B4-BE49-F238E27FC236}">
+                      <a16:creationId xmlns:a16="http://schemas.microsoft.com/office/drawing/2014/main" id="{B6023A09-77D8-E420-1E25-FD576C4A4714}"/>
+                    </a:ext>
+                  </a:extLst>
+                </p:cNvPr>
+                <p:cNvSpPr txBox="1">
+                  <a:spLocks noRot="1" noChangeAspect="1" noMove="1" noResize="1" noEditPoints="1" noAdjustHandles="1" noChangeArrowheads="1" noChangeShapeType="1" noTextEdit="1"/>
+                </p:cNvSpPr>
+                <p:nvPr/>
+              </p:nvSpPr>
+              <p:spPr>
+                <a:xfrm>
+                  <a:off x="2387600" y="3064291"/>
+                  <a:ext cx="457199" cy="307777"/>
+                </a:xfrm>
+                <a:prstGeom prst="rect">
+                  <a:avLst/>
+                </a:prstGeom>
+                <a:blipFill>
+                  <a:blip r:embed="rId3"/>
+                  <a:stretch>
+                    <a:fillRect/>
+                  </a:stretch>
+                </a:blipFill>
+              </p:spPr>
+              <p:txBody>
+                <a:bodyPr/>
+                <a:lstStyle/>
+                <a:p>
+                  <a:r>
+                    <a:rPr lang="en-ZA">
+                      <a:noFill/>
+                    </a:rPr>
+                    <a:t> </a:t>
+                  </a:r>
+                </a:p>
+              </p:txBody>
+            </p:sp>
+          </mc:Fallback>
+        </mc:AlternateContent>
+        <mc:AlternateContent xmlns:mc="http://schemas.openxmlformats.org/markup-compatibility/2006">
+          <mc:Choice xmlns:a14="http://schemas.microsoft.com/office/drawing/2010/main" Requires="a14">
+            <p:sp>
+              <p:nvSpPr>
+                <p:cNvPr id="28" name="TextBox 27">
+                  <a:extLst>
+                    <a:ext uri="{FF2B5EF4-FFF2-40B4-BE49-F238E27FC236}">
+                      <a16:creationId xmlns:a16="http://schemas.microsoft.com/office/drawing/2014/main" id="{D31068F8-9588-E52E-D662-D1C7AC5AA032}"/>
+                    </a:ext>
+                  </a:extLst>
+                </p:cNvPr>
+                <p:cNvSpPr txBox="1"/>
+                <p:nvPr/>
+              </p:nvSpPr>
+              <p:spPr>
+                <a:xfrm>
+                  <a:off x="839471" y="1304071"/>
+                  <a:ext cx="457199" cy="307777"/>
+                </a:xfrm>
+                <a:prstGeom prst="rect">
+                  <a:avLst/>
+                </a:prstGeom>
+                <a:noFill/>
+              </p:spPr>
+              <p:txBody>
+                <a:bodyPr wrap="square" rtlCol="0">
+                  <a:spAutoFit/>
+                </a:bodyPr>
+                <a:lstStyle/>
+                <a:p>
+                  <a14:m>
+                    <m:oMathPara xmlns:m="http://schemas.openxmlformats.org/officeDocument/2006/math">
+                      <m:oMathParaPr>
+                        <m:jc m:val="centerGroup"/>
+                      </m:oMathParaPr>
+                      <m:oMath xmlns:m="http://schemas.openxmlformats.org/officeDocument/2006/math">
+                        <m:sSub>
+                          <m:sSubPr>
+                            <m:ctrlPr>
+                              <a:rPr lang="en-GB" sz="1400" i="1" dirty="0" smtClean="0">
+                                <a:latin typeface="Cambria Math" panose="02040503050406030204" pitchFamily="18" charset="0"/>
+                              </a:rPr>
+                            </m:ctrlPr>
+                          </m:sSubPr>
+                          <m:e>
+                            <m:r>
+                              <a:rPr lang="en-GB" sz="1400" b="0" i="1" dirty="0" smtClean="0">
+                                <a:latin typeface="Cambria Math" panose="02040503050406030204" pitchFamily="18" charset="0"/>
+                              </a:rPr>
+                              <m:t>𝑦</m:t>
+                            </m:r>
+                          </m:e>
+                          <m:sub>
+                            <m:r>
+                              <a:rPr lang="en-GB" sz="1400" b="0" i="1" dirty="0" smtClean="0">
+                                <a:latin typeface="Cambria Math" panose="02040503050406030204" pitchFamily="18" charset="0"/>
+                              </a:rPr>
+                              <m:t>1</m:t>
+                            </m:r>
+                          </m:sub>
+                        </m:sSub>
+                      </m:oMath>
+                    </m:oMathPara>
+                  </a14:m>
+                  <a:endParaRPr lang="en-ZA" sz="1400" dirty="0"/>
+                </a:p>
+              </p:txBody>
+            </p:sp>
+          </mc:Choice>
+          <mc:Fallback>
+            <p:sp>
+              <p:nvSpPr>
+                <p:cNvPr id="28" name="TextBox 27">
+                  <a:extLst>
+                    <a:ext uri="{FF2B5EF4-FFF2-40B4-BE49-F238E27FC236}">
+                      <a16:creationId xmlns:a16="http://schemas.microsoft.com/office/drawing/2014/main" id="{D31068F8-9588-E52E-D662-D1C7AC5AA032}"/>
+                    </a:ext>
+                  </a:extLst>
+                </p:cNvPr>
+                <p:cNvSpPr txBox="1">
+                  <a:spLocks noRot="1" noChangeAspect="1" noMove="1" noResize="1" noEditPoints="1" noAdjustHandles="1" noChangeArrowheads="1" noChangeShapeType="1" noTextEdit="1"/>
+                </p:cNvSpPr>
+                <p:nvPr/>
+              </p:nvSpPr>
+              <p:spPr>
+                <a:xfrm>
+                  <a:off x="839471" y="1304071"/>
+                  <a:ext cx="457199" cy="307777"/>
+                </a:xfrm>
+                <a:prstGeom prst="rect">
+                  <a:avLst/>
+                </a:prstGeom>
+                <a:blipFill>
+                  <a:blip r:embed="rId4"/>
+                  <a:stretch>
+                    <a:fillRect b="-2000"/>
+                  </a:stretch>
+                </a:blipFill>
+              </p:spPr>
+              <p:txBody>
+                <a:bodyPr/>
+                <a:lstStyle/>
+                <a:p>
+                  <a:r>
+                    <a:rPr lang="en-ZA">
+                      <a:noFill/>
+                    </a:rPr>
+                    <a:t> </a:t>
+                  </a:r>
+                </a:p>
+              </p:txBody>
+            </p:sp>
+          </mc:Fallback>
+        </mc:AlternateContent>
+        <p:cxnSp>
+          <p:nvCxnSpPr>
+            <p:cNvPr id="30" name="Straight Connector 29">
+              <a:extLst>
+                <a:ext uri="{FF2B5EF4-FFF2-40B4-BE49-F238E27FC236}">
+                  <a16:creationId xmlns:a16="http://schemas.microsoft.com/office/drawing/2014/main" id="{F5E9DEE6-2654-B5D6-9AAB-1D5DAAF5817C}"/>
+                </a:ext>
+              </a:extLst>
+            </p:cNvPr>
+            <p:cNvCxnSpPr>
+              <a:stCxn id="14" idx="3"/>
+            </p:cNvCxnSpPr>
+            <p:nvPr/>
+          </p:nvCxnSpPr>
+          <p:spPr>
+            <a:xfrm flipH="1">
+              <a:off x="5321299" y="1504658"/>
+              <a:ext cx="1342684" cy="1593090"/>
+            </a:xfrm>
+            <a:prstGeom prst="line">
+              <a:avLst/>
+            </a:prstGeom>
+            <a:ln>
+              <a:solidFill>
+                <a:schemeClr val="tx1"/>
+              </a:solidFill>
+              <a:prstDash val="dash"/>
+            </a:ln>
+          </p:spPr>
+          <p:style>
+            <a:lnRef idx="2">
+              <a:schemeClr val="accent1"/>
+            </a:lnRef>
+            <a:fillRef idx="0">
+              <a:schemeClr val="accent1"/>
+            </a:fillRef>
+            <a:effectRef idx="1">
+              <a:schemeClr val="accent1"/>
+            </a:effectRef>
+            <a:fontRef idx="minor">
+              <a:schemeClr val="tx1"/>
+            </a:fontRef>
+          </p:style>
+        </p:cxnSp>
+        <p:sp>
+          <p:nvSpPr>
+            <p:cNvPr id="31" name="Arc 30">
+              <a:extLst>
+                <a:ext uri="{FF2B5EF4-FFF2-40B4-BE49-F238E27FC236}">
+                  <a16:creationId xmlns:a16="http://schemas.microsoft.com/office/drawing/2014/main" id="{EF9FFD5B-DADA-9557-CC1E-9ABD795F7AA9}"/>
+                </a:ext>
+              </a:extLst>
+            </p:cNvPr>
+            <p:cNvSpPr/>
+            <p:nvPr/>
+          </p:nvSpPr>
+          <p:spPr>
+            <a:xfrm>
+              <a:off x="5212080" y="2573764"/>
+              <a:ext cx="1160781" cy="1024671"/>
+            </a:xfrm>
+            <a:prstGeom prst="arc">
+              <a:avLst>
+                <a:gd name="adj1" fmla="val 16199996"/>
+                <a:gd name="adj2" fmla="val 0"/>
+              </a:avLst>
+            </a:prstGeom>
+          </p:spPr>
+          <p:style>
+            <a:lnRef idx="2">
+              <a:schemeClr val="dk1"/>
+            </a:lnRef>
+            <a:fillRef idx="0">
+              <a:schemeClr val="dk1"/>
+            </a:fillRef>
+            <a:effectRef idx="1">
+              <a:schemeClr val="dk1"/>
+            </a:effectRef>
+            <a:fontRef idx="minor">
+              <a:schemeClr val="tx1"/>
+            </a:fontRef>
+          </p:style>
+          <p:txBody>
+            <a:bodyPr rtlCol="0" anchor="ctr"/>
+            <a:lstStyle/>
+            <a:p>
+              <a:pPr algn="ctr"/>
+              <a:endParaRPr lang="en-ZA"/>
+            </a:p>
+          </p:txBody>
+        </p:sp>
+        <mc:AlternateContent xmlns:mc="http://schemas.openxmlformats.org/markup-compatibility/2006">
+          <mc:Choice xmlns:a14="http://schemas.microsoft.com/office/drawing/2010/main" Requires="a14">
+            <p:sp>
+              <p:nvSpPr>
+                <p:cNvPr id="32" name="TextBox 31">
+                  <a:extLst>
+                    <a:ext uri="{FF2B5EF4-FFF2-40B4-BE49-F238E27FC236}">
+                      <a16:creationId xmlns:a16="http://schemas.microsoft.com/office/drawing/2014/main" id="{B71BB3F2-5F4F-2481-DFBD-06F173C29A3D}"/>
+                    </a:ext>
+                  </a:extLst>
+                </p:cNvPr>
+                <p:cNvSpPr txBox="1"/>
+                <p:nvPr/>
+              </p:nvSpPr>
+              <p:spPr>
+                <a:xfrm>
+                  <a:off x="5882641" y="2658148"/>
+                  <a:ext cx="457199" cy="307777"/>
+                </a:xfrm>
+                <a:prstGeom prst="rect">
+                  <a:avLst/>
+                </a:prstGeom>
+                <a:noFill/>
+              </p:spPr>
+              <p:txBody>
+                <a:bodyPr wrap="square" rtlCol="0">
+                  <a:spAutoFit/>
+                </a:bodyPr>
+                <a:lstStyle/>
+                <a:p>
+                  <a14:m>
+                    <m:oMathPara xmlns:m="http://schemas.openxmlformats.org/officeDocument/2006/math">
+                      <m:oMathParaPr>
+                        <m:jc m:val="centerGroup"/>
+                      </m:oMathParaPr>
+                      <m:oMath xmlns:m="http://schemas.openxmlformats.org/officeDocument/2006/math">
+                        <m:r>
+                          <a:rPr lang="en-GB" sz="1400" i="1" dirty="0" smtClean="0">
+                            <a:latin typeface="Cambria Math" panose="02040503050406030204" pitchFamily="18" charset="0"/>
+                            <a:ea typeface="Cambria Math" panose="02040503050406030204" pitchFamily="18" charset="0"/>
+                          </a:rPr>
+                          <m:t>𝜃</m:t>
+                        </m:r>
+                      </m:oMath>
+                    </m:oMathPara>
+                  </a14:m>
+                  <a:endParaRPr lang="en-ZA" sz="1400" dirty="0"/>
+                </a:p>
+              </p:txBody>
+            </p:sp>
+          </mc:Choice>
+          <mc:Fallback>
+            <p:sp>
+              <p:nvSpPr>
+                <p:cNvPr id="32" name="TextBox 31">
+                  <a:extLst>
+                    <a:ext uri="{FF2B5EF4-FFF2-40B4-BE49-F238E27FC236}">
+                      <a16:creationId xmlns:a16="http://schemas.microsoft.com/office/drawing/2014/main" id="{B71BB3F2-5F4F-2481-DFBD-06F173C29A3D}"/>
+                    </a:ext>
+                  </a:extLst>
+                </p:cNvPr>
+                <p:cNvSpPr txBox="1">
+                  <a:spLocks noRot="1" noChangeAspect="1" noMove="1" noResize="1" noEditPoints="1" noAdjustHandles="1" noChangeArrowheads="1" noChangeShapeType="1" noTextEdit="1"/>
+                </p:cNvSpPr>
+                <p:nvPr/>
+              </p:nvSpPr>
+              <p:spPr>
+                <a:xfrm>
+                  <a:off x="5882641" y="2658148"/>
+                  <a:ext cx="457199" cy="307777"/>
+                </a:xfrm>
+                <a:prstGeom prst="rect">
+                  <a:avLst/>
+                </a:prstGeom>
+                <a:blipFill>
+                  <a:blip r:embed="rId5"/>
+                  <a:stretch>
+                    <a:fillRect/>
+                  </a:stretch>
+                </a:blipFill>
+              </p:spPr>
+              <p:txBody>
+                <a:bodyPr/>
+                <a:lstStyle/>
+                <a:p>
+                  <a:r>
+                    <a:rPr lang="en-ZA">
+                      <a:noFill/>
+                    </a:rPr>
+                    <a:t> </a:t>
+                  </a:r>
+                </a:p>
+              </p:txBody>
+            </p:sp>
+          </mc:Fallback>
+        </mc:AlternateContent>
+        <mc:AlternateContent xmlns:mc="http://schemas.openxmlformats.org/markup-compatibility/2006">
+          <mc:Choice xmlns:a14="http://schemas.microsoft.com/office/drawing/2010/main" Requires="a14">
+            <p:sp>
+              <p:nvSpPr>
+                <p:cNvPr id="33" name="TextBox 32">
+                  <a:extLst>
+                    <a:ext uri="{FF2B5EF4-FFF2-40B4-BE49-F238E27FC236}">
+                      <a16:creationId xmlns:a16="http://schemas.microsoft.com/office/drawing/2014/main" id="{7CCA8529-4CA7-DD3F-5314-53197BD15C2D}"/>
+                    </a:ext>
+                  </a:extLst>
+                </p:cNvPr>
+                <p:cNvSpPr txBox="1"/>
+                <p:nvPr/>
+              </p:nvSpPr>
+              <p:spPr>
+                <a:xfrm rot="18570550">
+                  <a:off x="5537200" y="1812905"/>
+                  <a:ext cx="1158240" cy="307777"/>
+                </a:xfrm>
+                <a:prstGeom prst="rect">
+                  <a:avLst/>
+                </a:prstGeom>
+                <a:noFill/>
+              </p:spPr>
+              <p:txBody>
+                <a:bodyPr wrap="square" rtlCol="0">
+                  <a:spAutoFit/>
+                </a:bodyPr>
+                <a:lstStyle/>
+                <a:p>
+                  <a:pPr algn="ctr"/>
+                  <a:r>
+                    <a:rPr lang="en-GB" sz="1400" dirty="0"/>
+                    <a:t>Length </a:t>
+                  </a:r>
+                  <a14:m>
+                    <m:oMath xmlns:m="http://schemas.openxmlformats.org/officeDocument/2006/math">
+                      <m:r>
+                        <a:rPr lang="en-GB" sz="1400" i="1" dirty="0" smtClean="0">
+                          <a:latin typeface="Cambria Math" panose="02040503050406030204" pitchFamily="18" charset="0"/>
+                        </a:rPr>
+                        <m:t>= </m:t>
+                      </m:r>
+                      <m:r>
+                        <a:rPr lang="en-GB" sz="1400" b="0" i="1" dirty="0" smtClean="0">
+                          <a:latin typeface="Cambria Math" panose="02040503050406030204" pitchFamily="18" charset="0"/>
+                        </a:rPr>
+                        <m:t>𝑟</m:t>
+                      </m:r>
+                    </m:oMath>
+                  </a14:m>
+                  <a:endParaRPr lang="en-ZA" sz="1400" dirty="0"/>
+                </a:p>
+              </p:txBody>
+            </p:sp>
+          </mc:Choice>
+          <mc:Fallback>
+            <p:sp>
+              <p:nvSpPr>
+                <p:cNvPr id="33" name="TextBox 32">
+                  <a:extLst>
+                    <a:ext uri="{FF2B5EF4-FFF2-40B4-BE49-F238E27FC236}">
+                      <a16:creationId xmlns:a16="http://schemas.microsoft.com/office/drawing/2014/main" id="{7CCA8529-4CA7-DD3F-5314-53197BD15C2D}"/>
+                    </a:ext>
+                  </a:extLst>
+                </p:cNvPr>
+                <p:cNvSpPr txBox="1">
+                  <a:spLocks noRot="1" noChangeAspect="1" noMove="1" noResize="1" noEditPoints="1" noAdjustHandles="1" noChangeArrowheads="1" noChangeShapeType="1" noTextEdit="1"/>
+                </p:cNvSpPr>
+                <p:nvPr/>
+              </p:nvSpPr>
+              <p:spPr>
+                <a:xfrm rot="18570550">
+                  <a:off x="5537200" y="1812905"/>
+                  <a:ext cx="1158240" cy="307777"/>
+                </a:xfrm>
+                <a:prstGeom prst="rect">
+                  <a:avLst/>
+                </a:prstGeom>
+                <a:blipFill>
+                  <a:blip r:embed="rId6"/>
+                  <a:stretch>
+                    <a:fillRect b="-1117"/>
+                  </a:stretch>
+                </a:blipFill>
+              </p:spPr>
+              <p:txBody>
+                <a:bodyPr/>
+                <a:lstStyle/>
+                <a:p>
+                  <a:r>
+                    <a:rPr lang="en-ZA">
+                      <a:noFill/>
+                    </a:rPr>
+                    <a:t> </a:t>
+                  </a:r>
+                </a:p>
+              </p:txBody>
+            </p:sp>
+          </mc:Fallback>
+        </mc:AlternateContent>
+        <mc:AlternateContent xmlns:mc="http://schemas.openxmlformats.org/markup-compatibility/2006">
+          <mc:Choice xmlns:a14="http://schemas.microsoft.com/office/drawing/2010/main" Requires="a14">
+            <p:sp>
+              <p:nvSpPr>
+                <p:cNvPr id="34" name="TextBox 33">
+                  <a:extLst>
+                    <a:ext uri="{FF2B5EF4-FFF2-40B4-BE49-F238E27FC236}">
+                      <a16:creationId xmlns:a16="http://schemas.microsoft.com/office/drawing/2014/main" id="{9BD4D525-1F50-CA4C-F4C8-C5CEEBFC6EEA}"/>
+                    </a:ext>
+                  </a:extLst>
+                </p:cNvPr>
+                <p:cNvSpPr txBox="1"/>
+                <p:nvPr/>
+              </p:nvSpPr>
+              <p:spPr>
+                <a:xfrm>
+                  <a:off x="5717545" y="1085625"/>
+                  <a:ext cx="2044690" cy="307777"/>
+                </a:xfrm>
+                <a:prstGeom prst="rect">
+                  <a:avLst/>
+                </a:prstGeom>
+                <a:noFill/>
+              </p:spPr>
+              <p:txBody>
+                <a:bodyPr wrap="square" rtlCol="0">
+                  <a:spAutoFit/>
+                </a:bodyPr>
+                <a:lstStyle/>
+                <a:p>
+                  <a14:m>
+                    <m:oMathPara xmlns:m="http://schemas.openxmlformats.org/officeDocument/2006/math">
+                      <m:oMathParaPr>
+                        <m:jc m:val="centerGroup"/>
+                      </m:oMathParaPr>
+                      <m:oMath xmlns:m="http://schemas.openxmlformats.org/officeDocument/2006/math">
+                        <m:r>
+                          <a:rPr lang="en-GB" sz="1400" i="1" dirty="0" smtClean="0">
+                            <a:latin typeface="Cambria Math" panose="02040503050406030204" pitchFamily="18" charset="0"/>
+                          </a:rPr>
+                          <m:t>𝑃</m:t>
+                        </m:r>
+                        <m:r>
+                          <a:rPr lang="en-GB" sz="1400" i="1" dirty="0" smtClean="0">
+                            <a:latin typeface="Cambria Math" panose="02040503050406030204" pitchFamily="18" charset="0"/>
+                          </a:rPr>
+                          <m:t>=</m:t>
+                        </m:r>
+                        <m:r>
+                          <a:rPr lang="en-GB" sz="1400" i="1" dirty="0" smtClean="0">
+                            <a:latin typeface="Cambria Math" panose="02040503050406030204" pitchFamily="18" charset="0"/>
+                          </a:rPr>
+                          <m:t>𝑐</m:t>
+                        </m:r>
+                        <m:r>
+                          <a:rPr lang="en-GB" sz="1400" i="1" dirty="0" smtClean="0">
+                            <a:latin typeface="Cambria Math" panose="02040503050406030204" pitchFamily="18" charset="0"/>
+                          </a:rPr>
+                          <m:t>(</m:t>
+                        </m:r>
+                        <m:r>
+                          <a:rPr lang="en-GB" sz="1400" b="0" i="1" dirty="0" smtClean="0">
+                            <a:latin typeface="Cambria Math" panose="02040503050406030204" pitchFamily="18" charset="0"/>
+                          </a:rPr>
+                          <m:t>𝑟𝑐𝑜𝑠</m:t>
+                        </m:r>
+                        <m:r>
+                          <a:rPr lang="en-GB" sz="1400" b="0" i="1" dirty="0" smtClean="0">
+                            <a:latin typeface="Cambria Math" panose="02040503050406030204" pitchFamily="18" charset="0"/>
+                          </a:rPr>
+                          <m:t>(</m:t>
+                        </m:r>
+                        <m:r>
+                          <a:rPr lang="en-GB" sz="1400" b="0" i="1" dirty="0" smtClean="0">
+                            <a:latin typeface="Cambria Math" panose="02040503050406030204" pitchFamily="18" charset="0"/>
+                            <a:ea typeface="Cambria Math" panose="02040503050406030204" pitchFamily="18" charset="0"/>
+                          </a:rPr>
+                          <m:t>𝜃</m:t>
+                        </m:r>
+                        <m:r>
+                          <a:rPr lang="en-GB" sz="1400" b="0" i="1" dirty="0" smtClean="0">
+                            <a:latin typeface="Cambria Math" panose="02040503050406030204" pitchFamily="18" charset="0"/>
+                          </a:rPr>
+                          <m:t>),</m:t>
+                        </m:r>
+                        <m:r>
+                          <a:rPr lang="en-GB" sz="1400" i="1" dirty="0">
+                            <a:latin typeface="Cambria Math" panose="02040503050406030204" pitchFamily="18" charset="0"/>
+                          </a:rPr>
+                          <m:t>𝑟</m:t>
+                        </m:r>
+                        <m:r>
+                          <a:rPr lang="en-GB" sz="1400" b="0" i="1" dirty="0" smtClean="0">
+                            <a:latin typeface="Cambria Math" panose="02040503050406030204" pitchFamily="18" charset="0"/>
+                          </a:rPr>
+                          <m:t>𝑠𝑖𝑛</m:t>
+                        </m:r>
+                        <m:r>
+                          <a:rPr lang="en-GB" sz="1400" i="1" dirty="0">
+                            <a:latin typeface="Cambria Math" panose="02040503050406030204" pitchFamily="18" charset="0"/>
+                          </a:rPr>
+                          <m:t>(</m:t>
+                        </m:r>
+                        <m:r>
+                          <a:rPr lang="en-GB" sz="1400" i="1" dirty="0">
+                            <a:latin typeface="Cambria Math" panose="02040503050406030204" pitchFamily="18" charset="0"/>
+                            <a:ea typeface="Cambria Math" panose="02040503050406030204" pitchFamily="18" charset="0"/>
+                          </a:rPr>
+                          <m:t>𝜃</m:t>
+                        </m:r>
+                        <m:r>
+                          <a:rPr lang="en-GB" sz="1400" i="1" dirty="0">
+                            <a:latin typeface="Cambria Math" panose="02040503050406030204" pitchFamily="18" charset="0"/>
+                          </a:rPr>
+                          <m:t>)</m:t>
+                        </m:r>
+                        <m:r>
+                          <a:rPr lang="en-GB" sz="1400" i="1" dirty="0" smtClean="0">
+                            <a:latin typeface="Cambria Math" panose="02040503050406030204" pitchFamily="18" charset="0"/>
+                          </a:rPr>
+                          <m:t>)</m:t>
+                        </m:r>
+                      </m:oMath>
+                    </m:oMathPara>
+                  </a14:m>
+                  <a:endParaRPr lang="en-ZA" sz="1400" dirty="0"/>
+                </a:p>
+              </p:txBody>
+            </p:sp>
+          </mc:Choice>
+          <mc:Fallback>
+            <p:sp>
+              <p:nvSpPr>
+                <p:cNvPr id="34" name="TextBox 33">
+                  <a:extLst>
+                    <a:ext uri="{FF2B5EF4-FFF2-40B4-BE49-F238E27FC236}">
+                      <a16:creationId xmlns:a16="http://schemas.microsoft.com/office/drawing/2014/main" id="{9BD4D525-1F50-CA4C-F4C8-C5CEEBFC6EEA}"/>
+                    </a:ext>
+                  </a:extLst>
+                </p:cNvPr>
+                <p:cNvSpPr txBox="1">
+                  <a:spLocks noRot="1" noChangeAspect="1" noMove="1" noResize="1" noEditPoints="1" noAdjustHandles="1" noChangeArrowheads="1" noChangeShapeType="1" noTextEdit="1"/>
+                </p:cNvSpPr>
+                <p:nvPr/>
+              </p:nvSpPr>
+              <p:spPr>
+                <a:xfrm>
+                  <a:off x="5717545" y="1085625"/>
+                  <a:ext cx="2044690" cy="307777"/>
+                </a:xfrm>
+                <a:prstGeom prst="rect">
+                  <a:avLst/>
+                </a:prstGeom>
+                <a:blipFill>
+                  <a:blip r:embed="rId7"/>
+                  <a:stretch>
+                    <a:fillRect b="-5882"/>
+                  </a:stretch>
+                </a:blipFill>
+              </p:spPr>
+              <p:txBody>
+                <a:bodyPr/>
+                <a:lstStyle/>
+                <a:p>
+                  <a:r>
+                    <a:rPr lang="en-ZA">
+                      <a:noFill/>
+                    </a:rPr>
+                    <a:t> </a:t>
+                  </a:r>
+                </a:p>
+              </p:txBody>
+            </p:sp>
+          </mc:Fallback>
+        </mc:AlternateContent>
+        <p:sp>
+          <p:nvSpPr>
+            <p:cNvPr id="35" name="TextBox 34">
+              <a:extLst>
+                <a:ext uri="{FF2B5EF4-FFF2-40B4-BE49-F238E27FC236}">
+                  <a16:creationId xmlns:a16="http://schemas.microsoft.com/office/drawing/2014/main" id="{2DDF5D9F-021C-0AFA-3C52-9B944BEDCBF4}"/>
+                </a:ext>
+              </a:extLst>
+            </p:cNvPr>
+            <p:cNvSpPr txBox="1"/>
+            <p:nvPr/>
+          </p:nvSpPr>
+          <p:spPr>
+            <a:xfrm>
+              <a:off x="589280" y="373244"/>
+              <a:ext cx="3738880" cy="307777"/>
+            </a:xfrm>
+            <a:prstGeom prst="rect">
+              <a:avLst/>
+            </a:prstGeom>
+            <a:noFill/>
+          </p:spPr>
+          <p:txBody>
+            <a:bodyPr wrap="square" rtlCol="0">
+              <a:spAutoFit/>
+            </a:bodyPr>
+            <a:lstStyle/>
+            <a:p>
+              <a:r>
+                <a:rPr lang="en-GB" sz="1400" dirty="0"/>
+                <a:t>Cartesian coordinates for referencing a point P </a:t>
+              </a:r>
+              <a:endParaRPr lang="en-ZA" sz="1400" dirty="0"/>
+            </a:p>
+          </p:txBody>
+        </p:sp>
+        <p:sp>
+          <p:nvSpPr>
+            <p:cNvPr id="36" name="TextBox 35">
+              <a:extLst>
+                <a:ext uri="{FF2B5EF4-FFF2-40B4-BE49-F238E27FC236}">
+                  <a16:creationId xmlns:a16="http://schemas.microsoft.com/office/drawing/2014/main" id="{DE1FF385-9A46-4B65-C10E-EDBC8E2F07A8}"/>
+                </a:ext>
+              </a:extLst>
+            </p:cNvPr>
+            <p:cNvSpPr txBox="1"/>
+            <p:nvPr/>
+          </p:nvSpPr>
+          <p:spPr>
+            <a:xfrm>
+              <a:off x="4564381" y="373244"/>
+              <a:ext cx="3431537" cy="307777"/>
+            </a:xfrm>
+            <a:prstGeom prst="rect">
+              <a:avLst/>
+            </a:prstGeom>
+            <a:noFill/>
+          </p:spPr>
+          <p:txBody>
+            <a:bodyPr wrap="square" rtlCol="0">
+              <a:spAutoFit/>
+            </a:bodyPr>
+            <a:lstStyle/>
+            <a:p>
+              <a:r>
+                <a:rPr lang="en-GB" sz="1400" dirty="0"/>
+                <a:t>Polar coordinates for referencing a point P </a:t>
+              </a:r>
+              <a:endParaRPr lang="en-ZA" sz="1400" dirty="0"/>
+            </a:p>
+          </p:txBody>
+        </p:sp>
+        <mc:AlternateContent xmlns:mc="http://schemas.openxmlformats.org/markup-compatibility/2006">
+          <mc:Choice xmlns:a14="http://schemas.microsoft.com/office/drawing/2010/main" Requires="a14">
+            <p:sp>
+              <p:nvSpPr>
+                <p:cNvPr id="37" name="TextBox 36">
+                  <a:extLst>
+                    <a:ext uri="{FF2B5EF4-FFF2-40B4-BE49-F238E27FC236}">
+                      <a16:creationId xmlns:a16="http://schemas.microsoft.com/office/drawing/2014/main" id="{A8278057-E174-A85D-487C-ACADD9E8A3C5}"/>
+                    </a:ext>
+                  </a:extLst>
+                </p:cNvPr>
+                <p:cNvSpPr txBox="1"/>
+                <p:nvPr/>
+              </p:nvSpPr>
+              <p:spPr>
+                <a:xfrm>
+                  <a:off x="599439" y="3598435"/>
+                  <a:ext cx="7376161" cy="369332"/>
+                </a:xfrm>
+                <a:prstGeom prst="rect">
+                  <a:avLst/>
+                </a:prstGeom>
+                <a:noFill/>
+              </p:spPr>
+              <p:txBody>
+                <a:bodyPr wrap="square" rtlCol="0">
+                  <a:spAutoFit/>
+                </a:bodyPr>
+                <a:lstStyle/>
+                <a:p>
+                  <a14:m>
+                    <m:oMath xmlns:m="http://schemas.openxmlformats.org/officeDocument/2006/math">
+                      <m:func>
+                        <m:funcPr>
+                          <m:ctrlPr>
+                            <a:rPr lang="en-GB" b="0" i="1" smtClean="0">
+                              <a:latin typeface="Cambria Math" panose="02040503050406030204" pitchFamily="18" charset="0"/>
+                            </a:rPr>
+                          </m:ctrlPr>
+                        </m:funcPr>
+                        <m:fName>
+                          <m:r>
+                            <m:rPr>
+                              <m:sty m:val="p"/>
+                            </m:rPr>
+                            <a:rPr lang="en-GB" b="0" i="0" smtClean="0">
+                              <a:latin typeface="Cambria Math" panose="02040503050406030204" pitchFamily="18" charset="0"/>
+                            </a:rPr>
+                            <m:t>cos</m:t>
+                          </m:r>
+                        </m:fName>
+                        <m:e>
+                          <m:d>
+                            <m:dPr>
+                              <m:ctrlPr>
+                                <a:rPr lang="en-GB" b="0" i="1" smtClean="0">
+                                  <a:latin typeface="Cambria Math" panose="02040503050406030204" pitchFamily="18" charset="0"/>
+                                </a:rPr>
+                              </m:ctrlPr>
+                            </m:dPr>
+                            <m:e>
+                              <m:r>
+                                <a:rPr lang="en-GB" b="0" i="1" smtClean="0">
+                                  <a:latin typeface="Cambria Math" panose="02040503050406030204" pitchFamily="18" charset="0"/>
+                                  <a:ea typeface="Cambria Math" panose="02040503050406030204" pitchFamily="18" charset="0"/>
+                                </a:rPr>
+                                <m:t>𝜃</m:t>
+                              </m:r>
+                            </m:e>
+                          </m:d>
+                        </m:e>
+                      </m:func>
+                      <m:r>
+                        <a:rPr lang="en-GB" b="0" i="1" smtClean="0">
+                          <a:latin typeface="Cambria Math" panose="02040503050406030204" pitchFamily="18" charset="0"/>
+                          <a:ea typeface="Cambria Math" panose="02040503050406030204" pitchFamily="18" charset="0"/>
+                        </a:rPr>
+                        <m:t>=</m:t>
+                      </m:r>
+                      <m:f>
+                        <m:fPr>
+                          <m:type m:val="lin"/>
+                          <m:ctrlPr>
+                            <a:rPr lang="en-GB" b="0" i="1" smtClean="0">
+                              <a:latin typeface="Cambria Math" panose="02040503050406030204" pitchFamily="18" charset="0"/>
+                              <a:ea typeface="Cambria Math" panose="02040503050406030204" pitchFamily="18" charset="0"/>
+                            </a:rPr>
+                          </m:ctrlPr>
+                        </m:fPr>
+                        <m:num>
+                          <m:sSub>
+                            <m:sSubPr>
+                              <m:ctrlPr>
+                                <a:rPr lang="en-GB" b="0" i="1" smtClean="0">
+                                  <a:latin typeface="Cambria Math" panose="02040503050406030204" pitchFamily="18" charset="0"/>
+                                  <a:ea typeface="Cambria Math" panose="02040503050406030204" pitchFamily="18" charset="0"/>
+                                </a:rPr>
+                              </m:ctrlPr>
+                            </m:sSubPr>
+                            <m:e>
+                              <m:r>
+                                <a:rPr lang="en-GB" b="0" i="1" smtClean="0">
+                                  <a:latin typeface="Cambria Math" panose="02040503050406030204" pitchFamily="18" charset="0"/>
+                                  <a:ea typeface="Cambria Math" panose="02040503050406030204" pitchFamily="18" charset="0"/>
+                                </a:rPr>
+                                <m:t>𝑥</m:t>
+                              </m:r>
+                            </m:e>
+                            <m:sub>
+                              <m:r>
+                                <a:rPr lang="en-GB" b="0" i="1" smtClean="0">
+                                  <a:latin typeface="Cambria Math" panose="02040503050406030204" pitchFamily="18" charset="0"/>
+                                  <a:ea typeface="Cambria Math" panose="02040503050406030204" pitchFamily="18" charset="0"/>
+                                </a:rPr>
+                                <m:t>1</m:t>
+                              </m:r>
+                            </m:sub>
+                          </m:sSub>
+                        </m:num>
+                        <m:den>
+                          <m:r>
+                            <a:rPr lang="en-GB" b="0" i="1" smtClean="0">
+                              <a:latin typeface="Cambria Math" panose="02040503050406030204" pitchFamily="18" charset="0"/>
+                              <a:ea typeface="Cambria Math" panose="02040503050406030204" pitchFamily="18" charset="0"/>
+                            </a:rPr>
+                            <m:t>𝑟</m:t>
+                          </m:r>
+                        </m:den>
+                      </m:f>
+                    </m:oMath>
+                  </a14:m>
+                  <a:r>
+                    <a:rPr lang="en-ZA" dirty="0"/>
+                    <a:t>   i.e.   </a:t>
+                  </a:r>
+                  <a14:m>
+                    <m:oMath xmlns:m="http://schemas.openxmlformats.org/officeDocument/2006/math">
+                      <m:sSub>
+                        <m:sSubPr>
+                          <m:ctrlPr>
+                            <a:rPr lang="en-ZA" i="1" smtClean="0">
+                              <a:latin typeface="Cambria Math" panose="02040503050406030204" pitchFamily="18" charset="0"/>
+                            </a:rPr>
+                          </m:ctrlPr>
+                        </m:sSubPr>
+                        <m:e>
+                          <m:r>
+                            <a:rPr lang="en-GB" b="0" i="1" smtClean="0">
+                              <a:latin typeface="Cambria Math" panose="02040503050406030204" pitchFamily="18" charset="0"/>
+                            </a:rPr>
+                            <m:t>𝑥</m:t>
+                          </m:r>
+                        </m:e>
+                        <m:sub>
+                          <m:r>
+                            <a:rPr lang="en-GB" b="0" i="1" smtClean="0">
+                              <a:latin typeface="Cambria Math" panose="02040503050406030204" pitchFamily="18" charset="0"/>
+                            </a:rPr>
+                            <m:t>1</m:t>
+                          </m:r>
+                        </m:sub>
+                      </m:sSub>
+                      <m:r>
+                        <a:rPr lang="en-GB" b="0" i="1" smtClean="0">
+                          <a:latin typeface="Cambria Math" panose="02040503050406030204" pitchFamily="18" charset="0"/>
+                        </a:rPr>
+                        <m:t>=</m:t>
+                      </m:r>
+                      <m:r>
+                        <a:rPr lang="en-GB" b="0" i="1" smtClean="0">
+                          <a:latin typeface="Cambria Math" panose="02040503050406030204" pitchFamily="18" charset="0"/>
+                        </a:rPr>
+                        <m:t>𝑟𝑐𝑜𝑠</m:t>
+                      </m:r>
+                      <m:r>
+                        <a:rPr lang="en-GB" b="0" i="1" smtClean="0">
+                          <a:latin typeface="Cambria Math" panose="02040503050406030204" pitchFamily="18" charset="0"/>
+                        </a:rPr>
+                        <m:t>(</m:t>
+                      </m:r>
+                      <m:r>
+                        <a:rPr lang="en-GB" b="0" i="1" smtClean="0">
+                          <a:latin typeface="Cambria Math" panose="02040503050406030204" pitchFamily="18" charset="0"/>
+                          <a:ea typeface="Cambria Math" panose="02040503050406030204" pitchFamily="18" charset="0"/>
+                        </a:rPr>
+                        <m:t>𝜃</m:t>
+                      </m:r>
+                      <m:r>
+                        <a:rPr lang="en-GB" b="0" i="1" smtClean="0">
+                          <a:latin typeface="Cambria Math" panose="02040503050406030204" pitchFamily="18" charset="0"/>
+                          <a:ea typeface="Cambria Math" panose="02040503050406030204" pitchFamily="18" charset="0"/>
+                        </a:rPr>
+                        <m:t>)</m:t>
+                      </m:r>
+                    </m:oMath>
+                  </a14:m>
+                  <a:r>
+                    <a:rPr lang="en-ZA" dirty="0"/>
+                    <a:t>   and   </a:t>
+                  </a:r>
+                  <a14:m>
+                    <m:oMath xmlns:m="http://schemas.openxmlformats.org/officeDocument/2006/math">
+                      <m:func>
+                        <m:funcPr>
+                          <m:ctrlPr>
+                            <a:rPr lang="en-GB" b="0" i="1" smtClean="0">
+                              <a:latin typeface="Cambria Math" panose="02040503050406030204" pitchFamily="18" charset="0"/>
+                            </a:rPr>
+                          </m:ctrlPr>
+                        </m:funcPr>
+                        <m:fName>
+                          <m:r>
+                            <m:rPr>
+                              <m:sty m:val="p"/>
+                            </m:rPr>
+                            <a:rPr lang="en-GB" b="0" i="0" smtClean="0">
+                              <a:latin typeface="Cambria Math" panose="02040503050406030204" pitchFamily="18" charset="0"/>
+                            </a:rPr>
+                            <m:t>sin</m:t>
+                          </m:r>
+                        </m:fName>
+                        <m:e>
+                          <m:d>
+                            <m:dPr>
+                              <m:ctrlPr>
+                                <a:rPr lang="en-GB" b="0" i="1" smtClean="0">
+                                  <a:latin typeface="Cambria Math" panose="02040503050406030204" pitchFamily="18" charset="0"/>
+                                </a:rPr>
+                              </m:ctrlPr>
+                            </m:dPr>
+                            <m:e>
+                              <m:r>
+                                <a:rPr lang="en-GB" b="0" i="1" smtClean="0">
+                                  <a:latin typeface="Cambria Math" panose="02040503050406030204" pitchFamily="18" charset="0"/>
+                                  <a:ea typeface="Cambria Math" panose="02040503050406030204" pitchFamily="18" charset="0"/>
+                                </a:rPr>
+                                <m:t>𝜃</m:t>
+                              </m:r>
+                            </m:e>
+                          </m:d>
+                        </m:e>
+                      </m:func>
+                      <m:r>
+                        <a:rPr lang="en-GB" b="0" i="1" smtClean="0">
+                          <a:latin typeface="Cambria Math" panose="02040503050406030204" pitchFamily="18" charset="0"/>
+                          <a:ea typeface="Cambria Math" panose="02040503050406030204" pitchFamily="18" charset="0"/>
+                        </a:rPr>
+                        <m:t>=</m:t>
+                      </m:r>
+                      <m:f>
+                        <m:fPr>
+                          <m:type m:val="lin"/>
+                          <m:ctrlPr>
+                            <a:rPr lang="en-GB" b="0" i="1" smtClean="0">
+                              <a:latin typeface="Cambria Math" panose="02040503050406030204" pitchFamily="18" charset="0"/>
+                              <a:ea typeface="Cambria Math" panose="02040503050406030204" pitchFamily="18" charset="0"/>
+                            </a:rPr>
+                          </m:ctrlPr>
+                        </m:fPr>
+                        <m:num>
+                          <m:sSub>
+                            <m:sSubPr>
+                              <m:ctrlPr>
+                                <a:rPr lang="en-GB" b="0" i="1" smtClean="0">
+                                  <a:latin typeface="Cambria Math" panose="02040503050406030204" pitchFamily="18" charset="0"/>
+                                  <a:ea typeface="Cambria Math" panose="02040503050406030204" pitchFamily="18" charset="0"/>
+                                </a:rPr>
+                              </m:ctrlPr>
+                            </m:sSubPr>
+                            <m:e>
+                              <m:r>
+                                <a:rPr lang="en-GB" b="0" i="1" smtClean="0">
+                                  <a:latin typeface="Cambria Math" panose="02040503050406030204" pitchFamily="18" charset="0"/>
+                                  <a:ea typeface="Cambria Math" panose="02040503050406030204" pitchFamily="18" charset="0"/>
+                                </a:rPr>
+                                <m:t>𝑦</m:t>
+                              </m:r>
+                            </m:e>
+                            <m:sub>
+                              <m:r>
+                                <a:rPr lang="en-GB" b="0" i="1" smtClean="0">
+                                  <a:latin typeface="Cambria Math" panose="02040503050406030204" pitchFamily="18" charset="0"/>
+                                  <a:ea typeface="Cambria Math" panose="02040503050406030204" pitchFamily="18" charset="0"/>
+                                </a:rPr>
+                                <m:t>1</m:t>
+                              </m:r>
+                            </m:sub>
+                          </m:sSub>
+                        </m:num>
+                        <m:den>
+                          <m:r>
+                            <a:rPr lang="en-GB" b="0" i="1" smtClean="0">
+                              <a:latin typeface="Cambria Math" panose="02040503050406030204" pitchFamily="18" charset="0"/>
+                              <a:ea typeface="Cambria Math" panose="02040503050406030204" pitchFamily="18" charset="0"/>
+                            </a:rPr>
+                            <m:t>𝑟</m:t>
+                          </m:r>
+                        </m:den>
+                      </m:f>
+                    </m:oMath>
+                  </a14:m>
+                  <a:r>
+                    <a:rPr lang="en-ZA" dirty="0"/>
+                    <a:t>   i.e.   </a:t>
+                  </a:r>
+                  <a14:m>
+                    <m:oMath xmlns:m="http://schemas.openxmlformats.org/officeDocument/2006/math">
+                      <m:sSub>
+                        <m:sSubPr>
+                          <m:ctrlPr>
+                            <a:rPr lang="en-ZA" i="1" smtClean="0">
+                              <a:latin typeface="Cambria Math" panose="02040503050406030204" pitchFamily="18" charset="0"/>
+                            </a:rPr>
+                          </m:ctrlPr>
+                        </m:sSubPr>
+                        <m:e>
+                          <m:r>
+                            <a:rPr lang="en-GB" b="0" i="1" smtClean="0">
+                              <a:latin typeface="Cambria Math" panose="02040503050406030204" pitchFamily="18" charset="0"/>
+                            </a:rPr>
+                            <m:t>𝑦</m:t>
+                          </m:r>
+                        </m:e>
+                        <m:sub>
+                          <m:r>
+                            <a:rPr lang="en-GB" b="0" i="1" smtClean="0">
+                              <a:latin typeface="Cambria Math" panose="02040503050406030204" pitchFamily="18" charset="0"/>
+                            </a:rPr>
+                            <m:t>1</m:t>
+                          </m:r>
+                        </m:sub>
+                      </m:sSub>
+                      <m:r>
+                        <a:rPr lang="en-GB" b="0" i="1" smtClean="0">
+                          <a:latin typeface="Cambria Math" panose="02040503050406030204" pitchFamily="18" charset="0"/>
+                        </a:rPr>
+                        <m:t>=</m:t>
+                      </m:r>
+                      <m:r>
+                        <a:rPr lang="en-GB" b="0" i="1" smtClean="0">
+                          <a:latin typeface="Cambria Math" panose="02040503050406030204" pitchFamily="18" charset="0"/>
+                        </a:rPr>
+                        <m:t>𝑟𝑠𝑖𝑛</m:t>
+                      </m:r>
+                      <m:r>
+                        <a:rPr lang="en-GB" b="0" i="1" smtClean="0">
+                          <a:latin typeface="Cambria Math" panose="02040503050406030204" pitchFamily="18" charset="0"/>
+                        </a:rPr>
+                        <m:t>(</m:t>
+                      </m:r>
+                      <m:r>
+                        <a:rPr lang="en-GB" b="0" i="1" smtClean="0">
+                          <a:latin typeface="Cambria Math" panose="02040503050406030204" pitchFamily="18" charset="0"/>
+                          <a:ea typeface="Cambria Math" panose="02040503050406030204" pitchFamily="18" charset="0"/>
+                        </a:rPr>
+                        <m:t>𝜃</m:t>
+                      </m:r>
+                      <m:r>
+                        <a:rPr lang="en-GB" b="0" i="1" smtClean="0">
+                          <a:latin typeface="Cambria Math" panose="02040503050406030204" pitchFamily="18" charset="0"/>
+                          <a:ea typeface="Cambria Math" panose="02040503050406030204" pitchFamily="18" charset="0"/>
+                        </a:rPr>
+                        <m:t>)</m:t>
+                      </m:r>
+                    </m:oMath>
+                  </a14:m>
+                  <a:endParaRPr lang="en-ZA" dirty="0"/>
+                </a:p>
+              </p:txBody>
+            </p:sp>
+          </mc:Choice>
+          <mc:Fallback>
+            <p:sp>
+              <p:nvSpPr>
+                <p:cNvPr id="37" name="TextBox 36">
+                  <a:extLst>
+                    <a:ext uri="{FF2B5EF4-FFF2-40B4-BE49-F238E27FC236}">
+                      <a16:creationId xmlns:a16="http://schemas.microsoft.com/office/drawing/2014/main" id="{A8278057-E174-A85D-487C-ACADD9E8A3C5}"/>
+                    </a:ext>
+                  </a:extLst>
+                </p:cNvPr>
+                <p:cNvSpPr txBox="1">
+                  <a:spLocks noRot="1" noChangeAspect="1" noMove="1" noResize="1" noEditPoints="1" noAdjustHandles="1" noChangeArrowheads="1" noChangeShapeType="1" noTextEdit="1"/>
+                </p:cNvSpPr>
+                <p:nvPr/>
+              </p:nvSpPr>
+              <p:spPr>
+                <a:xfrm>
+                  <a:off x="599439" y="3598435"/>
+                  <a:ext cx="7376161" cy="369332"/>
+                </a:xfrm>
+                <a:prstGeom prst="rect">
+                  <a:avLst/>
+                </a:prstGeom>
+                <a:blipFill>
+                  <a:blip r:embed="rId8"/>
+                  <a:stretch>
+                    <a:fillRect t="-116393" b="-175410"/>
+                  </a:stretch>
+                </a:blipFill>
+              </p:spPr>
+              <p:txBody>
+                <a:bodyPr/>
+                <a:lstStyle/>
+                <a:p>
+                  <a:r>
+                    <a:rPr lang="en-ZA">
+                      <a:noFill/>
+                    </a:rPr>
+                    <a:t> </a:t>
+                  </a:r>
+                </a:p>
+              </p:txBody>
+            </p:sp>
+          </mc:Fallback>
+        </mc:AlternateContent>
+      </p:grpSp>
+    </p:spTree>
+    <p:extLst>
+      <p:ext uri="{BB962C8B-B14F-4D97-AF65-F5344CB8AC3E}">
+        <p14:creationId xmlns:p14="http://schemas.microsoft.com/office/powerpoint/2010/main" val="4015766007"/>
+      </p:ext>
+    </p:extLst>
+  </p:cSld>
+  <p:clrMapOvr>
+    <a:masterClrMapping/>
+  </p:clrMapOvr>
+</p:sld>
+</file>
+
 <file path=ppt/theme/theme1.xml><?xml version="1.0" encoding="utf-8"?>
 <a:theme xmlns:a="http://schemas.openxmlformats.org/drawingml/2006/main" name="Office Theme">
   <a:themeElements>

</xml_diff>

<commit_message>
Sections 7.1 - 7.7
</commit_message>
<xml_diff>
--- a/figures.pptx
+++ b/figures.pptx
@@ -8,6 +8,7 @@
     <p:sldId id="256" r:id="rId2"/>
     <p:sldId id="257" r:id="rId3"/>
     <p:sldId id="258" r:id="rId4"/>
+    <p:sldId id="259" r:id="rId5"/>
   </p:sldIdLst>
   <p:sldSz cx="12192000" cy="6858000"/>
   <p:notesSz cx="6858000" cy="9144000"/>
@@ -117,7 +118,7 @@
 <file path=ppt/revisionInfo.xml><?xml version="1.0" encoding="utf-8"?>
 <p1510:revInfo xmlns:a="http://schemas.openxmlformats.org/drawingml/2006/main" xmlns:r="http://schemas.openxmlformats.org/officeDocument/2006/relationships" xmlns:p1510="http://schemas.microsoft.com/office/powerpoint/2015/10/main">
   <p1510:revLst>
-    <p1510:client id="{E9BFA566-E94F-41CE-9F87-81DD51602D68}" v="169" dt="2025-05-15T14:52:57.823"/>
+    <p1510:client id="{E9BFA566-E94F-41CE-9F87-81DD51602D68}" v="189" dt="2025-05-19T15:57:09.898"/>
   </p1510:revLst>
 </p1510:revInfo>
 </file>
@@ -127,7 +128,7 @@
   <pc:docChgLst>
     <pc:chgData name="Lubbe, S [slubbe@sun.ac.za]" userId="656cc105-77ab-4b7b-bc17-2448ac205142" providerId="ADAL" clId="{E9BFA566-E94F-41CE-9F87-81DD51602D68}"/>
     <pc:docChg chg="undo custSel addSld modSld sldOrd">
-      <pc:chgData name="Lubbe, S [slubbe@sun.ac.za]" userId="656cc105-77ab-4b7b-bc17-2448ac205142" providerId="ADAL" clId="{E9BFA566-E94F-41CE-9F87-81DD51602D68}" dt="2025-05-15T14:52:57.823" v="639" actId="164"/>
+      <pc:chgData name="Lubbe, S [slubbe@sun.ac.za]" userId="656cc105-77ab-4b7b-bc17-2448ac205142" providerId="ADAL" clId="{E9BFA566-E94F-41CE-9F87-81DD51602D68}" dt="2025-05-19T15:57:09.898" v="1434" actId="164"/>
       <pc:docMkLst>
         <pc:docMk/>
       </pc:docMkLst>
@@ -360,14 +361,6 @@
             <ac:grpSpMk id="14" creationId="{D6D765F0-8B15-82D9-42E2-6EFC3720A422}"/>
           </ac:grpSpMkLst>
         </pc:grpChg>
-        <pc:graphicFrameChg chg="add del mod">
-          <ac:chgData name="Lubbe, S [slubbe@sun.ac.za]" userId="656cc105-77ab-4b7b-bc17-2448ac205142" providerId="ADAL" clId="{E9BFA566-E94F-41CE-9F87-81DD51602D68}" dt="2025-05-14T10:14:35.895" v="228"/>
-          <ac:graphicFrameMkLst>
-            <pc:docMk/>
-            <pc:sldMk cId="1115085580" sldId="257"/>
-            <ac:graphicFrameMk id="2" creationId="{E703DEA4-B29C-D4E0-8215-2C1FF7367520}"/>
-          </ac:graphicFrameMkLst>
-        </pc:graphicFrameChg>
       </pc:sldChg>
       <pc:sldChg chg="addSp delSp modSp new mod ord">
         <pc:chgData name="Lubbe, S [slubbe@sun.ac.za]" userId="656cc105-77ab-4b7b-bc17-2448ac205142" providerId="ADAL" clId="{E9BFA566-E94F-41CE-9F87-81DD51602D68}" dt="2025-05-15T14:52:57.823" v="639" actId="164"/>
@@ -551,14 +544,6 @@
             <ac:cxnSpMk id="10" creationId="{61DCAD94-22DB-3152-DADE-96949813B283}"/>
           </ac:cxnSpMkLst>
         </pc:cxnChg>
-        <pc:cxnChg chg="add del mod">
-          <ac:chgData name="Lubbe, S [slubbe@sun.ac.za]" userId="656cc105-77ab-4b7b-bc17-2448ac205142" providerId="ADAL" clId="{E9BFA566-E94F-41CE-9F87-81DD51602D68}" dt="2025-05-15T14:40:47.035" v="341" actId="478"/>
-          <ac:cxnSpMkLst>
-            <pc:docMk/>
-            <pc:sldMk cId="4015766007" sldId="258"/>
-            <ac:cxnSpMk id="16" creationId="{408794D3-B062-44C4-D0EE-25A59A7E3FB8}"/>
-          </ac:cxnSpMkLst>
-        </pc:cxnChg>
         <pc:cxnChg chg="add mod">
           <ac:chgData name="Lubbe, S [slubbe@sun.ac.za]" userId="656cc105-77ab-4b7b-bc17-2448ac205142" providerId="ADAL" clId="{E9BFA566-E94F-41CE-9F87-81DD51602D68}" dt="2025-05-15T14:42:04.548" v="351" actId="208"/>
           <ac:cxnSpMkLst>
@@ -581,6 +566,213 @@
             <pc:docMk/>
             <pc:sldMk cId="4015766007" sldId="258"/>
             <ac:cxnSpMk id="30" creationId="{F5E9DEE6-2654-B5D6-9AAB-1D5DAAF5817C}"/>
+          </ac:cxnSpMkLst>
+        </pc:cxnChg>
+      </pc:sldChg>
+      <pc:sldChg chg="addSp delSp modSp new mod">
+        <pc:chgData name="Lubbe, S [slubbe@sun.ac.za]" userId="656cc105-77ab-4b7b-bc17-2448ac205142" providerId="ADAL" clId="{E9BFA566-E94F-41CE-9F87-81DD51602D68}" dt="2025-05-19T15:57:09.898" v="1434" actId="164"/>
+        <pc:sldMkLst>
+          <pc:docMk/>
+          <pc:sldMk cId="3554369724" sldId="259"/>
+        </pc:sldMkLst>
+        <pc:spChg chg="add mod">
+          <ac:chgData name="Lubbe, S [slubbe@sun.ac.za]" userId="656cc105-77ab-4b7b-bc17-2448ac205142" providerId="ADAL" clId="{E9BFA566-E94F-41CE-9F87-81DD51602D68}" dt="2025-05-19T15:56:27.686" v="1430" actId="164"/>
+          <ac:spMkLst>
+            <pc:docMk/>
+            <pc:sldMk cId="3554369724" sldId="259"/>
+            <ac:spMk id="2" creationId="{C5F67D7B-7191-C84E-C420-B93B75DA615B}"/>
+          </ac:spMkLst>
+        </pc:spChg>
+        <pc:spChg chg="add mod">
+          <ac:chgData name="Lubbe, S [slubbe@sun.ac.za]" userId="656cc105-77ab-4b7b-bc17-2448ac205142" providerId="ADAL" clId="{E9BFA566-E94F-41CE-9F87-81DD51602D68}" dt="2025-05-19T15:56:27.686" v="1430" actId="164"/>
+          <ac:spMkLst>
+            <pc:docMk/>
+            <pc:sldMk cId="3554369724" sldId="259"/>
+            <ac:spMk id="3" creationId="{59880459-2815-A508-8499-0E77FC136E74}"/>
+          </ac:spMkLst>
+        </pc:spChg>
+        <pc:spChg chg="add del mod">
+          <ac:chgData name="Lubbe, S [slubbe@sun.ac.za]" userId="656cc105-77ab-4b7b-bc17-2448ac205142" providerId="ADAL" clId="{E9BFA566-E94F-41CE-9F87-81DD51602D68}" dt="2025-05-19T15:52:06.888" v="1325" actId="478"/>
+          <ac:spMkLst>
+            <pc:docMk/>
+            <pc:sldMk cId="3554369724" sldId="259"/>
+            <ac:spMk id="4" creationId="{6B9EE8F2-046D-F063-157B-00580EBB8AC5}"/>
+          </ac:spMkLst>
+        </pc:spChg>
+        <pc:spChg chg="add mod">
+          <ac:chgData name="Lubbe, S [slubbe@sun.ac.za]" userId="656cc105-77ab-4b7b-bc17-2448ac205142" providerId="ADAL" clId="{E9BFA566-E94F-41CE-9F87-81DD51602D68}" dt="2025-05-19T15:56:27.686" v="1430" actId="164"/>
+          <ac:spMkLst>
+            <pc:docMk/>
+            <pc:sldMk cId="3554369724" sldId="259"/>
+            <ac:spMk id="5" creationId="{0058ED40-70F2-8BFB-2908-1B203BAEE9F8}"/>
+          </ac:spMkLst>
+        </pc:spChg>
+        <pc:spChg chg="add mod">
+          <ac:chgData name="Lubbe, S [slubbe@sun.ac.za]" userId="656cc105-77ab-4b7b-bc17-2448ac205142" providerId="ADAL" clId="{E9BFA566-E94F-41CE-9F87-81DD51602D68}" dt="2025-05-19T15:56:27.686" v="1430" actId="164"/>
+          <ac:spMkLst>
+            <pc:docMk/>
+            <pc:sldMk cId="3554369724" sldId="259"/>
+            <ac:spMk id="6" creationId="{E6F1DDC2-6A41-F717-EAA6-A6A569BB4F86}"/>
+          </ac:spMkLst>
+        </pc:spChg>
+        <pc:spChg chg="add mod">
+          <ac:chgData name="Lubbe, S [slubbe@sun.ac.za]" userId="656cc105-77ab-4b7b-bc17-2448ac205142" providerId="ADAL" clId="{E9BFA566-E94F-41CE-9F87-81DD51602D68}" dt="2025-05-19T15:56:33.509" v="1431" actId="164"/>
+          <ac:spMkLst>
+            <pc:docMk/>
+            <pc:sldMk cId="3554369724" sldId="259"/>
+            <ac:spMk id="7" creationId="{20D30378-32AF-F617-93BA-3D624B825326}"/>
+          </ac:spMkLst>
+        </pc:spChg>
+        <pc:spChg chg="add mod">
+          <ac:chgData name="Lubbe, S [slubbe@sun.ac.za]" userId="656cc105-77ab-4b7b-bc17-2448ac205142" providerId="ADAL" clId="{E9BFA566-E94F-41CE-9F87-81DD51602D68}" dt="2025-05-19T15:56:33.509" v="1431" actId="164"/>
+          <ac:spMkLst>
+            <pc:docMk/>
+            <pc:sldMk cId="3554369724" sldId="259"/>
+            <ac:spMk id="8" creationId="{8AB3FFCA-632C-4EFC-B4ED-7FA8E4CFE24E}"/>
+          </ac:spMkLst>
+        </pc:spChg>
+        <pc:spChg chg="add mod">
+          <ac:chgData name="Lubbe, S [slubbe@sun.ac.za]" userId="656cc105-77ab-4b7b-bc17-2448ac205142" providerId="ADAL" clId="{E9BFA566-E94F-41CE-9F87-81DD51602D68}" dt="2025-05-19T15:56:33.509" v="1431" actId="164"/>
+          <ac:spMkLst>
+            <pc:docMk/>
+            <pc:sldMk cId="3554369724" sldId="259"/>
+            <ac:spMk id="11" creationId="{AC7A0A6A-1867-91E9-0867-EE18D4B7F26E}"/>
+          </ac:spMkLst>
+        </pc:spChg>
+        <pc:spChg chg="add mod">
+          <ac:chgData name="Lubbe, S [slubbe@sun.ac.za]" userId="656cc105-77ab-4b7b-bc17-2448ac205142" providerId="ADAL" clId="{E9BFA566-E94F-41CE-9F87-81DD51602D68}" dt="2025-05-19T15:56:33.509" v="1431" actId="164"/>
+          <ac:spMkLst>
+            <pc:docMk/>
+            <pc:sldMk cId="3554369724" sldId="259"/>
+            <ac:spMk id="12" creationId="{A70A6138-2910-D9F3-C830-4C5CB4DAEA49}"/>
+          </ac:spMkLst>
+        </pc:spChg>
+        <pc:spChg chg="add del mod">
+          <ac:chgData name="Lubbe, S [slubbe@sun.ac.za]" userId="656cc105-77ab-4b7b-bc17-2448ac205142" providerId="ADAL" clId="{E9BFA566-E94F-41CE-9F87-81DD51602D68}" dt="2025-05-19T15:54:05.989" v="1408" actId="478"/>
+          <ac:spMkLst>
+            <pc:docMk/>
+            <pc:sldMk cId="3554369724" sldId="259"/>
+            <ac:spMk id="13" creationId="{4022954E-1F78-582B-6860-85E7B020864C}"/>
+          </ac:spMkLst>
+        </pc:spChg>
+        <pc:spChg chg="add del mod">
+          <ac:chgData name="Lubbe, S [slubbe@sun.ac.za]" userId="656cc105-77ab-4b7b-bc17-2448ac205142" providerId="ADAL" clId="{E9BFA566-E94F-41CE-9F87-81DD51602D68}" dt="2025-05-19T15:54:05.989" v="1408" actId="478"/>
+          <ac:spMkLst>
+            <pc:docMk/>
+            <pc:sldMk cId="3554369724" sldId="259"/>
+            <ac:spMk id="14" creationId="{2742C325-60ED-7126-5C68-042431C7B516}"/>
+          </ac:spMkLst>
+        </pc:spChg>
+        <pc:spChg chg="add mod">
+          <ac:chgData name="Lubbe, S [slubbe@sun.ac.za]" userId="656cc105-77ab-4b7b-bc17-2448ac205142" providerId="ADAL" clId="{E9BFA566-E94F-41CE-9F87-81DD51602D68}" dt="2025-05-19T15:56:39.741" v="1432" actId="164"/>
+          <ac:spMkLst>
+            <pc:docMk/>
+            <pc:sldMk cId="3554369724" sldId="259"/>
+            <ac:spMk id="16" creationId="{E2570122-7D9E-23E4-C762-B3334E73F767}"/>
+          </ac:spMkLst>
+        </pc:spChg>
+        <pc:spChg chg="add mod">
+          <ac:chgData name="Lubbe, S [slubbe@sun.ac.za]" userId="656cc105-77ab-4b7b-bc17-2448ac205142" providerId="ADAL" clId="{E9BFA566-E94F-41CE-9F87-81DD51602D68}" dt="2025-05-19T15:56:39.741" v="1432" actId="164"/>
+          <ac:spMkLst>
+            <pc:docMk/>
+            <pc:sldMk cId="3554369724" sldId="259"/>
+            <ac:spMk id="17" creationId="{55149CDC-2129-63BD-49B7-1BDD031B2DEF}"/>
+          </ac:spMkLst>
+        </pc:spChg>
+        <pc:spChg chg="add mod">
+          <ac:chgData name="Lubbe, S [slubbe@sun.ac.za]" userId="656cc105-77ab-4b7b-bc17-2448ac205142" providerId="ADAL" clId="{E9BFA566-E94F-41CE-9F87-81DD51602D68}" dt="2025-05-19T15:56:39.741" v="1432" actId="164"/>
+          <ac:spMkLst>
+            <pc:docMk/>
+            <pc:sldMk cId="3554369724" sldId="259"/>
+            <ac:spMk id="18" creationId="{7066DB44-1D54-F8DA-C797-65923D88E23E}"/>
+          </ac:spMkLst>
+        </pc:spChg>
+        <pc:spChg chg="add mod">
+          <ac:chgData name="Lubbe, S [slubbe@sun.ac.za]" userId="656cc105-77ab-4b7b-bc17-2448ac205142" providerId="ADAL" clId="{E9BFA566-E94F-41CE-9F87-81DD51602D68}" dt="2025-05-19T15:56:39.741" v="1432" actId="164"/>
+          <ac:spMkLst>
+            <pc:docMk/>
+            <pc:sldMk cId="3554369724" sldId="259"/>
+            <ac:spMk id="19" creationId="{FA390219-1C9D-6354-3BC7-087E3BE105CA}"/>
+          </ac:spMkLst>
+        </pc:spChg>
+        <pc:spChg chg="add mod">
+          <ac:chgData name="Lubbe, S [slubbe@sun.ac.za]" userId="656cc105-77ab-4b7b-bc17-2448ac205142" providerId="ADAL" clId="{E9BFA566-E94F-41CE-9F87-81DD51602D68}" dt="2025-05-19T15:54:28.213" v="1411" actId="164"/>
+          <ac:spMkLst>
+            <pc:docMk/>
+            <pc:sldMk cId="3554369724" sldId="259"/>
+            <ac:spMk id="22" creationId="{531BA0EC-C035-8E00-3EEE-F169E00FE856}"/>
+          </ac:spMkLst>
+        </pc:spChg>
+        <pc:spChg chg="add mod">
+          <ac:chgData name="Lubbe, S [slubbe@sun.ac.za]" userId="656cc105-77ab-4b7b-bc17-2448ac205142" providerId="ADAL" clId="{E9BFA566-E94F-41CE-9F87-81DD51602D68}" dt="2025-05-19T15:54:28.213" v="1411" actId="164"/>
+          <ac:spMkLst>
+            <pc:docMk/>
+            <pc:sldMk cId="3554369724" sldId="259"/>
+            <ac:spMk id="23" creationId="{22B54285-081B-4E71-DC45-387CF0F33641}"/>
+          </ac:spMkLst>
+        </pc:spChg>
+        <pc:grpChg chg="add mod">
+          <ac:chgData name="Lubbe, S [slubbe@sun.ac.za]" userId="656cc105-77ab-4b7b-bc17-2448ac205142" providerId="ADAL" clId="{E9BFA566-E94F-41CE-9F87-81DD51602D68}" dt="2025-05-19T15:56:39.741" v="1432" actId="164"/>
+          <ac:grpSpMkLst>
+            <pc:docMk/>
+            <pc:sldMk cId="3554369724" sldId="259"/>
+            <ac:grpSpMk id="25" creationId="{1B79E9A3-3F64-21AA-FA76-8E47131F0AD4}"/>
+          </ac:grpSpMkLst>
+        </pc:grpChg>
+        <pc:grpChg chg="add mod">
+          <ac:chgData name="Lubbe, S [slubbe@sun.ac.za]" userId="656cc105-77ab-4b7b-bc17-2448ac205142" providerId="ADAL" clId="{E9BFA566-E94F-41CE-9F87-81DD51602D68}" dt="2025-05-19T15:57:09.898" v="1434" actId="164"/>
+          <ac:grpSpMkLst>
+            <pc:docMk/>
+            <pc:sldMk cId="3554369724" sldId="259"/>
+            <ac:grpSpMk id="26" creationId="{18FE8657-F90C-E27E-0D01-2C0D4258354F}"/>
+          </ac:grpSpMkLst>
+        </pc:grpChg>
+        <pc:grpChg chg="add mod">
+          <ac:chgData name="Lubbe, S [slubbe@sun.ac.za]" userId="656cc105-77ab-4b7b-bc17-2448ac205142" providerId="ADAL" clId="{E9BFA566-E94F-41CE-9F87-81DD51602D68}" dt="2025-05-19T15:57:09.898" v="1434" actId="164"/>
+          <ac:grpSpMkLst>
+            <pc:docMk/>
+            <pc:sldMk cId="3554369724" sldId="259"/>
+            <ac:grpSpMk id="27" creationId="{D1420940-AFFF-AAB0-8330-DAA116F305F1}"/>
+          </ac:grpSpMkLst>
+        </pc:grpChg>
+        <pc:grpChg chg="add mod">
+          <ac:chgData name="Lubbe, S [slubbe@sun.ac.za]" userId="656cc105-77ab-4b7b-bc17-2448ac205142" providerId="ADAL" clId="{E9BFA566-E94F-41CE-9F87-81DD51602D68}" dt="2025-05-19T15:57:09.898" v="1434" actId="164"/>
+          <ac:grpSpMkLst>
+            <pc:docMk/>
+            <pc:sldMk cId="3554369724" sldId="259"/>
+            <ac:grpSpMk id="28" creationId="{07F90DB6-6CEE-7D60-F387-5DA1017DFB0D}"/>
+          </ac:grpSpMkLst>
+        </pc:grpChg>
+        <pc:grpChg chg="add mod">
+          <ac:chgData name="Lubbe, S [slubbe@sun.ac.za]" userId="656cc105-77ab-4b7b-bc17-2448ac205142" providerId="ADAL" clId="{E9BFA566-E94F-41CE-9F87-81DD51602D68}" dt="2025-05-19T15:57:09.898" v="1434" actId="164"/>
+          <ac:grpSpMkLst>
+            <pc:docMk/>
+            <pc:sldMk cId="3554369724" sldId="259"/>
+            <ac:grpSpMk id="29" creationId="{41A8E23F-843B-5C5F-C45A-E4773BA77BAD}"/>
+          </ac:grpSpMkLst>
+        </pc:grpChg>
+        <pc:cxnChg chg="add mod">
+          <ac:chgData name="Lubbe, S [slubbe@sun.ac.za]" userId="656cc105-77ab-4b7b-bc17-2448ac205142" providerId="ADAL" clId="{E9BFA566-E94F-41CE-9F87-81DD51602D68}" dt="2025-05-19T15:56:33.509" v="1431" actId="164"/>
+          <ac:cxnSpMkLst>
+            <pc:docMk/>
+            <pc:sldMk cId="3554369724" sldId="259"/>
+            <ac:cxnSpMk id="10" creationId="{6ECA13EB-2808-E8CD-C952-911136FEC8EA}"/>
+          </ac:cxnSpMkLst>
+        </pc:cxnChg>
+        <pc:cxnChg chg="add del mod">
+          <ac:chgData name="Lubbe, S [slubbe@sun.ac.za]" userId="656cc105-77ab-4b7b-bc17-2448ac205142" providerId="ADAL" clId="{E9BFA566-E94F-41CE-9F87-81DD51602D68}" dt="2025-05-19T15:54:05.989" v="1408" actId="478"/>
+          <ac:cxnSpMkLst>
+            <pc:docMk/>
+            <pc:sldMk cId="3554369724" sldId="259"/>
+            <ac:cxnSpMk id="15" creationId="{C19133F2-A0B1-7610-45D6-B1A908EA9022}"/>
+          </ac:cxnSpMkLst>
+        </pc:cxnChg>
+        <pc:cxnChg chg="add mod">
+          <ac:chgData name="Lubbe, S [slubbe@sun.ac.za]" userId="656cc105-77ab-4b7b-bc17-2448ac205142" providerId="ADAL" clId="{E9BFA566-E94F-41CE-9F87-81DD51602D68}" dt="2025-05-19T15:54:28.213" v="1411" actId="164"/>
+          <ac:cxnSpMkLst>
+            <pc:docMk/>
+            <pc:sldMk cId="3554369724" sldId="259"/>
+            <ac:cxnSpMk id="24" creationId="{FC99C026-FD25-AF2E-FE4A-A17010D7A91D}"/>
           </ac:cxnSpMkLst>
         </pc:cxnChg>
       </pc:sldChg>
@@ -738,7 +930,7 @@
           <a:p>
             <a:fld id="{67A7CAF5-7A1A-43D9-B5B9-2B502385EA68}" type="datetimeFigureOut">
               <a:rPr lang="en-ZA" smtClean="0"/>
-              <a:t>2025/05/15</a:t>
+              <a:t>2025/05/19</a:t>
             </a:fld>
             <a:endParaRPr lang="en-ZA"/>
           </a:p>
@@ -938,7 +1130,7 @@
           <a:p>
             <a:fld id="{67A7CAF5-7A1A-43D9-B5B9-2B502385EA68}" type="datetimeFigureOut">
               <a:rPr lang="en-ZA" smtClean="0"/>
-              <a:t>2025/05/15</a:t>
+              <a:t>2025/05/19</a:t>
             </a:fld>
             <a:endParaRPr lang="en-ZA"/>
           </a:p>
@@ -1148,7 +1340,7 @@
           <a:p>
             <a:fld id="{67A7CAF5-7A1A-43D9-B5B9-2B502385EA68}" type="datetimeFigureOut">
               <a:rPr lang="en-ZA" smtClean="0"/>
-              <a:t>2025/05/15</a:t>
+              <a:t>2025/05/19</a:t>
             </a:fld>
             <a:endParaRPr lang="en-ZA"/>
           </a:p>
@@ -1348,7 +1540,7 @@
           <a:p>
             <a:fld id="{67A7CAF5-7A1A-43D9-B5B9-2B502385EA68}" type="datetimeFigureOut">
               <a:rPr lang="en-ZA" smtClean="0"/>
-              <a:t>2025/05/15</a:t>
+              <a:t>2025/05/19</a:t>
             </a:fld>
             <a:endParaRPr lang="en-ZA"/>
           </a:p>
@@ -1624,7 +1816,7 @@
           <a:p>
             <a:fld id="{67A7CAF5-7A1A-43D9-B5B9-2B502385EA68}" type="datetimeFigureOut">
               <a:rPr lang="en-ZA" smtClean="0"/>
-              <a:t>2025/05/15</a:t>
+              <a:t>2025/05/19</a:t>
             </a:fld>
             <a:endParaRPr lang="en-ZA"/>
           </a:p>
@@ -1892,7 +2084,7 @@
           <a:p>
             <a:fld id="{67A7CAF5-7A1A-43D9-B5B9-2B502385EA68}" type="datetimeFigureOut">
               <a:rPr lang="en-ZA" smtClean="0"/>
-              <a:t>2025/05/15</a:t>
+              <a:t>2025/05/19</a:t>
             </a:fld>
             <a:endParaRPr lang="en-ZA"/>
           </a:p>
@@ -2307,7 +2499,7 @@
           <a:p>
             <a:fld id="{67A7CAF5-7A1A-43D9-B5B9-2B502385EA68}" type="datetimeFigureOut">
               <a:rPr lang="en-ZA" smtClean="0"/>
-              <a:t>2025/05/15</a:t>
+              <a:t>2025/05/19</a:t>
             </a:fld>
             <a:endParaRPr lang="en-ZA"/>
           </a:p>
@@ -2449,7 +2641,7 @@
           <a:p>
             <a:fld id="{67A7CAF5-7A1A-43D9-B5B9-2B502385EA68}" type="datetimeFigureOut">
               <a:rPr lang="en-ZA" smtClean="0"/>
-              <a:t>2025/05/15</a:t>
+              <a:t>2025/05/19</a:t>
             </a:fld>
             <a:endParaRPr lang="en-ZA"/>
           </a:p>
@@ -2562,7 +2754,7 @@
           <a:p>
             <a:fld id="{67A7CAF5-7A1A-43D9-B5B9-2B502385EA68}" type="datetimeFigureOut">
               <a:rPr lang="en-ZA" smtClean="0"/>
-              <a:t>2025/05/15</a:t>
+              <a:t>2025/05/19</a:t>
             </a:fld>
             <a:endParaRPr lang="en-ZA"/>
           </a:p>
@@ -2875,7 +3067,7 @@
           <a:p>
             <a:fld id="{67A7CAF5-7A1A-43D9-B5B9-2B502385EA68}" type="datetimeFigureOut">
               <a:rPr lang="en-ZA" smtClean="0"/>
-              <a:t>2025/05/15</a:t>
+              <a:t>2025/05/19</a:t>
             </a:fld>
             <a:endParaRPr lang="en-ZA"/>
           </a:p>
@@ -3164,7 +3356,7 @@
           <a:p>
             <a:fld id="{67A7CAF5-7A1A-43D9-B5B9-2B502385EA68}" type="datetimeFigureOut">
               <a:rPr lang="en-ZA" smtClean="0"/>
-              <a:t>2025/05/15</a:t>
+              <a:t>2025/05/19</a:t>
             </a:fld>
             <a:endParaRPr lang="en-ZA"/>
           </a:p>
@@ -3407,7 +3599,7 @@
           <a:p>
             <a:fld id="{67A7CAF5-7A1A-43D9-B5B9-2B502385EA68}" type="datetimeFigureOut">
               <a:rPr lang="en-ZA" smtClean="0"/>
-              <a:t>2025/05/15</a:t>
+              <a:t>2025/05/19</a:t>
             </a:fld>
             <a:endParaRPr lang="en-ZA"/>
           </a:p>
@@ -5802,8 +5994,8 @@
             </a:fontRef>
           </p:style>
         </p:cxnSp>
-        <mc:AlternateContent xmlns:mc="http://schemas.openxmlformats.org/markup-compatibility/2006">
-          <mc:Choice xmlns:a14="http://schemas.microsoft.com/office/drawing/2010/main" Requires="a14">
+        <mc:AlternateContent xmlns:mc="http://schemas.openxmlformats.org/markup-compatibility/2006" xmlns:a14="http://schemas.microsoft.com/office/drawing/2010/main">
+          <mc:Choice Requires="a14">
             <p:sp>
               <p:nvSpPr>
                 <p:cNvPr id="26" name="TextBox 25">
@@ -5832,6 +6024,7 @@
                 </a:bodyPr>
                 <a:lstStyle/>
                 <a:p>
+                  <a:pPr/>
                   <a14:m>
                     <m:oMathPara xmlns:m="http://schemas.openxmlformats.org/officeDocument/2006/math">
                       <m:oMathParaPr>
@@ -5932,7 +6125,7 @@
               </p:txBody>
             </p:sp>
           </mc:Choice>
-          <mc:Fallback>
+          <mc:Fallback xmlns="">
             <p:sp>
               <p:nvSpPr>
                 <p:cNvPr id="26" name="TextBox 25">
@@ -5977,8 +6170,8 @@
             </p:sp>
           </mc:Fallback>
         </mc:AlternateContent>
-        <mc:AlternateContent xmlns:mc="http://schemas.openxmlformats.org/markup-compatibility/2006">
-          <mc:Choice xmlns:a14="http://schemas.microsoft.com/office/drawing/2010/main" Requires="a14">
+        <mc:AlternateContent xmlns:mc="http://schemas.openxmlformats.org/markup-compatibility/2006" xmlns:a14="http://schemas.microsoft.com/office/drawing/2010/main">
+          <mc:Choice Requires="a14">
             <p:sp>
               <p:nvSpPr>
                 <p:cNvPr id="27" name="TextBox 26">
@@ -6007,6 +6200,7 @@
                 </a:bodyPr>
                 <a:lstStyle/>
                 <a:p>
+                  <a:pPr/>
                   <a14:m>
                     <m:oMathPara xmlns:m="http://schemas.openxmlformats.org/officeDocument/2006/math">
                       <m:oMathParaPr>
@@ -6046,7 +6240,7 @@
               </p:txBody>
             </p:sp>
           </mc:Choice>
-          <mc:Fallback>
+          <mc:Fallback xmlns="">
             <p:sp>
               <p:nvSpPr>
                 <p:cNvPr id="27" name="TextBox 26">
@@ -6091,8 +6285,8 @@
             </p:sp>
           </mc:Fallback>
         </mc:AlternateContent>
-        <mc:AlternateContent xmlns:mc="http://schemas.openxmlformats.org/markup-compatibility/2006">
-          <mc:Choice xmlns:a14="http://schemas.microsoft.com/office/drawing/2010/main" Requires="a14">
+        <mc:AlternateContent xmlns:mc="http://schemas.openxmlformats.org/markup-compatibility/2006" xmlns:a14="http://schemas.microsoft.com/office/drawing/2010/main">
+          <mc:Choice Requires="a14">
             <p:sp>
               <p:nvSpPr>
                 <p:cNvPr id="28" name="TextBox 27">
@@ -6121,6 +6315,7 @@
                 </a:bodyPr>
                 <a:lstStyle/>
                 <a:p>
+                  <a:pPr/>
                   <a14:m>
                     <m:oMathPara xmlns:m="http://schemas.openxmlformats.org/officeDocument/2006/math">
                       <m:oMathParaPr>
@@ -6160,7 +6355,7 @@
               </p:txBody>
             </p:sp>
           </mc:Choice>
-          <mc:Fallback>
+          <mc:Fallback xmlns="">
             <p:sp>
               <p:nvSpPr>
                 <p:cNvPr id="28" name="TextBox 27">
@@ -6296,8 +6491,8 @@
             </a:p>
           </p:txBody>
         </p:sp>
-        <mc:AlternateContent xmlns:mc="http://schemas.openxmlformats.org/markup-compatibility/2006">
-          <mc:Choice xmlns:a14="http://schemas.microsoft.com/office/drawing/2010/main" Requires="a14">
+        <mc:AlternateContent xmlns:mc="http://schemas.openxmlformats.org/markup-compatibility/2006" xmlns:a14="http://schemas.microsoft.com/office/drawing/2010/main">
+          <mc:Choice Requires="a14">
             <p:sp>
               <p:nvSpPr>
                 <p:cNvPr id="32" name="TextBox 31">
@@ -6326,6 +6521,7 @@
                 </a:bodyPr>
                 <a:lstStyle/>
                 <a:p>
+                  <a:pPr/>
                   <a14:m>
                     <m:oMathPara xmlns:m="http://schemas.openxmlformats.org/officeDocument/2006/math">
                       <m:oMathParaPr>
@@ -6347,7 +6543,7 @@
               </p:txBody>
             </p:sp>
           </mc:Choice>
-          <mc:Fallback>
+          <mc:Fallback xmlns="">
             <p:sp>
               <p:nvSpPr>
                 <p:cNvPr id="32" name="TextBox 31">
@@ -6392,8 +6588,8 @@
             </p:sp>
           </mc:Fallback>
         </mc:AlternateContent>
-        <mc:AlternateContent xmlns:mc="http://schemas.openxmlformats.org/markup-compatibility/2006">
-          <mc:Choice xmlns:a14="http://schemas.microsoft.com/office/drawing/2010/main" Requires="a14">
+        <mc:AlternateContent xmlns:mc="http://schemas.openxmlformats.org/markup-compatibility/2006" xmlns:a14="http://schemas.microsoft.com/office/drawing/2010/main">
+          <mc:Choice Requires="a14">
             <p:sp>
               <p:nvSpPr>
                 <p:cNvPr id="33" name="TextBox 32">
@@ -6448,7 +6644,7 @@
               </p:txBody>
             </p:sp>
           </mc:Choice>
-          <mc:Fallback>
+          <mc:Fallback xmlns="">
             <p:sp>
               <p:nvSpPr>
                 <p:cNvPr id="33" name="TextBox 32">
@@ -6493,8 +6689,8 @@
             </p:sp>
           </mc:Fallback>
         </mc:AlternateContent>
-        <mc:AlternateContent xmlns:mc="http://schemas.openxmlformats.org/markup-compatibility/2006">
-          <mc:Choice xmlns:a14="http://schemas.microsoft.com/office/drawing/2010/main" Requires="a14">
+        <mc:AlternateContent xmlns:mc="http://schemas.openxmlformats.org/markup-compatibility/2006" xmlns:a14="http://schemas.microsoft.com/office/drawing/2010/main">
+          <mc:Choice Requires="a14">
             <p:sp>
               <p:nvSpPr>
                 <p:cNvPr id="34" name="TextBox 33">
@@ -6523,6 +6719,7 @@
                 </a:bodyPr>
                 <a:lstStyle/>
                 <a:p>
+                  <a:pPr/>
                   <a14:m>
                     <m:oMathPara xmlns:m="http://schemas.openxmlformats.org/officeDocument/2006/math">
                       <m:oMathParaPr>
@@ -6623,7 +6820,7 @@
               </p:txBody>
             </p:sp>
           </mc:Choice>
-          <mc:Fallback>
+          <mc:Fallback xmlns="">
             <p:sp>
               <p:nvSpPr>
                 <p:cNvPr id="34" name="TextBox 33">
@@ -6740,8 +6937,8 @@
             </a:p>
           </p:txBody>
         </p:sp>
-        <mc:AlternateContent xmlns:mc="http://schemas.openxmlformats.org/markup-compatibility/2006">
-          <mc:Choice xmlns:a14="http://schemas.microsoft.com/office/drawing/2010/main" Requires="a14">
+        <mc:AlternateContent xmlns:mc="http://schemas.openxmlformats.org/markup-compatibility/2006" xmlns:a14="http://schemas.microsoft.com/office/drawing/2010/main">
+          <mc:Choice Requires="a14">
             <p:sp>
               <p:nvSpPr>
                 <p:cNvPr id="37" name="TextBox 36">
@@ -7111,7 +7308,7 @@
               </p:txBody>
             </p:sp>
           </mc:Choice>
-          <mc:Fallback>
+          <mc:Fallback xmlns="">
             <p:sp>
               <p:nvSpPr>
                 <p:cNvPr id="37" name="TextBox 36">
@@ -7161,6 +7358,1061 @@
     <p:extLst>
       <p:ext uri="{BB962C8B-B14F-4D97-AF65-F5344CB8AC3E}">
         <p14:creationId xmlns:p14="http://schemas.microsoft.com/office/powerpoint/2010/main" val="4015766007"/>
+      </p:ext>
+    </p:extLst>
+  </p:cSld>
+  <p:clrMapOvr>
+    <a:masterClrMapping/>
+  </p:clrMapOvr>
+</p:sld>
+</file>
+
+<file path=ppt/slides/slide4.xml><?xml version="1.0" encoding="utf-8"?>
+<p:sld xmlns:a="http://schemas.openxmlformats.org/drawingml/2006/main" xmlns:r="http://schemas.openxmlformats.org/officeDocument/2006/relationships" xmlns:p="http://schemas.openxmlformats.org/presentationml/2006/main">
+  <p:cSld>
+    <p:spTree>
+      <p:nvGrpSpPr>
+        <p:cNvPr id="1" name=""/>
+        <p:cNvGrpSpPr/>
+        <p:nvPr/>
+      </p:nvGrpSpPr>
+      <p:grpSpPr>
+        <a:xfrm>
+          <a:off x="0" y="0"/>
+          <a:ext cx="0" cy="0"/>
+          <a:chOff x="0" y="0"/>
+          <a:chExt cx="0" cy="0"/>
+        </a:xfrm>
+      </p:grpSpPr>
+      <p:grpSp>
+        <p:nvGrpSpPr>
+          <p:cNvPr id="29" name="Group 28">
+            <a:extLst>
+              <a:ext uri="{FF2B5EF4-FFF2-40B4-BE49-F238E27FC236}">
+                <a16:creationId xmlns:a16="http://schemas.microsoft.com/office/drawing/2014/main" id="{41A8E23F-843B-5C5F-C45A-E4773BA77BAD}"/>
+              </a:ext>
+            </a:extLst>
+          </p:cNvPr>
+          <p:cNvGrpSpPr/>
+          <p:nvPr/>
+        </p:nvGrpSpPr>
+        <p:grpSpPr>
+          <a:xfrm>
+            <a:off x="2120899" y="383404"/>
+            <a:ext cx="6507482" cy="6265326"/>
+            <a:chOff x="2120899" y="383404"/>
+            <a:chExt cx="6507482" cy="6265326"/>
+          </a:xfrm>
+        </p:grpSpPr>
+        <p:grpSp>
+          <p:nvGrpSpPr>
+            <p:cNvPr id="26" name="Group 25">
+              <a:extLst>
+                <a:ext uri="{FF2B5EF4-FFF2-40B4-BE49-F238E27FC236}">
+                  <a16:creationId xmlns:a16="http://schemas.microsoft.com/office/drawing/2014/main" id="{18FE8657-F90C-E27E-0D01-2C0D4258354F}"/>
+                </a:ext>
+              </a:extLst>
+            </p:cNvPr>
+            <p:cNvGrpSpPr/>
+            <p:nvPr/>
+          </p:nvGrpSpPr>
+          <p:grpSpPr>
+            <a:xfrm>
+              <a:off x="2120899" y="383404"/>
+              <a:ext cx="4716782" cy="787380"/>
+              <a:chOff x="2120899" y="383404"/>
+              <a:chExt cx="4716782" cy="787380"/>
+            </a:xfrm>
+          </p:grpSpPr>
+          <p:sp>
+            <p:nvSpPr>
+              <p:cNvPr id="2" name="TextBox 1">
+                <a:extLst>
+                  <a:ext uri="{FF2B5EF4-FFF2-40B4-BE49-F238E27FC236}">
+                    <a16:creationId xmlns:a16="http://schemas.microsoft.com/office/drawing/2014/main" id="{C5F67D7B-7191-C84E-C420-B93B75DA615B}"/>
+                  </a:ext>
+                </a:extLst>
+              </p:cNvPr>
+              <p:cNvSpPr txBox="1"/>
+              <p:nvPr/>
+            </p:nvSpPr>
+            <p:spPr>
+              <a:xfrm>
+                <a:off x="2120899" y="383404"/>
+                <a:ext cx="3738880" cy="307777"/>
+              </a:xfrm>
+              <a:prstGeom prst="rect">
+                <a:avLst/>
+              </a:prstGeom>
+              <a:noFill/>
+            </p:spPr>
+            <p:txBody>
+              <a:bodyPr wrap="square" rtlCol="0">
+                <a:spAutoFit/>
+              </a:bodyPr>
+              <a:lstStyle/>
+              <a:p>
+                <a:r>
+                  <a:rPr lang="en-GB" sz="1400" dirty="0"/>
+                  <a:t>MATHEMATICAL EXPRESSION</a:t>
+                </a:r>
+                <a:endParaRPr lang="en-ZA" sz="1400" dirty="0"/>
+              </a:p>
+            </p:txBody>
+          </p:sp>
+          <p:sp>
+            <p:nvSpPr>
+              <p:cNvPr id="3" name="TextBox 2">
+                <a:extLst>
+                  <a:ext uri="{FF2B5EF4-FFF2-40B4-BE49-F238E27FC236}">
+                    <a16:creationId xmlns:a16="http://schemas.microsoft.com/office/drawing/2014/main" id="{59880459-2815-A508-8499-0E77FC136E74}"/>
+                  </a:ext>
+                </a:extLst>
+              </p:cNvPr>
+              <p:cNvSpPr txBox="1"/>
+              <p:nvPr/>
+            </p:nvSpPr>
+            <p:spPr>
+              <a:xfrm>
+                <a:off x="4805681" y="383404"/>
+                <a:ext cx="2032000" cy="307777"/>
+              </a:xfrm>
+              <a:prstGeom prst="rect">
+                <a:avLst/>
+              </a:prstGeom>
+              <a:noFill/>
+            </p:spPr>
+            <p:txBody>
+              <a:bodyPr wrap="square" rtlCol="0">
+                <a:spAutoFit/>
+              </a:bodyPr>
+              <a:lstStyle/>
+              <a:p>
+                <a:r>
+                  <a:rPr lang="en-GB" sz="1400" dirty="0"/>
+                  <a:t>CHARACTER STRING</a:t>
+                </a:r>
+                <a:endParaRPr lang="en-ZA" sz="1400" dirty="0"/>
+              </a:p>
+            </p:txBody>
+          </p:sp>
+          <p:sp>
+            <p:nvSpPr>
+              <p:cNvPr id="5" name="TextBox 4">
+                <a:extLst>
+                  <a:ext uri="{FF2B5EF4-FFF2-40B4-BE49-F238E27FC236}">
+                    <a16:creationId xmlns:a16="http://schemas.microsoft.com/office/drawing/2014/main" id="{0058ED40-70F2-8BFB-2908-1B203BAEE9F8}"/>
+                  </a:ext>
+                </a:extLst>
+              </p:cNvPr>
+              <p:cNvSpPr txBox="1"/>
+              <p:nvPr/>
+            </p:nvSpPr>
+            <p:spPr>
+              <a:xfrm>
+                <a:off x="2151379" y="647564"/>
+                <a:ext cx="967741" cy="307777"/>
+              </a:xfrm>
+              <a:prstGeom prst="rect">
+                <a:avLst/>
+              </a:prstGeom>
+              <a:noFill/>
+            </p:spPr>
+            <p:txBody>
+              <a:bodyPr wrap="square" rtlCol="0">
+                <a:spAutoFit/>
+              </a:bodyPr>
+              <a:lstStyle/>
+              <a:p>
+                <a:r>
+                  <a:rPr lang="en-GB" sz="1400" dirty="0">
+                    <a:latin typeface="Courier New" panose="02070309020205020404" pitchFamily="49" charset="0"/>
+                    <a:cs typeface="Courier New" panose="02070309020205020404" pitchFamily="49" charset="0"/>
+                  </a:rPr>
+                  <a:t>&gt; 3 + 4</a:t>
+                </a:r>
+                <a:endParaRPr lang="en-ZA" sz="1400" dirty="0">
+                  <a:latin typeface="Courier New" panose="02070309020205020404" pitchFamily="49" charset="0"/>
+                  <a:cs typeface="Courier New" panose="02070309020205020404" pitchFamily="49" charset="0"/>
+                </a:endParaRPr>
+              </a:p>
+            </p:txBody>
+          </p:sp>
+          <p:sp>
+            <p:nvSpPr>
+              <p:cNvPr id="6" name="TextBox 5">
+                <a:extLst>
+                  <a:ext uri="{FF2B5EF4-FFF2-40B4-BE49-F238E27FC236}">
+                    <a16:creationId xmlns:a16="http://schemas.microsoft.com/office/drawing/2014/main" id="{E6F1DDC2-6A41-F717-EAA6-A6A569BB4F86}"/>
+                  </a:ext>
+                </a:extLst>
+              </p:cNvPr>
+              <p:cNvSpPr txBox="1"/>
+              <p:nvPr/>
+            </p:nvSpPr>
+            <p:spPr>
+              <a:xfrm>
+                <a:off x="4836160" y="647564"/>
+                <a:ext cx="1696720" cy="523220"/>
+              </a:xfrm>
+              <a:prstGeom prst="rect">
+                <a:avLst/>
+              </a:prstGeom>
+              <a:noFill/>
+            </p:spPr>
+            <p:txBody>
+              <a:bodyPr wrap="square" rtlCol="0">
+                <a:spAutoFit/>
+              </a:bodyPr>
+              <a:lstStyle/>
+              <a:p>
+                <a:r>
+                  <a:rPr lang="en-GB" sz="1400" dirty="0">
+                    <a:latin typeface="Courier New" panose="02070309020205020404" pitchFamily="49" charset="0"/>
+                    <a:cs typeface="Courier New" panose="02070309020205020404" pitchFamily="49" charset="0"/>
+                  </a:rPr>
+                  <a:t>&gt; "John Brown"</a:t>
+                </a:r>
+              </a:p>
+              <a:p>
+                <a:r>
+                  <a:rPr lang="en-GB" sz="1400" dirty="0">
+                    <a:latin typeface="Courier New" panose="02070309020205020404" pitchFamily="49" charset="0"/>
+                    <a:cs typeface="Courier New" panose="02070309020205020404" pitchFamily="49" charset="0"/>
+                  </a:rPr>
+                  <a:t>&gt; "3 + 4"</a:t>
+                </a:r>
+                <a:endParaRPr lang="en-ZA" sz="1400" dirty="0">
+                  <a:latin typeface="Courier New" panose="02070309020205020404" pitchFamily="49" charset="0"/>
+                  <a:cs typeface="Courier New" panose="02070309020205020404" pitchFamily="49" charset="0"/>
+                </a:endParaRPr>
+              </a:p>
+            </p:txBody>
+          </p:sp>
+        </p:grpSp>
+        <p:grpSp>
+          <p:nvGrpSpPr>
+            <p:cNvPr id="27" name="Group 26">
+              <a:extLst>
+                <a:ext uri="{FF2B5EF4-FFF2-40B4-BE49-F238E27FC236}">
+                  <a16:creationId xmlns:a16="http://schemas.microsoft.com/office/drawing/2014/main" id="{D1420940-AFFF-AAB0-8330-DAA116F305F1}"/>
+                </a:ext>
+              </a:extLst>
+            </p:cNvPr>
+            <p:cNvGrpSpPr/>
+            <p:nvPr/>
+          </p:nvGrpSpPr>
+          <p:grpSpPr>
+            <a:xfrm>
+              <a:off x="2120899" y="1617991"/>
+              <a:ext cx="6507482" cy="2006838"/>
+              <a:chOff x="2120899" y="1513840"/>
+              <a:chExt cx="6507482" cy="2006838"/>
+            </a:xfrm>
+          </p:grpSpPr>
+          <p:sp>
+            <p:nvSpPr>
+              <p:cNvPr id="7" name="Rectangle: Rounded Corners 6">
+                <a:extLst>
+                  <a:ext uri="{FF2B5EF4-FFF2-40B4-BE49-F238E27FC236}">
+                    <a16:creationId xmlns:a16="http://schemas.microsoft.com/office/drawing/2014/main" id="{20D30378-32AF-F617-93BA-3D624B825326}"/>
+                  </a:ext>
+                </a:extLst>
+              </p:cNvPr>
+              <p:cNvSpPr/>
+              <p:nvPr/>
+            </p:nvSpPr>
+            <p:spPr>
+              <a:xfrm>
+                <a:off x="2120899" y="1513840"/>
+                <a:ext cx="1414781" cy="307777"/>
+              </a:xfrm>
+              <a:prstGeom prst="roundRect">
+                <a:avLst/>
+              </a:prstGeom>
+              <a:noFill/>
+              <a:ln>
+                <a:solidFill>
+                  <a:schemeClr val="tx1"/>
+                </a:solidFill>
+              </a:ln>
+            </p:spPr>
+            <p:style>
+              <a:lnRef idx="2">
+                <a:schemeClr val="accent1">
+                  <a:shade val="15000"/>
+                </a:schemeClr>
+              </a:lnRef>
+              <a:fillRef idx="1">
+                <a:schemeClr val="accent1"/>
+              </a:fillRef>
+              <a:effectRef idx="0">
+                <a:schemeClr val="accent1"/>
+              </a:effectRef>
+              <a:fontRef idx="minor">
+                <a:schemeClr val="lt1"/>
+              </a:fontRef>
+            </p:style>
+            <p:txBody>
+              <a:bodyPr rtlCol="0" anchor="ctr"/>
+              <a:lstStyle/>
+              <a:p>
+                <a:pPr algn="ctr"/>
+                <a:r>
+                  <a:rPr lang="en-GB" sz="1400" dirty="0">
+                    <a:solidFill>
+                      <a:schemeClr val="tx1"/>
+                    </a:solidFill>
+                  </a:rPr>
+                  <a:t>Expression</a:t>
+                </a:r>
+                <a:endParaRPr lang="en-ZA" sz="1400" dirty="0">
+                  <a:solidFill>
+                    <a:schemeClr val="tx1"/>
+                  </a:solidFill>
+                </a:endParaRPr>
+              </a:p>
+            </p:txBody>
+          </p:sp>
+          <p:sp>
+            <p:nvSpPr>
+              <p:cNvPr id="8" name="Rectangle: Rounded Corners 7">
+                <a:extLst>
+                  <a:ext uri="{FF2B5EF4-FFF2-40B4-BE49-F238E27FC236}">
+                    <a16:creationId xmlns:a16="http://schemas.microsoft.com/office/drawing/2014/main" id="{8AB3FFCA-632C-4EFC-B4ED-7FA8E4CFE24E}"/>
+                  </a:ext>
+                </a:extLst>
+              </p:cNvPr>
+              <p:cNvSpPr/>
+              <p:nvPr/>
+            </p:nvSpPr>
+            <p:spPr>
+              <a:xfrm>
+                <a:off x="4307841" y="1513840"/>
+                <a:ext cx="843280" cy="309600"/>
+              </a:xfrm>
+              <a:prstGeom prst="roundRect">
+                <a:avLst/>
+              </a:prstGeom>
+              <a:noFill/>
+              <a:ln>
+                <a:solidFill>
+                  <a:schemeClr val="tx1"/>
+                </a:solidFill>
+              </a:ln>
+            </p:spPr>
+            <p:style>
+              <a:lnRef idx="2">
+                <a:schemeClr val="accent1">
+                  <a:shade val="15000"/>
+                </a:schemeClr>
+              </a:lnRef>
+              <a:fillRef idx="1">
+                <a:schemeClr val="accent1"/>
+              </a:fillRef>
+              <a:effectRef idx="0">
+                <a:schemeClr val="accent1"/>
+              </a:effectRef>
+              <a:fontRef idx="minor">
+                <a:schemeClr val="lt1"/>
+              </a:fontRef>
+            </p:style>
+            <p:txBody>
+              <a:bodyPr rtlCol="0" anchor="ctr"/>
+              <a:lstStyle/>
+              <a:p>
+                <a:pPr algn="ctr"/>
+                <a:r>
+                  <a:rPr lang="en-GB" sz="1400" dirty="0">
+                    <a:solidFill>
+                      <a:schemeClr val="tx1"/>
+                    </a:solidFill>
+                  </a:rPr>
+                  <a:t>Text</a:t>
+                </a:r>
+                <a:endParaRPr lang="en-ZA" sz="1400" dirty="0">
+                  <a:solidFill>
+                    <a:schemeClr val="tx1"/>
+                  </a:solidFill>
+                </a:endParaRPr>
+              </a:p>
+            </p:txBody>
+          </p:sp>
+          <p:cxnSp>
+            <p:nvCxnSpPr>
+              <p:cNvPr id="10" name="Straight Arrow Connector 9">
+                <a:extLst>
+                  <a:ext uri="{FF2B5EF4-FFF2-40B4-BE49-F238E27FC236}">
+                    <a16:creationId xmlns:a16="http://schemas.microsoft.com/office/drawing/2014/main" id="{6ECA13EB-2808-E8CD-C952-911136FEC8EA}"/>
+                  </a:ext>
+                </a:extLst>
+              </p:cNvPr>
+              <p:cNvCxnSpPr>
+                <a:cxnSpLocks/>
+                <a:stCxn id="8" idx="1"/>
+                <a:endCxn id="7" idx="3"/>
+              </p:cNvCxnSpPr>
+              <p:nvPr/>
+            </p:nvCxnSpPr>
+            <p:spPr>
+              <a:xfrm flipH="1" flipV="1">
+                <a:off x="3535680" y="1667729"/>
+                <a:ext cx="772161" cy="911"/>
+              </a:xfrm>
+              <a:prstGeom prst="straightConnector1">
+                <a:avLst/>
+              </a:prstGeom>
+              <a:ln>
+                <a:tailEnd type="triangle"/>
+              </a:ln>
+            </p:spPr>
+            <p:style>
+              <a:lnRef idx="2">
+                <a:schemeClr val="dk1"/>
+              </a:lnRef>
+              <a:fillRef idx="0">
+                <a:schemeClr val="dk1"/>
+              </a:fillRef>
+              <a:effectRef idx="1">
+                <a:schemeClr val="dk1"/>
+              </a:effectRef>
+              <a:fontRef idx="minor">
+                <a:schemeClr val="tx1"/>
+              </a:fontRef>
+            </p:style>
+          </p:cxnSp>
+          <p:sp>
+            <p:nvSpPr>
+              <p:cNvPr id="11" name="TextBox 10">
+                <a:extLst>
+                  <a:ext uri="{FF2B5EF4-FFF2-40B4-BE49-F238E27FC236}">
+                    <a16:creationId xmlns:a16="http://schemas.microsoft.com/office/drawing/2014/main" id="{AC7A0A6A-1867-91E9-0867-EE18D4B7F26E}"/>
+                  </a:ext>
+                </a:extLst>
+              </p:cNvPr>
+              <p:cNvSpPr txBox="1"/>
+              <p:nvPr/>
+            </p:nvSpPr>
+            <p:spPr>
+              <a:xfrm>
+                <a:off x="2120899" y="1920240"/>
+                <a:ext cx="3589021" cy="1600438"/>
+              </a:xfrm>
+              <a:prstGeom prst="rect">
+                <a:avLst/>
+              </a:prstGeom>
+              <a:noFill/>
+            </p:spPr>
+            <p:txBody>
+              <a:bodyPr wrap="square" rtlCol="0">
+                <a:spAutoFit/>
+              </a:bodyPr>
+              <a:lstStyle/>
+              <a:p>
+                <a:r>
+                  <a:rPr lang="en-GB" sz="1400" dirty="0">
+                    <a:latin typeface="Courier New" panose="02070309020205020404" pitchFamily="49" charset="0"/>
+                    <a:cs typeface="Courier New" panose="02070309020205020404" pitchFamily="49" charset="0"/>
+                  </a:rPr>
+                  <a:t>&gt; out &lt;- parse (text = "4 + 7")</a:t>
+                </a:r>
+              </a:p>
+              <a:p>
+                <a:endParaRPr lang="en-GB" sz="1400" dirty="0">
+                  <a:latin typeface="Courier New" panose="02070309020205020404" pitchFamily="49" charset="0"/>
+                  <a:cs typeface="Courier New" panose="02070309020205020404" pitchFamily="49" charset="0"/>
+                </a:endParaRPr>
+              </a:p>
+              <a:p>
+                <a:r>
+                  <a:rPr lang="en-GB" sz="1400" dirty="0">
+                    <a:latin typeface="Courier New" panose="02070309020205020404" pitchFamily="49" charset="0"/>
+                    <a:cs typeface="Courier New" panose="02070309020205020404" pitchFamily="49" charset="0"/>
+                  </a:rPr>
+                  <a:t>&gt; out</a:t>
+                </a:r>
+              </a:p>
+              <a:p>
+                <a:r>
+                  <a:rPr lang="en-GB" sz="1400" dirty="0">
+                    <a:latin typeface="Courier New" panose="02070309020205020404" pitchFamily="49" charset="0"/>
+                    <a:cs typeface="Courier New" panose="02070309020205020404" pitchFamily="49" charset="0"/>
+                  </a:rPr>
+                  <a:t>expression (4 + 7)</a:t>
+                </a:r>
+              </a:p>
+              <a:p>
+                <a:endParaRPr lang="en-GB" sz="1400" dirty="0">
+                  <a:latin typeface="Courier New" panose="02070309020205020404" pitchFamily="49" charset="0"/>
+                  <a:cs typeface="Courier New" panose="02070309020205020404" pitchFamily="49" charset="0"/>
+                </a:endParaRPr>
+              </a:p>
+              <a:p>
+                <a:r>
+                  <a:rPr lang="en-GB" sz="1400" dirty="0">
+                    <a:latin typeface="Courier New" panose="02070309020205020404" pitchFamily="49" charset="0"/>
+                    <a:cs typeface="Courier New" panose="02070309020205020404" pitchFamily="49" charset="0"/>
+                  </a:rPr>
+                  <a:t>&gt; eval (out)</a:t>
+                </a:r>
+              </a:p>
+              <a:p>
+                <a:r>
+                  <a:rPr lang="en-GB" sz="1400" dirty="0">
+                    <a:latin typeface="Courier New" panose="02070309020205020404" pitchFamily="49" charset="0"/>
+                    <a:cs typeface="Courier New" panose="02070309020205020404" pitchFamily="49" charset="0"/>
+                  </a:rPr>
+                  <a:t>[1] 11 </a:t>
+                </a:r>
+                <a:endParaRPr lang="en-ZA" sz="1400" dirty="0">
+                  <a:latin typeface="Courier New" panose="02070309020205020404" pitchFamily="49" charset="0"/>
+                  <a:cs typeface="Courier New" panose="02070309020205020404" pitchFamily="49" charset="0"/>
+                </a:endParaRPr>
+              </a:p>
+            </p:txBody>
+          </p:sp>
+          <p:sp>
+            <p:nvSpPr>
+              <p:cNvPr id="12" name="TextBox 11">
+                <a:extLst>
+                  <a:ext uri="{FF2B5EF4-FFF2-40B4-BE49-F238E27FC236}">
+                    <a16:creationId xmlns:a16="http://schemas.microsoft.com/office/drawing/2014/main" id="{A70A6138-2910-D9F3-C830-4C5CB4DAEA49}"/>
+                  </a:ext>
+                </a:extLst>
+              </p:cNvPr>
+              <p:cNvSpPr txBox="1"/>
+              <p:nvPr/>
+            </p:nvSpPr>
+            <p:spPr>
+              <a:xfrm>
+                <a:off x="5394960" y="2442565"/>
+                <a:ext cx="3233421" cy="830997"/>
+              </a:xfrm>
+              <a:prstGeom prst="rect">
+                <a:avLst/>
+              </a:prstGeom>
+              <a:noFill/>
+            </p:spPr>
+            <p:txBody>
+              <a:bodyPr wrap="square" rtlCol="0">
+                <a:spAutoFit/>
+              </a:bodyPr>
+              <a:lstStyle/>
+              <a:p>
+                <a:r>
+                  <a:rPr lang="en-GB" sz="1600" i="1" dirty="0">
+                    <a:latin typeface="Times New Roman" panose="02020603050405020304" pitchFamily="18" charset="0"/>
+                    <a:cs typeface="Times New Roman" panose="02020603050405020304" pitchFamily="18" charset="0"/>
+                  </a:rPr>
+                  <a:t>Note the text has been converted to an expression but it is kept unevaluated.</a:t>
+                </a:r>
+                <a:endParaRPr lang="en-ZA" sz="1600" i="1" dirty="0">
+                  <a:latin typeface="Times New Roman" panose="02020603050405020304" pitchFamily="18" charset="0"/>
+                  <a:cs typeface="Times New Roman" panose="02020603050405020304" pitchFamily="18" charset="0"/>
+                </a:endParaRPr>
+              </a:p>
+            </p:txBody>
+          </p:sp>
+        </p:grpSp>
+        <p:grpSp>
+          <p:nvGrpSpPr>
+            <p:cNvPr id="28" name="Group 27">
+              <a:extLst>
+                <a:ext uri="{FF2B5EF4-FFF2-40B4-BE49-F238E27FC236}">
+                  <a16:creationId xmlns:a16="http://schemas.microsoft.com/office/drawing/2014/main" id="{07F90DB6-6CEE-7D60-F387-5DA1017DFB0D}"/>
+                </a:ext>
+              </a:extLst>
+            </p:cNvPr>
+            <p:cNvGrpSpPr/>
+            <p:nvPr/>
+          </p:nvGrpSpPr>
+          <p:grpSpPr>
+            <a:xfrm>
+              <a:off x="2120899" y="4072035"/>
+              <a:ext cx="6507481" cy="2576695"/>
+              <a:chOff x="2120899" y="4072035"/>
+              <a:chExt cx="6507481" cy="2576695"/>
+            </a:xfrm>
+          </p:grpSpPr>
+          <p:sp>
+            <p:nvSpPr>
+              <p:cNvPr id="16" name="TextBox 15">
+                <a:extLst>
+                  <a:ext uri="{FF2B5EF4-FFF2-40B4-BE49-F238E27FC236}">
+                    <a16:creationId xmlns:a16="http://schemas.microsoft.com/office/drawing/2014/main" id="{E2570122-7D9E-23E4-C762-B3334E73F767}"/>
+                  </a:ext>
+                </a:extLst>
+              </p:cNvPr>
+              <p:cNvSpPr txBox="1"/>
+              <p:nvPr/>
+            </p:nvSpPr>
+            <p:spPr>
+              <a:xfrm>
+                <a:off x="2120899" y="4586626"/>
+                <a:ext cx="3589021" cy="1815882"/>
+              </a:xfrm>
+              <a:prstGeom prst="rect">
+                <a:avLst/>
+              </a:prstGeom>
+              <a:noFill/>
+            </p:spPr>
+            <p:txBody>
+              <a:bodyPr wrap="square" rtlCol="0">
+                <a:spAutoFit/>
+              </a:bodyPr>
+              <a:lstStyle/>
+              <a:p>
+                <a:r>
+                  <a:rPr lang="en-GB" sz="1400" dirty="0">
+                    <a:latin typeface="Courier New" panose="02070309020205020404" pitchFamily="49" charset="0"/>
+                    <a:cs typeface="Courier New" panose="02070309020205020404" pitchFamily="49" charset="0"/>
+                  </a:rPr>
+                  <a:t>&gt; </a:t>
+                </a:r>
+                <a:r>
+                  <a:rPr lang="en-GB" sz="1400" dirty="0" err="1">
+                    <a:latin typeface="Courier New" panose="02070309020205020404" pitchFamily="49" charset="0"/>
+                    <a:cs typeface="Courier New" panose="02070309020205020404" pitchFamily="49" charset="0"/>
+                  </a:rPr>
+                  <a:t>deparse</a:t>
+                </a:r>
+                <a:r>
+                  <a:rPr lang="en-GB" sz="1400" dirty="0">
+                    <a:latin typeface="Courier New" panose="02070309020205020404" pitchFamily="49" charset="0"/>
+                    <a:cs typeface="Courier New" panose="02070309020205020404" pitchFamily="49" charset="0"/>
+                  </a:rPr>
+                  <a:t> (3 + 4)</a:t>
+                </a:r>
+              </a:p>
+              <a:p>
+                <a:r>
+                  <a:rPr lang="en-GB" sz="1400" dirty="0">
+                    <a:latin typeface="Courier New" panose="02070309020205020404" pitchFamily="49" charset="0"/>
+                    <a:cs typeface="Courier New" panose="02070309020205020404" pitchFamily="49" charset="0"/>
+                  </a:rPr>
+                  <a:t>[1] "7"</a:t>
+                </a:r>
+              </a:p>
+              <a:p>
+                <a:endParaRPr lang="en-GB" sz="1400" dirty="0">
+                  <a:latin typeface="Courier New" panose="02070309020205020404" pitchFamily="49" charset="0"/>
+                  <a:cs typeface="Courier New" panose="02070309020205020404" pitchFamily="49" charset="0"/>
+                </a:endParaRPr>
+              </a:p>
+              <a:p>
+                <a:r>
+                  <a:rPr lang="en-GB" sz="1400" dirty="0">
+                    <a:latin typeface="Courier New" panose="02070309020205020404" pitchFamily="49" charset="0"/>
+                    <a:cs typeface="Courier New" panose="02070309020205020404" pitchFamily="49" charset="0"/>
+                  </a:rPr>
+                  <a:t>&gt; substitute (3 + 4)</a:t>
+                </a:r>
+              </a:p>
+              <a:p>
+                <a:r>
+                  <a:rPr lang="en-GB" sz="1400" dirty="0">
+                    <a:latin typeface="Courier New" panose="02070309020205020404" pitchFamily="49" charset="0"/>
+                    <a:cs typeface="Courier New" panose="02070309020205020404" pitchFamily="49" charset="0"/>
+                  </a:rPr>
+                  <a:t>3 + 4</a:t>
+                </a:r>
+              </a:p>
+              <a:p>
+                <a:endParaRPr lang="en-GB" sz="1400" dirty="0">
+                  <a:latin typeface="Courier New" panose="02070309020205020404" pitchFamily="49" charset="0"/>
+                  <a:cs typeface="Courier New" panose="02070309020205020404" pitchFamily="49" charset="0"/>
+                </a:endParaRPr>
+              </a:p>
+              <a:p>
+                <a:r>
+                  <a:rPr lang="en-GB" sz="1400" dirty="0">
+                    <a:latin typeface="Courier New" panose="02070309020205020404" pitchFamily="49" charset="0"/>
+                    <a:cs typeface="Courier New" panose="02070309020205020404" pitchFamily="49" charset="0"/>
+                  </a:rPr>
+                  <a:t>&gt; </a:t>
+                </a:r>
+                <a:r>
+                  <a:rPr lang="en-GB" sz="1400" dirty="0" err="1">
+                    <a:latin typeface="Courier New" panose="02070309020205020404" pitchFamily="49" charset="0"/>
+                    <a:cs typeface="Courier New" panose="02070309020205020404" pitchFamily="49" charset="0"/>
+                  </a:rPr>
+                  <a:t>deparse</a:t>
+                </a:r>
+                <a:r>
+                  <a:rPr lang="en-GB" sz="1400" dirty="0">
+                    <a:latin typeface="Courier New" panose="02070309020205020404" pitchFamily="49" charset="0"/>
+                    <a:cs typeface="Courier New" panose="02070309020205020404" pitchFamily="49" charset="0"/>
+                  </a:rPr>
+                  <a:t> (substitute (3 + 4))</a:t>
+                </a:r>
+              </a:p>
+              <a:p>
+                <a:r>
+                  <a:rPr lang="en-GB" sz="1400" dirty="0">
+                    <a:latin typeface="Courier New" panose="02070309020205020404" pitchFamily="49" charset="0"/>
+                    <a:cs typeface="Courier New" panose="02070309020205020404" pitchFamily="49" charset="0"/>
+                  </a:rPr>
+                  <a:t>[1] "3 + 4"</a:t>
+                </a:r>
+                <a:endParaRPr lang="en-ZA" sz="1400" dirty="0">
+                  <a:latin typeface="Courier New" panose="02070309020205020404" pitchFamily="49" charset="0"/>
+                  <a:cs typeface="Courier New" panose="02070309020205020404" pitchFamily="49" charset="0"/>
+                </a:endParaRPr>
+              </a:p>
+            </p:txBody>
+          </p:sp>
+          <p:sp>
+            <p:nvSpPr>
+              <p:cNvPr id="17" name="TextBox 16">
+                <a:extLst>
+                  <a:ext uri="{FF2B5EF4-FFF2-40B4-BE49-F238E27FC236}">
+                    <a16:creationId xmlns:a16="http://schemas.microsoft.com/office/drawing/2014/main" id="{55149CDC-2129-63BD-49B7-1BDD031B2DEF}"/>
+                  </a:ext>
+                </a:extLst>
+              </p:cNvPr>
+              <p:cNvSpPr txBox="1"/>
+              <p:nvPr/>
+            </p:nvSpPr>
+            <p:spPr>
+              <a:xfrm>
+                <a:off x="5394960" y="4340655"/>
+                <a:ext cx="3233420" cy="830997"/>
+              </a:xfrm>
+              <a:prstGeom prst="rect">
+                <a:avLst/>
+              </a:prstGeom>
+              <a:noFill/>
+            </p:spPr>
+            <p:txBody>
+              <a:bodyPr wrap="square" rtlCol="0">
+                <a:spAutoFit/>
+              </a:bodyPr>
+              <a:lstStyle/>
+              <a:p>
+                <a:r>
+                  <a:rPr lang="en-GB" sz="1600" i="1" dirty="0">
+                    <a:latin typeface="Times New Roman" panose="02020603050405020304" pitchFamily="18" charset="0"/>
+                    <a:cs typeface="Times New Roman" panose="02020603050405020304" pitchFamily="18" charset="0"/>
+                  </a:rPr>
+                  <a:t>Note the expression has first been evaluated and then the result is converted to text.</a:t>
+                </a:r>
+                <a:endParaRPr lang="en-ZA" sz="1600" i="1" dirty="0">
+                  <a:latin typeface="Times New Roman" panose="02020603050405020304" pitchFamily="18" charset="0"/>
+                  <a:cs typeface="Times New Roman" panose="02020603050405020304" pitchFamily="18" charset="0"/>
+                </a:endParaRPr>
+              </a:p>
+            </p:txBody>
+          </p:sp>
+          <p:sp>
+            <p:nvSpPr>
+              <p:cNvPr id="18" name="TextBox 17">
+                <a:extLst>
+                  <a:ext uri="{FF2B5EF4-FFF2-40B4-BE49-F238E27FC236}">
+                    <a16:creationId xmlns:a16="http://schemas.microsoft.com/office/drawing/2014/main" id="{7066DB44-1D54-F8DA-C797-65923D88E23E}"/>
+                  </a:ext>
+                </a:extLst>
+              </p:cNvPr>
+              <p:cNvSpPr txBox="1"/>
+              <p:nvPr/>
+            </p:nvSpPr>
+            <p:spPr>
+              <a:xfrm>
+                <a:off x="5394960" y="5171401"/>
+                <a:ext cx="3233420" cy="584775"/>
+              </a:xfrm>
+              <a:prstGeom prst="rect">
+                <a:avLst/>
+              </a:prstGeom>
+              <a:noFill/>
+            </p:spPr>
+            <p:txBody>
+              <a:bodyPr wrap="square" rtlCol="0">
+                <a:spAutoFit/>
+              </a:bodyPr>
+              <a:lstStyle/>
+              <a:p>
+                <a:r>
+                  <a:rPr lang="en-GB" sz="1600" i="1" dirty="0">
+                    <a:latin typeface="Times New Roman" panose="02020603050405020304" pitchFamily="18" charset="0"/>
+                    <a:cs typeface="Times New Roman" panose="02020603050405020304" pitchFamily="18" charset="0"/>
+                  </a:rPr>
+                  <a:t>Note the expression is being returned as an unevaluated expression.</a:t>
+                </a:r>
+                <a:endParaRPr lang="en-ZA" sz="1600" i="1" dirty="0">
+                  <a:latin typeface="Times New Roman" panose="02020603050405020304" pitchFamily="18" charset="0"/>
+                  <a:cs typeface="Times New Roman" panose="02020603050405020304" pitchFamily="18" charset="0"/>
+                </a:endParaRPr>
+              </a:p>
+            </p:txBody>
+          </p:sp>
+          <p:sp>
+            <p:nvSpPr>
+              <p:cNvPr id="19" name="TextBox 18">
+                <a:extLst>
+                  <a:ext uri="{FF2B5EF4-FFF2-40B4-BE49-F238E27FC236}">
+                    <a16:creationId xmlns:a16="http://schemas.microsoft.com/office/drawing/2014/main" id="{FA390219-1C9D-6354-3BC7-087E3BE105CA}"/>
+                  </a:ext>
+                </a:extLst>
+              </p:cNvPr>
+              <p:cNvSpPr txBox="1"/>
+              <p:nvPr/>
+            </p:nvSpPr>
+            <p:spPr>
+              <a:xfrm>
+                <a:off x="5394960" y="5817733"/>
+                <a:ext cx="3233419" cy="830997"/>
+              </a:xfrm>
+              <a:prstGeom prst="rect">
+                <a:avLst/>
+              </a:prstGeom>
+              <a:noFill/>
+            </p:spPr>
+            <p:txBody>
+              <a:bodyPr wrap="square" rtlCol="0">
+                <a:spAutoFit/>
+              </a:bodyPr>
+              <a:lstStyle/>
+              <a:p>
+                <a:r>
+                  <a:rPr lang="en-GB" sz="1600" i="1" dirty="0">
+                    <a:latin typeface="Times New Roman" panose="02020603050405020304" pitchFamily="18" charset="0"/>
+                    <a:cs typeface="Times New Roman" panose="02020603050405020304" pitchFamily="18" charset="0"/>
+                  </a:rPr>
+                  <a:t>Using functions </a:t>
+                </a:r>
+                <a:r>
+                  <a:rPr lang="en-GB" sz="1500" dirty="0" err="1">
+                    <a:latin typeface="Courier New" panose="02070309020205020404" pitchFamily="49" charset="0"/>
+                    <a:cs typeface="Courier New" panose="02070309020205020404" pitchFamily="49" charset="0"/>
+                  </a:rPr>
+                  <a:t>deparse</a:t>
+                </a:r>
+                <a:r>
+                  <a:rPr lang="en-GB" sz="1600" i="1" dirty="0">
+                    <a:latin typeface="Times New Roman" panose="02020603050405020304" pitchFamily="18" charset="0"/>
+                    <a:cs typeface="Times New Roman" panose="02020603050405020304" pitchFamily="18" charset="0"/>
+                  </a:rPr>
+                  <a:t> and </a:t>
+                </a:r>
+                <a:r>
+                  <a:rPr lang="en-GB" sz="1500" dirty="0">
+                    <a:latin typeface="Courier New" panose="02070309020205020404" pitchFamily="49" charset="0"/>
+                    <a:cs typeface="Courier New" panose="02070309020205020404" pitchFamily="49" charset="0"/>
+                  </a:rPr>
+                  <a:t>substitute </a:t>
+                </a:r>
+                <a:r>
+                  <a:rPr lang="en-GB" sz="1600" i="1" dirty="0">
+                    <a:latin typeface="Times New Roman" panose="02020603050405020304" pitchFamily="18" charset="0"/>
+                    <a:cs typeface="Times New Roman" panose="02020603050405020304" pitchFamily="18" charset="0"/>
+                  </a:rPr>
+                  <a:t>together converts original expression into text.</a:t>
+                </a:r>
+                <a:endParaRPr lang="en-ZA" sz="1600" i="1" dirty="0">
+                  <a:latin typeface="Times New Roman" panose="02020603050405020304" pitchFamily="18" charset="0"/>
+                  <a:cs typeface="Times New Roman" panose="02020603050405020304" pitchFamily="18" charset="0"/>
+                </a:endParaRPr>
+              </a:p>
+            </p:txBody>
+          </p:sp>
+          <p:grpSp>
+            <p:nvGrpSpPr>
+              <p:cNvPr id="25" name="Group 24">
+                <a:extLst>
+                  <a:ext uri="{FF2B5EF4-FFF2-40B4-BE49-F238E27FC236}">
+                    <a16:creationId xmlns:a16="http://schemas.microsoft.com/office/drawing/2014/main" id="{1B79E9A3-3F64-21AA-FA76-8E47131F0AD4}"/>
+                  </a:ext>
+                </a:extLst>
+              </p:cNvPr>
+              <p:cNvGrpSpPr/>
+              <p:nvPr/>
+            </p:nvGrpSpPr>
+            <p:grpSpPr>
+              <a:xfrm flipH="1">
+                <a:off x="2120899" y="4072035"/>
+                <a:ext cx="3030222" cy="309600"/>
+                <a:chOff x="2120899" y="4072035"/>
+                <a:chExt cx="3030222" cy="309600"/>
+              </a:xfrm>
+            </p:grpSpPr>
+            <p:sp>
+              <p:nvSpPr>
+                <p:cNvPr id="22" name="Rectangle: Rounded Corners 21">
+                  <a:extLst>
+                    <a:ext uri="{FF2B5EF4-FFF2-40B4-BE49-F238E27FC236}">
+                      <a16:creationId xmlns:a16="http://schemas.microsoft.com/office/drawing/2014/main" id="{531BA0EC-C035-8E00-3EEE-F169E00FE856}"/>
+                    </a:ext>
+                  </a:extLst>
+                </p:cNvPr>
+                <p:cNvSpPr/>
+                <p:nvPr/>
+              </p:nvSpPr>
+              <p:spPr>
+                <a:xfrm>
+                  <a:off x="2120899" y="4072035"/>
+                  <a:ext cx="1414781" cy="307777"/>
+                </a:xfrm>
+                <a:prstGeom prst="roundRect">
+                  <a:avLst/>
+                </a:prstGeom>
+                <a:noFill/>
+                <a:ln>
+                  <a:solidFill>
+                    <a:schemeClr val="tx1"/>
+                  </a:solidFill>
+                </a:ln>
+              </p:spPr>
+              <p:style>
+                <a:lnRef idx="2">
+                  <a:schemeClr val="accent1">
+                    <a:shade val="15000"/>
+                  </a:schemeClr>
+                </a:lnRef>
+                <a:fillRef idx="1">
+                  <a:schemeClr val="accent1"/>
+                </a:fillRef>
+                <a:effectRef idx="0">
+                  <a:schemeClr val="accent1"/>
+                </a:effectRef>
+                <a:fontRef idx="minor">
+                  <a:schemeClr val="lt1"/>
+                </a:fontRef>
+              </p:style>
+              <p:txBody>
+                <a:bodyPr rtlCol="0" anchor="ctr"/>
+                <a:lstStyle/>
+                <a:p>
+                  <a:pPr algn="ctr"/>
+                  <a:r>
+                    <a:rPr lang="en-GB" sz="1400" dirty="0">
+                      <a:solidFill>
+                        <a:schemeClr val="tx1"/>
+                      </a:solidFill>
+                    </a:rPr>
+                    <a:t>Expression</a:t>
+                  </a:r>
+                  <a:endParaRPr lang="en-ZA" sz="1400" dirty="0">
+                    <a:solidFill>
+                      <a:schemeClr val="tx1"/>
+                    </a:solidFill>
+                  </a:endParaRPr>
+                </a:p>
+              </p:txBody>
+            </p:sp>
+            <p:sp>
+              <p:nvSpPr>
+                <p:cNvPr id="23" name="Rectangle: Rounded Corners 22">
+                  <a:extLst>
+                    <a:ext uri="{FF2B5EF4-FFF2-40B4-BE49-F238E27FC236}">
+                      <a16:creationId xmlns:a16="http://schemas.microsoft.com/office/drawing/2014/main" id="{22B54285-081B-4E71-DC45-387CF0F33641}"/>
+                    </a:ext>
+                  </a:extLst>
+                </p:cNvPr>
+                <p:cNvSpPr/>
+                <p:nvPr/>
+              </p:nvSpPr>
+              <p:spPr>
+                <a:xfrm>
+                  <a:off x="4307841" y="4072035"/>
+                  <a:ext cx="843280" cy="309600"/>
+                </a:xfrm>
+                <a:prstGeom prst="roundRect">
+                  <a:avLst/>
+                </a:prstGeom>
+                <a:noFill/>
+                <a:ln>
+                  <a:solidFill>
+                    <a:schemeClr val="tx1"/>
+                  </a:solidFill>
+                </a:ln>
+              </p:spPr>
+              <p:style>
+                <a:lnRef idx="2">
+                  <a:schemeClr val="accent1">
+                    <a:shade val="15000"/>
+                  </a:schemeClr>
+                </a:lnRef>
+                <a:fillRef idx="1">
+                  <a:schemeClr val="accent1"/>
+                </a:fillRef>
+                <a:effectRef idx="0">
+                  <a:schemeClr val="accent1"/>
+                </a:effectRef>
+                <a:fontRef idx="minor">
+                  <a:schemeClr val="lt1"/>
+                </a:fontRef>
+              </p:style>
+              <p:txBody>
+                <a:bodyPr rtlCol="0" anchor="ctr"/>
+                <a:lstStyle/>
+                <a:p>
+                  <a:pPr algn="ctr"/>
+                  <a:r>
+                    <a:rPr lang="en-GB" sz="1400" dirty="0">
+                      <a:solidFill>
+                        <a:schemeClr val="tx1"/>
+                      </a:solidFill>
+                    </a:rPr>
+                    <a:t>Text</a:t>
+                  </a:r>
+                  <a:endParaRPr lang="en-ZA" sz="1400" dirty="0">
+                    <a:solidFill>
+                      <a:schemeClr val="tx1"/>
+                    </a:solidFill>
+                  </a:endParaRPr>
+                </a:p>
+              </p:txBody>
+            </p:sp>
+            <p:cxnSp>
+              <p:nvCxnSpPr>
+                <p:cNvPr id="24" name="Straight Arrow Connector 23">
+                  <a:extLst>
+                    <a:ext uri="{FF2B5EF4-FFF2-40B4-BE49-F238E27FC236}">
+                      <a16:creationId xmlns:a16="http://schemas.microsoft.com/office/drawing/2014/main" id="{FC99C026-FD25-AF2E-FE4A-A17010D7A91D}"/>
+                    </a:ext>
+                  </a:extLst>
+                </p:cNvPr>
+                <p:cNvCxnSpPr>
+                  <a:cxnSpLocks/>
+                  <a:stCxn id="23" idx="1"/>
+                  <a:endCxn id="22" idx="3"/>
+                </p:cNvCxnSpPr>
+                <p:nvPr/>
+              </p:nvCxnSpPr>
+              <p:spPr>
+                <a:xfrm flipH="1" flipV="1">
+                  <a:off x="3535680" y="4225924"/>
+                  <a:ext cx="772161" cy="911"/>
+                </a:xfrm>
+                <a:prstGeom prst="straightConnector1">
+                  <a:avLst/>
+                </a:prstGeom>
+                <a:ln>
+                  <a:tailEnd type="triangle"/>
+                </a:ln>
+              </p:spPr>
+              <p:style>
+                <a:lnRef idx="2">
+                  <a:schemeClr val="dk1"/>
+                </a:lnRef>
+                <a:fillRef idx="0">
+                  <a:schemeClr val="dk1"/>
+                </a:fillRef>
+                <a:effectRef idx="1">
+                  <a:schemeClr val="dk1"/>
+                </a:effectRef>
+                <a:fontRef idx="minor">
+                  <a:schemeClr val="tx1"/>
+                </a:fontRef>
+              </p:style>
+            </p:cxnSp>
+          </p:grpSp>
+        </p:grpSp>
+      </p:grpSp>
+    </p:spTree>
+    <p:extLst>
+      <p:ext uri="{BB962C8B-B14F-4D97-AF65-F5344CB8AC3E}">
+        <p14:creationId xmlns:p14="http://schemas.microsoft.com/office/powerpoint/2010/main" val="3554369724"/>
       </p:ext>
     </p:extLst>
   </p:cSld>

</xml_diff>